<commit_message>
generalization of API handlers
</commit_message>
<xml_diff>
--- a/images/graphics.pptx
+++ b/images/graphics.pptx
@@ -8,6 +8,7 @@
     <p:sldId id="257" r:id="rId2"/>
     <p:sldId id="258" r:id="rId3"/>
     <p:sldId id="259" r:id="rId4"/>
+    <p:sldId id="260" r:id="rId5"/>
   </p:sldIdLst>
   <p:sldSz cx="9144000" cy="6858000" type="screen4x3"/>
   <p:notesSz cx="6858000" cy="9144000"/>
@@ -291,7 +292,7 @@
             <a:fld id="{FD841624-621E-4D67-82DB-36A0154A0A2F}" type="datetimeFigureOut">
               <a:rPr lang="en-US" smtClean="0"/>
               <a:pPr/>
-              <a:t>05-Sep-21</a:t>
+              <a:t>29-Oct-21</a:t>
             </a:fld>
             <a:endParaRPr lang="en-US"/>
           </a:p>
@@ -458,7 +459,7 @@
             <a:fld id="{FD841624-621E-4D67-82DB-36A0154A0A2F}" type="datetimeFigureOut">
               <a:rPr lang="en-US" smtClean="0"/>
               <a:pPr/>
-              <a:t>05-Sep-21</a:t>
+              <a:t>29-Oct-21</a:t>
             </a:fld>
             <a:endParaRPr lang="en-US"/>
           </a:p>
@@ -635,7 +636,7 @@
             <a:fld id="{FD841624-621E-4D67-82DB-36A0154A0A2F}" type="datetimeFigureOut">
               <a:rPr lang="en-US" smtClean="0"/>
               <a:pPr/>
-              <a:t>05-Sep-21</a:t>
+              <a:t>29-Oct-21</a:t>
             </a:fld>
             <a:endParaRPr lang="en-US"/>
           </a:p>
@@ -802,7 +803,7 @@
             <a:fld id="{FD841624-621E-4D67-82DB-36A0154A0A2F}" type="datetimeFigureOut">
               <a:rPr lang="en-US" smtClean="0"/>
               <a:pPr/>
-              <a:t>05-Sep-21</a:t>
+              <a:t>29-Oct-21</a:t>
             </a:fld>
             <a:endParaRPr lang="en-US"/>
           </a:p>
@@ -1045,7 +1046,7 @@
             <a:fld id="{FD841624-621E-4D67-82DB-36A0154A0A2F}" type="datetimeFigureOut">
               <a:rPr lang="en-US" smtClean="0"/>
               <a:pPr/>
-              <a:t>05-Sep-21</a:t>
+              <a:t>29-Oct-21</a:t>
             </a:fld>
             <a:endParaRPr lang="en-US"/>
           </a:p>
@@ -1330,7 +1331,7 @@
             <a:fld id="{FD841624-621E-4D67-82DB-36A0154A0A2F}" type="datetimeFigureOut">
               <a:rPr lang="en-US" smtClean="0"/>
               <a:pPr/>
-              <a:t>05-Sep-21</a:t>
+              <a:t>29-Oct-21</a:t>
             </a:fld>
             <a:endParaRPr lang="en-US"/>
           </a:p>
@@ -1749,7 +1750,7 @@
             <a:fld id="{FD841624-621E-4D67-82DB-36A0154A0A2F}" type="datetimeFigureOut">
               <a:rPr lang="en-US" smtClean="0"/>
               <a:pPr/>
-              <a:t>05-Sep-21</a:t>
+              <a:t>29-Oct-21</a:t>
             </a:fld>
             <a:endParaRPr lang="en-US"/>
           </a:p>
@@ -1864,7 +1865,7 @@
             <a:fld id="{FD841624-621E-4D67-82DB-36A0154A0A2F}" type="datetimeFigureOut">
               <a:rPr lang="en-US" smtClean="0"/>
               <a:pPr/>
-              <a:t>05-Sep-21</a:t>
+              <a:t>29-Oct-21</a:t>
             </a:fld>
             <a:endParaRPr lang="en-US"/>
           </a:p>
@@ -1956,7 +1957,7 @@
             <a:fld id="{FD841624-621E-4D67-82DB-36A0154A0A2F}" type="datetimeFigureOut">
               <a:rPr lang="en-US" smtClean="0"/>
               <a:pPr/>
-              <a:t>05-Sep-21</a:t>
+              <a:t>29-Oct-21</a:t>
             </a:fld>
             <a:endParaRPr lang="en-US"/>
           </a:p>
@@ -2230,7 +2231,7 @@
             <a:fld id="{FD841624-621E-4D67-82DB-36A0154A0A2F}" type="datetimeFigureOut">
               <a:rPr lang="en-US" smtClean="0"/>
               <a:pPr/>
-              <a:t>05-Sep-21</a:t>
+              <a:t>29-Oct-21</a:t>
             </a:fld>
             <a:endParaRPr lang="en-US"/>
           </a:p>
@@ -2480,7 +2481,7 @@
             <a:fld id="{FD841624-621E-4D67-82DB-36A0154A0A2F}" type="datetimeFigureOut">
               <a:rPr lang="en-US" smtClean="0"/>
               <a:pPr/>
-              <a:t>05-Sep-21</a:t>
+              <a:t>29-Oct-21</a:t>
             </a:fld>
             <a:endParaRPr lang="en-US"/>
           </a:p>
@@ -2690,7 +2691,7 @@
             <a:fld id="{FD841624-621E-4D67-82DB-36A0154A0A2F}" type="datetimeFigureOut">
               <a:rPr lang="en-US" smtClean="0"/>
               <a:pPr/>
-              <a:t>05-Sep-21</a:t>
+              <a:t>29-Oct-21</a:t>
             </a:fld>
             <a:endParaRPr lang="en-US"/>
           </a:p>
@@ -4593,22 +4594,13 @@
               <a:p>
                 <a:r>
                   <a:rPr lang="en-US" dirty="0" smtClean="0"/>
-                  <a:t>Faust </a:t>
+                  <a:t>Faust DSP engine</a:t>
                 </a:r>
-                <a:r>
-                  <a:rPr lang="en-US" dirty="0" smtClean="0"/>
-                  <a:t>DSP engine</a:t>
-                </a:r>
-                <a:endParaRPr lang="en-US" dirty="0" smtClean="0"/>
               </a:p>
               <a:p>
                 <a:r>
                   <a:rPr lang="en-US" dirty="0" smtClean="0"/>
-                  <a:t>     </a:t>
-                </a:r>
-                <a:r>
-                  <a:rPr lang="en-US" dirty="0" smtClean="0"/>
-                  <a:t>    .</a:t>
+                  <a:t>         .</a:t>
                 </a:r>
                 <a:r>
                   <a:rPr lang="en-US" dirty="0" err="1" smtClean="0"/>
@@ -4776,11 +4768,7 @@
               <a:p>
                 <a:r>
                   <a:rPr lang="en-US" dirty="0" smtClean="0"/>
-                  <a:t>s</a:t>
-                </a:r>
-                <a:r>
-                  <a:rPr lang="en-US" dirty="0" smtClean="0"/>
-                  <a:t>ound and audio codec </a:t>
+                  <a:t>sound and audio codec </a:t>
                 </a:r>
                 <a:r>
                   <a:rPr lang="en-US" dirty="0" err="1" smtClean="0"/>
@@ -4791,11 +4779,7 @@
               <a:p>
                 <a:r>
                   <a:rPr lang="en-US" dirty="0" smtClean="0"/>
-                  <a:t>        </a:t>
-                </a:r>
-                <a:r>
-                  <a:rPr lang="en-US" dirty="0" smtClean="0"/>
-                  <a:t>        .</a:t>
+                  <a:t>                .</a:t>
                 </a:r>
                 <a:r>
                   <a:rPr lang="en-US" dirty="0" err="1" smtClean="0"/>
@@ -4963,15 +4947,7 @@
             <a:p>
               <a:r>
                 <a:rPr lang="en-US" dirty="0" smtClean="0"/>
-                <a:t>U</a:t>
-              </a:r>
-              <a:r>
-                <a:rPr lang="en-US" dirty="0" smtClean="0"/>
-                <a:t>ser </a:t>
-              </a:r>
-              <a:r>
-                <a:rPr lang="en-US" dirty="0" smtClean="0"/>
-                <a:t>main &amp; </a:t>
+                <a:t>User main &amp; </a:t>
               </a:r>
               <a:r>
                 <a:rPr lang="en-US" dirty="0" err="1" smtClean="0"/>
@@ -5110,6 +5086,2477 @@
           </p:sp>
         </p:grpSp>
       </p:grpSp>
+    </p:spTree>
+  </p:cSld>
+  <p:clrMapOvr>
+    <a:masterClrMapping/>
+  </p:clrMapOvr>
+</p:sld>
+</file>
+
+<file path=ppt/slides/slide4.xml><?xml version="1.0" encoding="utf-8"?>
+<p:sld xmlns:a="http://schemas.openxmlformats.org/drawingml/2006/main" xmlns:r="http://schemas.openxmlformats.org/officeDocument/2006/relationships" xmlns:p="http://schemas.openxmlformats.org/presentationml/2006/main">
+  <p:cSld>
+    <p:spTree>
+      <p:nvGrpSpPr>
+        <p:cNvPr id="1" name=""/>
+        <p:cNvGrpSpPr/>
+        <p:nvPr/>
+      </p:nvGrpSpPr>
+      <p:grpSpPr>
+        <a:xfrm>
+          <a:off x="0" y="0"/>
+          <a:ext cx="0" cy="0"/>
+          <a:chOff x="0" y="0"/>
+          <a:chExt cx="0" cy="0"/>
+        </a:xfrm>
+      </p:grpSpPr>
+      <p:sp>
+        <p:nvSpPr>
+          <p:cNvPr id="2" name="Rectangle 1"/>
+          <p:cNvSpPr/>
+          <p:nvPr/>
+        </p:nvSpPr>
+        <p:spPr>
+          <a:xfrm>
+            <a:off x="1187624" y="1772816"/>
+            <a:ext cx="1440160" cy="864096"/>
+          </a:xfrm>
+          <a:prstGeom prst="rect">
+            <a:avLst/>
+          </a:prstGeom>
+          <a:solidFill>
+            <a:srgbClr val="FFFF00"/>
+          </a:solidFill>
+        </p:spPr>
+        <p:style>
+          <a:lnRef idx="2">
+            <a:schemeClr val="accent1">
+              <a:shade val="50000"/>
+            </a:schemeClr>
+          </a:lnRef>
+          <a:fillRef idx="1">
+            <a:schemeClr val="accent1"/>
+          </a:fillRef>
+          <a:effectRef idx="0">
+            <a:schemeClr val="accent1"/>
+          </a:effectRef>
+          <a:fontRef idx="minor">
+            <a:schemeClr val="lt1"/>
+          </a:fontRef>
+        </p:style>
+        <p:txBody>
+          <a:bodyPr rtlCol="0" anchor="ctr"/>
+          <a:lstStyle/>
+          <a:p>
+            <a:pPr algn="ctr"/>
+            <a:r>
+              <a:rPr lang="en-US" sz="1200" b="1" dirty="0" smtClean="0">
+                <a:solidFill>
+                  <a:schemeClr val="tx1"/>
+                </a:solidFill>
+              </a:rPr>
+              <a:t>Sound Board</a:t>
+            </a:r>
+          </a:p>
+          <a:p>
+            <a:pPr algn="ctr"/>
+            <a:r>
+              <a:rPr lang="en-US" sz="1200" b="1" dirty="0" smtClean="0">
+                <a:solidFill>
+                  <a:schemeClr val="tx1"/>
+                </a:solidFill>
+              </a:rPr>
+              <a:t>TTGO </a:t>
+            </a:r>
+            <a:r>
+              <a:rPr lang="en-US" sz="1200" b="1" dirty="0" err="1" smtClean="0">
+                <a:solidFill>
+                  <a:schemeClr val="tx1"/>
+                </a:solidFill>
+              </a:rPr>
+              <a:t>Taudio</a:t>
+            </a:r>
+            <a:r>
+              <a:rPr lang="en-US" sz="1200" b="1" dirty="0" smtClean="0">
+                <a:solidFill>
+                  <a:schemeClr val="tx1"/>
+                </a:solidFill>
+              </a:rPr>
+              <a:t> V1.6</a:t>
+            </a:r>
+          </a:p>
+          <a:p>
+            <a:pPr algn="ctr"/>
+            <a:r>
+              <a:rPr lang="en-US" sz="1200" b="1" dirty="0" err="1" smtClean="0">
+                <a:solidFill>
+                  <a:schemeClr val="tx1"/>
+                </a:solidFill>
+              </a:rPr>
+              <a:t>DspFaust</a:t>
+            </a:r>
+            <a:r>
+              <a:rPr lang="en-US" sz="1200" b="1" dirty="0" smtClean="0">
+                <a:solidFill>
+                  <a:schemeClr val="tx1"/>
+                </a:solidFill>
+              </a:rPr>
+              <a:t> API</a:t>
+            </a:r>
+            <a:endParaRPr lang="en-US" sz="1200" b="1" dirty="0">
+              <a:solidFill>
+                <a:schemeClr val="tx1"/>
+              </a:solidFill>
+            </a:endParaRPr>
+          </a:p>
+        </p:txBody>
+      </p:sp>
+      <p:sp>
+        <p:nvSpPr>
+          <p:cNvPr id="3" name="Rectangle 2"/>
+          <p:cNvSpPr/>
+          <p:nvPr/>
+        </p:nvSpPr>
+        <p:spPr>
+          <a:xfrm>
+            <a:off x="3491880" y="1772816"/>
+            <a:ext cx="1440160" cy="864096"/>
+          </a:xfrm>
+          <a:prstGeom prst="rect">
+            <a:avLst/>
+          </a:prstGeom>
+          <a:solidFill>
+            <a:srgbClr val="FFFF00"/>
+          </a:solidFill>
+        </p:spPr>
+        <p:style>
+          <a:lnRef idx="2">
+            <a:schemeClr val="accent1">
+              <a:shade val="50000"/>
+            </a:schemeClr>
+          </a:lnRef>
+          <a:fillRef idx="1">
+            <a:schemeClr val="accent1"/>
+          </a:fillRef>
+          <a:effectRef idx="0">
+            <a:schemeClr val="accent1"/>
+          </a:effectRef>
+          <a:fontRef idx="minor">
+            <a:schemeClr val="lt1"/>
+          </a:fontRef>
+        </p:style>
+        <p:txBody>
+          <a:bodyPr rtlCol="0" anchor="ctr"/>
+          <a:lstStyle/>
+          <a:p>
+            <a:pPr algn="ctr"/>
+            <a:r>
+              <a:rPr lang="en-US" sz="1200" b="1" dirty="0" smtClean="0">
+                <a:solidFill>
+                  <a:schemeClr val="tx1"/>
+                </a:solidFill>
+              </a:rPr>
+              <a:t>Server</a:t>
+            </a:r>
+          </a:p>
+          <a:p>
+            <a:pPr algn="ctr"/>
+            <a:r>
+              <a:rPr lang="en-US" sz="1200" b="1" dirty="0" err="1" smtClean="0">
+                <a:solidFill>
+                  <a:schemeClr val="tx1"/>
+                </a:solidFill>
+              </a:rPr>
+              <a:t>Nodered</a:t>
+            </a:r>
+            <a:endParaRPr lang="en-US" sz="1200" b="1" dirty="0" smtClean="0">
+              <a:solidFill>
+                <a:schemeClr val="tx1"/>
+              </a:solidFill>
+            </a:endParaRPr>
+          </a:p>
+        </p:txBody>
+      </p:sp>
+      <p:sp>
+        <p:nvSpPr>
+          <p:cNvPr id="4" name="Rectangle 3"/>
+          <p:cNvSpPr/>
+          <p:nvPr/>
+        </p:nvSpPr>
+        <p:spPr>
+          <a:xfrm>
+            <a:off x="5796136" y="1772816"/>
+            <a:ext cx="1440160" cy="864096"/>
+          </a:xfrm>
+          <a:prstGeom prst="rect">
+            <a:avLst/>
+          </a:prstGeom>
+          <a:solidFill>
+            <a:srgbClr val="FFFF00"/>
+          </a:solidFill>
+        </p:spPr>
+        <p:style>
+          <a:lnRef idx="2">
+            <a:schemeClr val="accent1">
+              <a:shade val="50000"/>
+            </a:schemeClr>
+          </a:lnRef>
+          <a:fillRef idx="1">
+            <a:schemeClr val="accent1"/>
+          </a:fillRef>
+          <a:effectRef idx="0">
+            <a:schemeClr val="accent1"/>
+          </a:effectRef>
+          <a:fontRef idx="minor">
+            <a:schemeClr val="lt1"/>
+          </a:fontRef>
+        </p:style>
+        <p:txBody>
+          <a:bodyPr rtlCol="0" anchor="ctr"/>
+          <a:lstStyle/>
+          <a:p>
+            <a:pPr algn="ctr"/>
+            <a:r>
+              <a:rPr lang="en-US" sz="1200" b="1" dirty="0" smtClean="0">
+                <a:solidFill>
+                  <a:schemeClr val="tx1"/>
+                </a:solidFill>
+              </a:rPr>
+              <a:t>GUI</a:t>
+            </a:r>
+          </a:p>
+          <a:p>
+            <a:pPr algn="ctr"/>
+            <a:r>
+              <a:rPr lang="en-US" sz="1200" b="1" dirty="0" smtClean="0">
+                <a:solidFill>
+                  <a:schemeClr val="tx1"/>
+                </a:solidFill>
+              </a:rPr>
+              <a:t>Chrome browser</a:t>
+            </a:r>
+          </a:p>
+        </p:txBody>
+      </p:sp>
+      <p:grpSp>
+        <p:nvGrpSpPr>
+          <p:cNvPr id="7" name="Group 6"/>
+          <p:cNvGrpSpPr/>
+          <p:nvPr/>
+        </p:nvGrpSpPr>
+        <p:grpSpPr>
+          <a:xfrm>
+            <a:off x="2807804" y="2092660"/>
+            <a:ext cx="504056" cy="224408"/>
+            <a:chOff x="2771800" y="2852936"/>
+            <a:chExt cx="504056" cy="224408"/>
+          </a:xfrm>
+        </p:grpSpPr>
+        <p:sp>
+          <p:nvSpPr>
+            <p:cNvPr id="5" name="Right Arrow 4"/>
+            <p:cNvSpPr/>
+            <p:nvPr/>
+          </p:nvSpPr>
+          <p:spPr>
+            <a:xfrm>
+              <a:off x="2843808" y="2852936"/>
+              <a:ext cx="432048" cy="72008"/>
+            </a:xfrm>
+            <a:prstGeom prst="rightArrow">
+              <a:avLst/>
+            </a:prstGeom>
+          </p:spPr>
+          <p:style>
+            <a:lnRef idx="2">
+              <a:schemeClr val="accent5">
+                <a:shade val="50000"/>
+              </a:schemeClr>
+            </a:lnRef>
+            <a:fillRef idx="1">
+              <a:schemeClr val="accent5"/>
+            </a:fillRef>
+            <a:effectRef idx="0">
+              <a:schemeClr val="accent5"/>
+            </a:effectRef>
+            <a:fontRef idx="minor">
+              <a:schemeClr val="lt1"/>
+            </a:fontRef>
+          </p:style>
+          <p:txBody>
+            <a:bodyPr rtlCol="0" anchor="ctr"/>
+            <a:lstStyle/>
+            <a:p>
+              <a:pPr algn="ctr"/>
+              <a:endParaRPr lang="en-US"/>
+            </a:p>
+          </p:txBody>
+        </p:sp>
+        <p:sp>
+          <p:nvSpPr>
+            <p:cNvPr id="6" name="Right Arrow 5"/>
+            <p:cNvSpPr/>
+            <p:nvPr/>
+          </p:nvSpPr>
+          <p:spPr>
+            <a:xfrm flipH="1">
+              <a:off x="2771800" y="3005336"/>
+              <a:ext cx="432048" cy="72008"/>
+            </a:xfrm>
+            <a:prstGeom prst="rightArrow">
+              <a:avLst/>
+            </a:prstGeom>
+          </p:spPr>
+          <p:style>
+            <a:lnRef idx="2">
+              <a:schemeClr val="accent5">
+                <a:shade val="50000"/>
+              </a:schemeClr>
+            </a:lnRef>
+            <a:fillRef idx="1">
+              <a:schemeClr val="accent5"/>
+            </a:fillRef>
+            <a:effectRef idx="0">
+              <a:schemeClr val="accent5"/>
+            </a:effectRef>
+            <a:fontRef idx="minor">
+              <a:schemeClr val="lt1"/>
+            </a:fontRef>
+          </p:style>
+          <p:txBody>
+            <a:bodyPr rtlCol="0" anchor="ctr"/>
+            <a:lstStyle/>
+            <a:p>
+              <a:pPr algn="ctr"/>
+              <a:endParaRPr lang="en-US"/>
+            </a:p>
+          </p:txBody>
+        </p:sp>
+      </p:grpSp>
+      <p:grpSp>
+        <p:nvGrpSpPr>
+          <p:cNvPr id="8" name="Group 7"/>
+          <p:cNvGrpSpPr/>
+          <p:nvPr/>
+        </p:nvGrpSpPr>
+        <p:grpSpPr>
+          <a:xfrm>
+            <a:off x="5112060" y="2092660"/>
+            <a:ext cx="504056" cy="224408"/>
+            <a:chOff x="2771800" y="2852936"/>
+            <a:chExt cx="504056" cy="224408"/>
+          </a:xfrm>
+        </p:grpSpPr>
+        <p:sp>
+          <p:nvSpPr>
+            <p:cNvPr id="9" name="Right Arrow 8"/>
+            <p:cNvSpPr/>
+            <p:nvPr/>
+          </p:nvSpPr>
+          <p:spPr>
+            <a:xfrm>
+              <a:off x="2843808" y="2852936"/>
+              <a:ext cx="432048" cy="72008"/>
+            </a:xfrm>
+            <a:prstGeom prst="rightArrow">
+              <a:avLst/>
+            </a:prstGeom>
+          </p:spPr>
+          <p:style>
+            <a:lnRef idx="2">
+              <a:schemeClr val="accent6">
+                <a:shade val="50000"/>
+              </a:schemeClr>
+            </a:lnRef>
+            <a:fillRef idx="1">
+              <a:schemeClr val="accent6"/>
+            </a:fillRef>
+            <a:effectRef idx="0">
+              <a:schemeClr val="accent6"/>
+            </a:effectRef>
+            <a:fontRef idx="minor">
+              <a:schemeClr val="lt1"/>
+            </a:fontRef>
+          </p:style>
+          <p:txBody>
+            <a:bodyPr rtlCol="0" anchor="ctr"/>
+            <a:lstStyle/>
+            <a:p>
+              <a:pPr algn="ctr"/>
+              <a:endParaRPr lang="en-US"/>
+            </a:p>
+          </p:txBody>
+        </p:sp>
+        <p:sp>
+          <p:nvSpPr>
+            <p:cNvPr id="10" name="Right Arrow 9"/>
+            <p:cNvSpPr/>
+            <p:nvPr/>
+          </p:nvSpPr>
+          <p:spPr>
+            <a:xfrm flipH="1">
+              <a:off x="2771800" y="3005336"/>
+              <a:ext cx="432048" cy="72008"/>
+            </a:xfrm>
+            <a:prstGeom prst="rightArrow">
+              <a:avLst/>
+            </a:prstGeom>
+          </p:spPr>
+          <p:style>
+            <a:lnRef idx="2">
+              <a:schemeClr val="accent6">
+                <a:shade val="50000"/>
+              </a:schemeClr>
+            </a:lnRef>
+            <a:fillRef idx="1">
+              <a:schemeClr val="accent6"/>
+            </a:fillRef>
+            <a:effectRef idx="0">
+              <a:schemeClr val="accent6"/>
+            </a:effectRef>
+            <a:fontRef idx="minor">
+              <a:schemeClr val="lt1"/>
+            </a:fontRef>
+          </p:style>
+          <p:txBody>
+            <a:bodyPr rtlCol="0" anchor="ctr"/>
+            <a:lstStyle/>
+            <a:p>
+              <a:pPr algn="ctr"/>
+              <a:endParaRPr lang="en-US"/>
+            </a:p>
+          </p:txBody>
+        </p:sp>
+      </p:grpSp>
+      <p:sp>
+        <p:nvSpPr>
+          <p:cNvPr id="11" name="TextBox 10"/>
+          <p:cNvSpPr txBox="1"/>
+          <p:nvPr/>
+        </p:nvSpPr>
+        <p:spPr>
+          <a:xfrm>
+            <a:off x="2633139" y="1848493"/>
+            <a:ext cx="843501" cy="246221"/>
+          </a:xfrm>
+          <a:prstGeom prst="rect">
+            <a:avLst/>
+          </a:prstGeom>
+          <a:noFill/>
+        </p:spPr>
+        <p:txBody>
+          <a:bodyPr wrap="none" rtlCol="0">
+            <a:spAutoFit/>
+          </a:bodyPr>
+          <a:lstStyle/>
+          <a:p>
+            <a:r>
+              <a:rPr lang="en-US" sz="1000" dirty="0" smtClean="0"/>
+              <a:t>MQTT / </a:t>
+            </a:r>
+            <a:r>
+              <a:rPr lang="en-US" sz="1000" dirty="0" err="1" smtClean="0"/>
+              <a:t>WiFi</a:t>
+            </a:r>
+            <a:endParaRPr lang="en-US" sz="1000" dirty="0"/>
+          </a:p>
+        </p:txBody>
+      </p:sp>
+      <p:sp>
+        <p:nvSpPr>
+          <p:cNvPr id="12" name="TextBox 11"/>
+          <p:cNvSpPr txBox="1"/>
+          <p:nvPr/>
+        </p:nvSpPr>
+        <p:spPr>
+          <a:xfrm>
+            <a:off x="4980014" y="1848493"/>
+            <a:ext cx="744114" cy="246221"/>
+          </a:xfrm>
+          <a:prstGeom prst="rect">
+            <a:avLst/>
+          </a:prstGeom>
+          <a:noFill/>
+        </p:spPr>
+        <p:txBody>
+          <a:bodyPr wrap="none" rtlCol="0">
+            <a:spAutoFit/>
+          </a:bodyPr>
+          <a:lstStyle/>
+          <a:p>
+            <a:r>
+              <a:rPr lang="en-US" sz="1000" dirty="0" err="1" smtClean="0"/>
+              <a:t>websocket</a:t>
+            </a:r>
+            <a:endParaRPr lang="en-US" sz="1000" dirty="0"/>
+          </a:p>
+        </p:txBody>
+      </p:sp>
+      <p:grpSp>
+        <p:nvGrpSpPr>
+          <p:cNvPr id="36" name="Group 35"/>
+          <p:cNvGrpSpPr/>
+          <p:nvPr/>
+        </p:nvGrpSpPr>
+        <p:grpSpPr>
+          <a:xfrm>
+            <a:off x="1191816" y="332656"/>
+            <a:ext cx="1440160" cy="917436"/>
+            <a:chOff x="1191816" y="332656"/>
+            <a:chExt cx="1440160" cy="917436"/>
+          </a:xfrm>
+        </p:grpSpPr>
+        <p:sp>
+          <p:nvSpPr>
+            <p:cNvPr id="13" name="Rectangle 12"/>
+            <p:cNvSpPr/>
+            <p:nvPr/>
+          </p:nvSpPr>
+          <p:spPr>
+            <a:xfrm>
+              <a:off x="1191816" y="332656"/>
+              <a:ext cx="1440160" cy="864096"/>
+            </a:xfrm>
+            <a:prstGeom prst="rect">
+              <a:avLst/>
+            </a:prstGeom>
+            <a:solidFill>
+              <a:srgbClr val="FFFF00"/>
+            </a:solidFill>
+          </p:spPr>
+          <p:style>
+            <a:lnRef idx="2">
+              <a:schemeClr val="accent1">
+                <a:shade val="50000"/>
+              </a:schemeClr>
+            </a:lnRef>
+            <a:fillRef idx="1">
+              <a:schemeClr val="accent1"/>
+            </a:fillRef>
+            <a:effectRef idx="0">
+              <a:schemeClr val="accent1"/>
+            </a:effectRef>
+            <a:fontRef idx="minor">
+              <a:schemeClr val="lt1"/>
+            </a:fontRef>
+          </p:style>
+          <p:txBody>
+            <a:bodyPr rtlCol="0" anchor="ctr"/>
+            <a:lstStyle/>
+            <a:p>
+              <a:pPr algn="ctr"/>
+              <a:r>
+                <a:rPr lang="en-US" sz="1200" b="1" dirty="0" smtClean="0">
+                  <a:solidFill>
+                    <a:schemeClr val="tx1"/>
+                  </a:solidFill>
+                </a:rPr>
+                <a:t>ESP-IDF compiler</a:t>
+              </a:r>
+            </a:p>
+            <a:p>
+              <a:pPr algn="ctr"/>
+              <a:r>
+                <a:rPr lang="en-US" sz="1200" b="1" dirty="0" smtClean="0">
+                  <a:solidFill>
+                    <a:schemeClr val="tx1"/>
+                  </a:solidFill>
+                </a:rPr>
+                <a:t>Windows Terminal</a:t>
+              </a:r>
+              <a:endParaRPr lang="en-US" sz="1200" b="1" dirty="0">
+                <a:solidFill>
+                  <a:schemeClr val="tx1"/>
+                </a:solidFill>
+              </a:endParaRPr>
+            </a:p>
+          </p:txBody>
+        </p:sp>
+        <p:sp>
+          <p:nvSpPr>
+            <p:cNvPr id="14" name="TextBox 13"/>
+            <p:cNvSpPr txBox="1"/>
+            <p:nvPr/>
+          </p:nvSpPr>
+          <p:spPr>
+            <a:xfrm>
+              <a:off x="1362552" y="973093"/>
+              <a:ext cx="1162626" cy="276999"/>
+            </a:xfrm>
+            <a:prstGeom prst="rect">
+              <a:avLst/>
+            </a:prstGeom>
+            <a:noFill/>
+          </p:spPr>
+          <p:txBody>
+            <a:bodyPr wrap="none" rtlCol="0">
+              <a:spAutoFit/>
+            </a:bodyPr>
+            <a:lstStyle/>
+            <a:p>
+              <a:r>
+                <a:rPr lang="en-US" sz="1200" dirty="0" smtClean="0"/>
+                <a:t>flash     monitor</a:t>
+              </a:r>
+              <a:endParaRPr lang="en-US" sz="1200" dirty="0"/>
+            </a:p>
+          </p:txBody>
+        </p:sp>
+      </p:grpSp>
+      <p:grpSp>
+        <p:nvGrpSpPr>
+          <p:cNvPr id="15" name="Group 14"/>
+          <p:cNvGrpSpPr/>
+          <p:nvPr/>
+        </p:nvGrpSpPr>
+        <p:grpSpPr>
+          <a:xfrm rot="16200000" flipH="1">
+            <a:off x="1665053" y="1196753"/>
+            <a:ext cx="432050" cy="576065"/>
+            <a:chOff x="2771797" y="2636910"/>
+            <a:chExt cx="432050" cy="576065"/>
+          </a:xfrm>
+        </p:grpSpPr>
+        <p:sp>
+          <p:nvSpPr>
+            <p:cNvPr id="16" name="Right Arrow 15"/>
+            <p:cNvSpPr/>
+            <p:nvPr/>
+          </p:nvSpPr>
+          <p:spPr>
+            <a:xfrm>
+              <a:off x="2771797" y="2636910"/>
+              <a:ext cx="432048" cy="72008"/>
+            </a:xfrm>
+            <a:prstGeom prst="rightArrow">
+              <a:avLst/>
+            </a:prstGeom>
+          </p:spPr>
+          <p:style>
+            <a:lnRef idx="2">
+              <a:schemeClr val="accent3">
+                <a:shade val="50000"/>
+              </a:schemeClr>
+            </a:lnRef>
+            <a:fillRef idx="1">
+              <a:schemeClr val="accent3"/>
+            </a:fillRef>
+            <a:effectRef idx="0">
+              <a:schemeClr val="accent3"/>
+            </a:effectRef>
+            <a:fontRef idx="minor">
+              <a:schemeClr val="lt1"/>
+            </a:fontRef>
+          </p:style>
+          <p:txBody>
+            <a:bodyPr rtlCol="0" anchor="ctr"/>
+            <a:lstStyle/>
+            <a:p>
+              <a:pPr algn="ctr"/>
+              <a:endParaRPr lang="en-US"/>
+            </a:p>
+          </p:txBody>
+        </p:sp>
+        <p:sp>
+          <p:nvSpPr>
+            <p:cNvPr id="17" name="Right Arrow 16"/>
+            <p:cNvSpPr/>
+            <p:nvPr/>
+          </p:nvSpPr>
+          <p:spPr>
+            <a:xfrm flipH="1">
+              <a:off x="2771799" y="3140967"/>
+              <a:ext cx="432048" cy="72008"/>
+            </a:xfrm>
+            <a:prstGeom prst="rightArrow">
+              <a:avLst/>
+            </a:prstGeom>
+          </p:spPr>
+          <p:style>
+            <a:lnRef idx="2">
+              <a:schemeClr val="accent3">
+                <a:shade val="50000"/>
+              </a:schemeClr>
+            </a:lnRef>
+            <a:fillRef idx="1">
+              <a:schemeClr val="accent3"/>
+            </a:fillRef>
+            <a:effectRef idx="0">
+              <a:schemeClr val="accent3"/>
+            </a:effectRef>
+            <a:fontRef idx="minor">
+              <a:schemeClr val="lt1"/>
+            </a:fontRef>
+          </p:style>
+          <p:txBody>
+            <a:bodyPr rtlCol="0" anchor="ctr"/>
+            <a:lstStyle/>
+            <a:p>
+              <a:pPr algn="ctr"/>
+              <a:endParaRPr lang="en-US"/>
+            </a:p>
+          </p:txBody>
+        </p:sp>
+      </p:grpSp>
+      <p:sp>
+        <p:nvSpPr>
+          <p:cNvPr id="18" name="TextBox 17"/>
+          <p:cNvSpPr txBox="1"/>
+          <p:nvPr/>
+        </p:nvSpPr>
+        <p:spPr>
+          <a:xfrm>
+            <a:off x="2126817" y="1382579"/>
+            <a:ext cx="788999" cy="246221"/>
+          </a:xfrm>
+          <a:prstGeom prst="rect">
+            <a:avLst/>
+          </a:prstGeom>
+          <a:noFill/>
+        </p:spPr>
+        <p:txBody>
+          <a:bodyPr wrap="none" rtlCol="0">
+            <a:spAutoFit/>
+          </a:bodyPr>
+          <a:lstStyle/>
+          <a:p>
+            <a:r>
+              <a:rPr lang="en-US" sz="1000" dirty="0" smtClean="0"/>
+              <a:t>Serial (USB)</a:t>
+            </a:r>
+            <a:endParaRPr lang="en-US" sz="1000" dirty="0"/>
+          </a:p>
+        </p:txBody>
+      </p:sp>
+      <p:sp>
+        <p:nvSpPr>
+          <p:cNvPr id="38" name="TextBox 37"/>
+          <p:cNvSpPr txBox="1"/>
+          <p:nvPr/>
+        </p:nvSpPr>
+        <p:spPr>
+          <a:xfrm>
+            <a:off x="4090804" y="3284984"/>
+            <a:ext cx="559769" cy="276999"/>
+          </a:xfrm>
+          <a:prstGeom prst="rect">
+            <a:avLst/>
+          </a:prstGeom>
+          <a:noFill/>
+        </p:spPr>
+        <p:txBody>
+          <a:bodyPr wrap="none" rtlCol="0">
+            <a:spAutoFit/>
+          </a:bodyPr>
+          <a:lstStyle/>
+          <a:p>
+            <a:r>
+              <a:rPr lang="en-US" sz="1200" dirty="0" err="1" smtClean="0"/>
+              <a:t>jsonui</a:t>
+            </a:r>
+            <a:endParaRPr lang="en-US" sz="1200" dirty="0"/>
+          </a:p>
+        </p:txBody>
+      </p:sp>
+      <p:sp>
+        <p:nvSpPr>
+          <p:cNvPr id="41" name="TextBox 40"/>
+          <p:cNvSpPr txBox="1"/>
+          <p:nvPr/>
+        </p:nvSpPr>
+        <p:spPr>
+          <a:xfrm>
+            <a:off x="1475656" y="4941168"/>
+            <a:ext cx="1205779" cy="276999"/>
+          </a:xfrm>
+          <a:prstGeom prst="rect">
+            <a:avLst/>
+          </a:prstGeom>
+          <a:noFill/>
+        </p:spPr>
+        <p:txBody>
+          <a:bodyPr wrap="none" rtlCol="0">
+            <a:spAutoFit/>
+          </a:bodyPr>
+          <a:lstStyle/>
+          <a:p>
+            <a:r>
+              <a:rPr lang="en-US" sz="1200" dirty="0" smtClean="0"/>
+              <a:t>Parameter value</a:t>
+            </a:r>
+            <a:endParaRPr lang="en-US" sz="1200" dirty="0"/>
+          </a:p>
+        </p:txBody>
+      </p:sp>
+      <p:grpSp>
+        <p:nvGrpSpPr>
+          <p:cNvPr id="84" name="Group 83"/>
+          <p:cNvGrpSpPr/>
+          <p:nvPr/>
+        </p:nvGrpSpPr>
+        <p:grpSpPr>
+          <a:xfrm>
+            <a:off x="2015736" y="4536479"/>
+            <a:ext cx="5111603" cy="1412801"/>
+            <a:chOff x="2015736" y="4536479"/>
+            <a:chExt cx="5111603" cy="1412801"/>
+          </a:xfrm>
+        </p:grpSpPr>
+        <p:sp>
+          <p:nvSpPr>
+            <p:cNvPr id="43" name="TextBox 42"/>
+            <p:cNvSpPr txBox="1"/>
+            <p:nvPr/>
+          </p:nvSpPr>
+          <p:spPr>
+            <a:xfrm>
+              <a:off x="6084168" y="5096217"/>
+              <a:ext cx="1043171" cy="276999"/>
+            </a:xfrm>
+            <a:prstGeom prst="rect">
+              <a:avLst/>
+            </a:prstGeom>
+            <a:noFill/>
+          </p:spPr>
+          <p:txBody>
+            <a:bodyPr wrap="none" rtlCol="0">
+              <a:spAutoFit/>
+            </a:bodyPr>
+            <a:lstStyle/>
+            <a:p>
+              <a:r>
+                <a:rPr lang="en-US" sz="1200" dirty="0" smtClean="0"/>
+                <a:t>Widget status</a:t>
+              </a:r>
+              <a:endParaRPr lang="en-US" sz="1200" dirty="0"/>
+            </a:p>
+          </p:txBody>
+        </p:sp>
+        <p:grpSp>
+          <p:nvGrpSpPr>
+            <p:cNvPr id="83" name="Group 82"/>
+            <p:cNvGrpSpPr/>
+            <p:nvPr/>
+          </p:nvGrpSpPr>
+          <p:grpSpPr>
+            <a:xfrm>
+              <a:off x="2015736" y="4536479"/>
+              <a:ext cx="4629256" cy="1209893"/>
+              <a:chOff x="2015736" y="4536479"/>
+              <a:chExt cx="4629256" cy="1209893"/>
+            </a:xfrm>
+          </p:grpSpPr>
+          <p:sp>
+            <p:nvSpPr>
+              <p:cNvPr id="39" name="Right Arrow 38"/>
+              <p:cNvSpPr/>
+              <p:nvPr/>
+            </p:nvSpPr>
+            <p:spPr>
+              <a:xfrm>
+                <a:off x="2339752" y="4653136"/>
+                <a:ext cx="1584000" cy="72008"/>
+              </a:xfrm>
+              <a:prstGeom prst="rightArrow">
+                <a:avLst/>
+              </a:prstGeom>
+            </p:spPr>
+            <p:style>
+              <a:lnRef idx="2">
+                <a:schemeClr val="accent5">
+                  <a:shade val="50000"/>
+                </a:schemeClr>
+              </a:lnRef>
+              <a:fillRef idx="1">
+                <a:schemeClr val="accent5"/>
+              </a:fillRef>
+              <a:effectRef idx="0">
+                <a:schemeClr val="accent5"/>
+              </a:effectRef>
+              <a:fontRef idx="minor">
+                <a:schemeClr val="lt1"/>
+              </a:fontRef>
+            </p:style>
+            <p:txBody>
+              <a:bodyPr rtlCol="0" anchor="ctr"/>
+              <a:lstStyle/>
+              <a:p>
+                <a:pPr algn="ctr"/>
+                <a:endParaRPr lang="en-US"/>
+              </a:p>
+            </p:txBody>
+          </p:sp>
+          <p:sp>
+            <p:nvSpPr>
+              <p:cNvPr id="40" name="Right Arrow 39"/>
+              <p:cNvSpPr/>
+              <p:nvPr/>
+            </p:nvSpPr>
+            <p:spPr>
+              <a:xfrm>
+                <a:off x="4644184" y="4702284"/>
+                <a:ext cx="1584000" cy="72008"/>
+              </a:xfrm>
+              <a:prstGeom prst="rightArrow">
+                <a:avLst/>
+              </a:prstGeom>
+            </p:spPr>
+            <p:style>
+              <a:lnRef idx="2">
+                <a:schemeClr val="accent6">
+                  <a:shade val="50000"/>
+                </a:schemeClr>
+              </a:lnRef>
+              <a:fillRef idx="1">
+                <a:schemeClr val="accent6"/>
+              </a:fillRef>
+              <a:effectRef idx="0">
+                <a:schemeClr val="accent6"/>
+              </a:effectRef>
+              <a:fontRef idx="minor">
+                <a:schemeClr val="lt1"/>
+              </a:fontRef>
+            </p:style>
+            <p:txBody>
+              <a:bodyPr rtlCol="0" anchor="ctr"/>
+              <a:lstStyle/>
+              <a:p>
+                <a:pPr algn="ctr"/>
+                <a:endParaRPr lang="en-US"/>
+              </a:p>
+            </p:txBody>
+          </p:sp>
+          <p:grpSp>
+            <p:nvGrpSpPr>
+              <p:cNvPr id="56" name="Group 55"/>
+              <p:cNvGrpSpPr/>
+              <p:nvPr/>
+            </p:nvGrpSpPr>
+            <p:grpSpPr>
+              <a:xfrm>
+                <a:off x="4247992" y="4603988"/>
+                <a:ext cx="252000" cy="1142384"/>
+                <a:chOff x="6084168" y="751532"/>
+                <a:chExt cx="252000" cy="1142384"/>
+              </a:xfrm>
+            </p:grpSpPr>
+            <p:sp>
+              <p:nvSpPr>
+                <p:cNvPr id="48" name="Flowchart: Magnetic Disk 47"/>
+                <p:cNvSpPr/>
+                <p:nvPr/>
+              </p:nvSpPr>
+              <p:spPr>
+                <a:xfrm>
+                  <a:off x="6084168" y="1641916"/>
+                  <a:ext cx="252000" cy="252000"/>
+                </a:xfrm>
+                <a:prstGeom prst="flowChartMagneticDisk">
+                  <a:avLst/>
+                </a:prstGeom>
+              </p:spPr>
+              <p:style>
+                <a:lnRef idx="2">
+                  <a:schemeClr val="accent1">
+                    <a:shade val="50000"/>
+                  </a:schemeClr>
+                </a:lnRef>
+                <a:fillRef idx="1">
+                  <a:schemeClr val="accent1"/>
+                </a:fillRef>
+                <a:effectRef idx="0">
+                  <a:schemeClr val="accent1"/>
+                </a:effectRef>
+                <a:fontRef idx="minor">
+                  <a:schemeClr val="lt1"/>
+                </a:fontRef>
+              </p:style>
+              <p:txBody>
+                <a:bodyPr rtlCol="0" anchor="ctr"/>
+                <a:lstStyle/>
+                <a:p>
+                  <a:pPr algn="ctr"/>
+                  <a:endParaRPr lang="en-US"/>
+                </a:p>
+              </p:txBody>
+            </p:sp>
+            <p:sp>
+              <p:nvSpPr>
+                <p:cNvPr id="51" name="Flowchart: Magnetic Disk 50"/>
+                <p:cNvSpPr/>
+                <p:nvPr/>
+              </p:nvSpPr>
+              <p:spPr>
+                <a:xfrm>
+                  <a:off x="6084168" y="751532"/>
+                  <a:ext cx="252000" cy="252000"/>
+                </a:xfrm>
+                <a:prstGeom prst="flowChartMagneticDisk">
+                  <a:avLst/>
+                </a:prstGeom>
+              </p:spPr>
+              <p:style>
+                <a:lnRef idx="2">
+                  <a:schemeClr val="accent1">
+                    <a:shade val="50000"/>
+                  </a:schemeClr>
+                </a:lnRef>
+                <a:fillRef idx="1">
+                  <a:schemeClr val="accent1"/>
+                </a:fillRef>
+                <a:effectRef idx="0">
+                  <a:schemeClr val="accent1"/>
+                </a:effectRef>
+                <a:fontRef idx="minor">
+                  <a:schemeClr val="lt1"/>
+                </a:fontRef>
+              </p:style>
+              <p:txBody>
+                <a:bodyPr rtlCol="0" anchor="ctr"/>
+                <a:lstStyle/>
+                <a:p>
+                  <a:pPr algn="ctr"/>
+                  <a:endParaRPr lang="en-US"/>
+                </a:p>
+              </p:txBody>
+            </p:sp>
+          </p:grpSp>
+          <p:grpSp>
+            <p:nvGrpSpPr>
+              <p:cNvPr id="66" name="Group 65"/>
+              <p:cNvGrpSpPr/>
+              <p:nvPr/>
+            </p:nvGrpSpPr>
+            <p:grpSpPr>
+              <a:xfrm>
+                <a:off x="2015736" y="4536479"/>
+                <a:ext cx="180000" cy="260673"/>
+                <a:chOff x="2015736" y="4536479"/>
+                <a:chExt cx="180000" cy="260673"/>
+              </a:xfrm>
+            </p:grpSpPr>
+            <p:sp>
+              <p:nvSpPr>
+                <p:cNvPr id="58" name="Curved Up Arrow 57"/>
+                <p:cNvSpPr>
+                  <a:spLocks noChangeAspect="1"/>
+                </p:cNvSpPr>
+                <p:nvPr/>
+              </p:nvSpPr>
+              <p:spPr>
+                <a:xfrm flipH="1" flipV="1">
+                  <a:off x="2015736" y="4536479"/>
+                  <a:ext cx="180000" cy="108273"/>
+                </a:xfrm>
+                <a:prstGeom prst="curvedUpArrow">
+                  <a:avLst/>
+                </a:prstGeom>
+              </p:spPr>
+              <p:style>
+                <a:lnRef idx="2">
+                  <a:schemeClr val="accent1">
+                    <a:shade val="50000"/>
+                  </a:schemeClr>
+                </a:lnRef>
+                <a:fillRef idx="1">
+                  <a:schemeClr val="accent1"/>
+                </a:fillRef>
+                <a:effectRef idx="0">
+                  <a:schemeClr val="accent1"/>
+                </a:effectRef>
+                <a:fontRef idx="minor">
+                  <a:schemeClr val="lt1"/>
+                </a:fontRef>
+              </p:style>
+              <p:txBody>
+                <a:bodyPr rtlCol="0" anchor="ctr"/>
+                <a:lstStyle/>
+                <a:p>
+                  <a:pPr algn="ctr"/>
+                  <a:endParaRPr lang="en-US">
+                    <a:solidFill>
+                      <a:schemeClr val="tx1"/>
+                    </a:solidFill>
+                  </a:endParaRPr>
+                </a:p>
+              </p:txBody>
+            </p:sp>
+            <p:sp>
+              <p:nvSpPr>
+                <p:cNvPr id="59" name="Curved Up Arrow 58"/>
+                <p:cNvSpPr>
+                  <a:spLocks noChangeAspect="1"/>
+                </p:cNvSpPr>
+                <p:nvPr/>
+              </p:nvSpPr>
+              <p:spPr>
+                <a:xfrm>
+                  <a:off x="2015736" y="4688879"/>
+                  <a:ext cx="180000" cy="108273"/>
+                </a:xfrm>
+                <a:prstGeom prst="curvedUpArrow">
+                  <a:avLst/>
+                </a:prstGeom>
+              </p:spPr>
+              <p:style>
+                <a:lnRef idx="2">
+                  <a:schemeClr val="accent1">
+                    <a:shade val="50000"/>
+                  </a:schemeClr>
+                </a:lnRef>
+                <a:fillRef idx="1">
+                  <a:schemeClr val="accent1"/>
+                </a:fillRef>
+                <a:effectRef idx="0">
+                  <a:schemeClr val="accent1"/>
+                </a:effectRef>
+                <a:fontRef idx="minor">
+                  <a:schemeClr val="lt1"/>
+                </a:fontRef>
+              </p:style>
+              <p:txBody>
+                <a:bodyPr rtlCol="0" anchor="ctr"/>
+                <a:lstStyle/>
+                <a:p>
+                  <a:pPr algn="ctr"/>
+                  <a:endParaRPr lang="en-US">
+                    <a:solidFill>
+                      <a:schemeClr val="tx1"/>
+                    </a:solidFill>
+                  </a:endParaRPr>
+                </a:p>
+              </p:txBody>
+            </p:sp>
+          </p:grpSp>
+          <p:grpSp>
+            <p:nvGrpSpPr>
+              <p:cNvPr id="69" name="Group 68"/>
+              <p:cNvGrpSpPr/>
+              <p:nvPr/>
+            </p:nvGrpSpPr>
+            <p:grpSpPr>
+              <a:xfrm>
+                <a:off x="3959952" y="4725144"/>
+                <a:ext cx="180000" cy="260673"/>
+                <a:chOff x="3959952" y="4725144"/>
+                <a:chExt cx="180000" cy="260673"/>
+              </a:xfrm>
+            </p:grpSpPr>
+            <p:sp>
+              <p:nvSpPr>
+                <p:cNvPr id="60" name="Curved Up Arrow 59"/>
+                <p:cNvSpPr>
+                  <a:spLocks noChangeAspect="1"/>
+                </p:cNvSpPr>
+                <p:nvPr/>
+              </p:nvSpPr>
+              <p:spPr>
+                <a:xfrm flipH="1" flipV="1">
+                  <a:off x="3959952" y="4725144"/>
+                  <a:ext cx="180000" cy="108273"/>
+                </a:xfrm>
+                <a:prstGeom prst="curvedUpArrow">
+                  <a:avLst/>
+                </a:prstGeom>
+              </p:spPr>
+              <p:style>
+                <a:lnRef idx="2">
+                  <a:schemeClr val="accent1">
+                    <a:shade val="50000"/>
+                  </a:schemeClr>
+                </a:lnRef>
+                <a:fillRef idx="1">
+                  <a:schemeClr val="accent1"/>
+                </a:fillRef>
+                <a:effectRef idx="0">
+                  <a:schemeClr val="accent1"/>
+                </a:effectRef>
+                <a:fontRef idx="minor">
+                  <a:schemeClr val="lt1"/>
+                </a:fontRef>
+              </p:style>
+              <p:txBody>
+                <a:bodyPr rtlCol="0" anchor="ctr"/>
+                <a:lstStyle/>
+                <a:p>
+                  <a:pPr algn="ctr"/>
+                  <a:endParaRPr lang="en-US">
+                    <a:solidFill>
+                      <a:schemeClr val="tx1"/>
+                    </a:solidFill>
+                  </a:endParaRPr>
+                </a:p>
+              </p:txBody>
+            </p:sp>
+            <p:sp>
+              <p:nvSpPr>
+                <p:cNvPr id="61" name="Curved Up Arrow 60"/>
+                <p:cNvSpPr>
+                  <a:spLocks noChangeAspect="1"/>
+                </p:cNvSpPr>
+                <p:nvPr/>
+              </p:nvSpPr>
+              <p:spPr>
+                <a:xfrm>
+                  <a:off x="3959952" y="4877544"/>
+                  <a:ext cx="180000" cy="108273"/>
+                </a:xfrm>
+                <a:prstGeom prst="curvedUpArrow">
+                  <a:avLst/>
+                </a:prstGeom>
+              </p:spPr>
+              <p:style>
+                <a:lnRef idx="2">
+                  <a:schemeClr val="accent1">
+                    <a:shade val="50000"/>
+                  </a:schemeClr>
+                </a:lnRef>
+                <a:fillRef idx="1">
+                  <a:schemeClr val="accent1"/>
+                </a:fillRef>
+                <a:effectRef idx="0">
+                  <a:schemeClr val="accent1"/>
+                </a:effectRef>
+                <a:fontRef idx="minor">
+                  <a:schemeClr val="lt1"/>
+                </a:fontRef>
+              </p:style>
+              <p:txBody>
+                <a:bodyPr rtlCol="0" anchor="ctr"/>
+                <a:lstStyle/>
+                <a:p>
+                  <a:pPr algn="ctr"/>
+                  <a:endParaRPr lang="en-US">
+                    <a:solidFill>
+                      <a:schemeClr val="tx1"/>
+                    </a:solidFill>
+                  </a:endParaRPr>
+                </a:p>
+              </p:txBody>
+            </p:sp>
+          </p:grpSp>
+          <p:grpSp>
+            <p:nvGrpSpPr>
+              <p:cNvPr id="68" name="Group 67"/>
+              <p:cNvGrpSpPr/>
+              <p:nvPr/>
+            </p:nvGrpSpPr>
+            <p:grpSpPr>
+              <a:xfrm>
+                <a:off x="6464992" y="4572744"/>
+                <a:ext cx="180000" cy="260673"/>
+                <a:chOff x="6464992" y="4572744"/>
+                <a:chExt cx="180000" cy="260673"/>
+              </a:xfrm>
+            </p:grpSpPr>
+            <p:sp>
+              <p:nvSpPr>
+                <p:cNvPr id="62" name="Curved Up Arrow 61"/>
+                <p:cNvSpPr>
+                  <a:spLocks noChangeAspect="1"/>
+                </p:cNvSpPr>
+                <p:nvPr/>
+              </p:nvSpPr>
+              <p:spPr>
+                <a:xfrm flipH="1" flipV="1">
+                  <a:off x="6464992" y="4572744"/>
+                  <a:ext cx="180000" cy="108273"/>
+                </a:xfrm>
+                <a:prstGeom prst="curvedUpArrow">
+                  <a:avLst/>
+                </a:prstGeom>
+              </p:spPr>
+              <p:style>
+                <a:lnRef idx="2">
+                  <a:schemeClr val="accent1">
+                    <a:shade val="50000"/>
+                  </a:schemeClr>
+                </a:lnRef>
+                <a:fillRef idx="1">
+                  <a:schemeClr val="accent1"/>
+                </a:fillRef>
+                <a:effectRef idx="0">
+                  <a:schemeClr val="accent1"/>
+                </a:effectRef>
+                <a:fontRef idx="minor">
+                  <a:schemeClr val="lt1"/>
+                </a:fontRef>
+              </p:style>
+              <p:txBody>
+                <a:bodyPr rtlCol="0" anchor="ctr"/>
+                <a:lstStyle/>
+                <a:p>
+                  <a:pPr algn="ctr"/>
+                  <a:endParaRPr lang="en-US">
+                    <a:solidFill>
+                      <a:schemeClr val="tx1"/>
+                    </a:solidFill>
+                  </a:endParaRPr>
+                </a:p>
+              </p:txBody>
+            </p:sp>
+            <p:sp>
+              <p:nvSpPr>
+                <p:cNvPr id="63" name="Curved Up Arrow 62"/>
+                <p:cNvSpPr>
+                  <a:spLocks noChangeAspect="1"/>
+                </p:cNvSpPr>
+                <p:nvPr/>
+              </p:nvSpPr>
+              <p:spPr>
+                <a:xfrm>
+                  <a:off x="6464992" y="4725144"/>
+                  <a:ext cx="180000" cy="108273"/>
+                </a:xfrm>
+                <a:prstGeom prst="curvedUpArrow">
+                  <a:avLst/>
+                </a:prstGeom>
+              </p:spPr>
+              <p:style>
+                <a:lnRef idx="2">
+                  <a:schemeClr val="accent1">
+                    <a:shade val="50000"/>
+                  </a:schemeClr>
+                </a:lnRef>
+                <a:fillRef idx="1">
+                  <a:schemeClr val="accent1"/>
+                </a:fillRef>
+                <a:effectRef idx="0">
+                  <a:schemeClr val="accent1"/>
+                </a:effectRef>
+                <a:fontRef idx="minor">
+                  <a:schemeClr val="lt1"/>
+                </a:fontRef>
+              </p:style>
+              <p:txBody>
+                <a:bodyPr rtlCol="0" anchor="ctr"/>
+                <a:lstStyle/>
+                <a:p>
+                  <a:pPr algn="ctr"/>
+                  <a:endParaRPr lang="en-US">
+                    <a:solidFill>
+                      <a:schemeClr val="tx1"/>
+                    </a:solidFill>
+                  </a:endParaRPr>
+                </a:p>
+              </p:txBody>
+            </p:sp>
+          </p:grpSp>
+        </p:grpSp>
+        <p:grpSp>
+          <p:nvGrpSpPr>
+            <p:cNvPr id="82" name="Group 81"/>
+            <p:cNvGrpSpPr/>
+            <p:nvPr/>
+          </p:nvGrpSpPr>
+          <p:grpSpPr>
+            <a:xfrm>
+              <a:off x="2023356" y="5472583"/>
+              <a:ext cx="4616092" cy="476697"/>
+              <a:chOff x="2023356" y="5472583"/>
+              <a:chExt cx="4616092" cy="476697"/>
+            </a:xfrm>
+          </p:grpSpPr>
+          <p:grpSp>
+            <p:nvGrpSpPr>
+              <p:cNvPr id="47" name="Group 46"/>
+              <p:cNvGrpSpPr/>
+              <p:nvPr/>
+            </p:nvGrpSpPr>
+            <p:grpSpPr>
+              <a:xfrm flipH="1">
+                <a:off x="2339752" y="5580940"/>
+                <a:ext cx="3888432" cy="80308"/>
+                <a:chOff x="2492152" y="5349676"/>
+                <a:chExt cx="3888432" cy="80308"/>
+              </a:xfrm>
+            </p:grpSpPr>
+            <p:sp>
+              <p:nvSpPr>
+                <p:cNvPr id="44" name="Right Arrow 43"/>
+                <p:cNvSpPr/>
+                <p:nvPr/>
+              </p:nvSpPr>
+              <p:spPr>
+                <a:xfrm>
+                  <a:off x="2492152" y="5349676"/>
+                  <a:ext cx="1584000" cy="72008"/>
+                </a:xfrm>
+                <a:prstGeom prst="rightArrow">
+                  <a:avLst/>
+                </a:prstGeom>
+              </p:spPr>
+              <p:style>
+                <a:lnRef idx="2">
+                  <a:schemeClr val="accent6">
+                    <a:shade val="50000"/>
+                  </a:schemeClr>
+                </a:lnRef>
+                <a:fillRef idx="1">
+                  <a:schemeClr val="accent6"/>
+                </a:fillRef>
+                <a:effectRef idx="0">
+                  <a:schemeClr val="accent6"/>
+                </a:effectRef>
+                <a:fontRef idx="minor">
+                  <a:schemeClr val="lt1"/>
+                </a:fontRef>
+              </p:style>
+              <p:txBody>
+                <a:bodyPr rtlCol="0" anchor="ctr"/>
+                <a:lstStyle/>
+                <a:p>
+                  <a:pPr algn="ctr"/>
+                  <a:endParaRPr lang="en-US"/>
+                </a:p>
+              </p:txBody>
+            </p:sp>
+            <p:sp>
+              <p:nvSpPr>
+                <p:cNvPr id="45" name="Right Arrow 44"/>
+                <p:cNvSpPr/>
+                <p:nvPr/>
+              </p:nvSpPr>
+              <p:spPr>
+                <a:xfrm>
+                  <a:off x="4796584" y="5357976"/>
+                  <a:ext cx="1584000" cy="72008"/>
+                </a:xfrm>
+                <a:prstGeom prst="rightArrow">
+                  <a:avLst/>
+                </a:prstGeom>
+              </p:spPr>
+              <p:style>
+                <a:lnRef idx="2">
+                  <a:schemeClr val="accent5">
+                    <a:shade val="50000"/>
+                  </a:schemeClr>
+                </a:lnRef>
+                <a:fillRef idx="1">
+                  <a:schemeClr val="accent5"/>
+                </a:fillRef>
+                <a:effectRef idx="0">
+                  <a:schemeClr val="accent5"/>
+                </a:effectRef>
+                <a:fontRef idx="minor">
+                  <a:schemeClr val="lt1"/>
+                </a:fontRef>
+              </p:style>
+              <p:txBody>
+                <a:bodyPr rtlCol="0" anchor="ctr"/>
+                <a:lstStyle/>
+                <a:p>
+                  <a:pPr algn="ctr"/>
+                  <a:endParaRPr lang="en-US"/>
+                </a:p>
+              </p:txBody>
+            </p:sp>
+          </p:grpSp>
+          <p:grpSp>
+            <p:nvGrpSpPr>
+              <p:cNvPr id="67" name="Group 66"/>
+              <p:cNvGrpSpPr/>
+              <p:nvPr/>
+            </p:nvGrpSpPr>
+            <p:grpSpPr>
+              <a:xfrm>
+                <a:off x="2023356" y="5472583"/>
+                <a:ext cx="180000" cy="260673"/>
+                <a:chOff x="2023356" y="5472583"/>
+                <a:chExt cx="180000" cy="260673"/>
+              </a:xfrm>
+            </p:grpSpPr>
+            <p:sp>
+              <p:nvSpPr>
+                <p:cNvPr id="64" name="Curved Up Arrow 63"/>
+                <p:cNvSpPr>
+                  <a:spLocks noChangeAspect="1"/>
+                </p:cNvSpPr>
+                <p:nvPr/>
+              </p:nvSpPr>
+              <p:spPr>
+                <a:xfrm flipH="1" flipV="1">
+                  <a:off x="2023356" y="5472583"/>
+                  <a:ext cx="180000" cy="108273"/>
+                </a:xfrm>
+                <a:prstGeom prst="curvedUpArrow">
+                  <a:avLst/>
+                </a:prstGeom>
+              </p:spPr>
+              <p:style>
+                <a:lnRef idx="2">
+                  <a:schemeClr val="accent1">
+                    <a:shade val="50000"/>
+                  </a:schemeClr>
+                </a:lnRef>
+                <a:fillRef idx="1">
+                  <a:schemeClr val="accent1"/>
+                </a:fillRef>
+                <a:effectRef idx="0">
+                  <a:schemeClr val="accent1"/>
+                </a:effectRef>
+                <a:fontRef idx="minor">
+                  <a:schemeClr val="lt1"/>
+                </a:fontRef>
+              </p:style>
+              <p:txBody>
+                <a:bodyPr rtlCol="0" anchor="ctr"/>
+                <a:lstStyle/>
+                <a:p>
+                  <a:pPr algn="ctr"/>
+                  <a:endParaRPr lang="en-US">
+                    <a:solidFill>
+                      <a:schemeClr val="tx1"/>
+                    </a:solidFill>
+                  </a:endParaRPr>
+                </a:p>
+              </p:txBody>
+            </p:sp>
+            <p:sp>
+              <p:nvSpPr>
+                <p:cNvPr id="65" name="Curved Up Arrow 64"/>
+                <p:cNvSpPr>
+                  <a:spLocks noChangeAspect="1"/>
+                </p:cNvSpPr>
+                <p:nvPr/>
+              </p:nvSpPr>
+              <p:spPr>
+                <a:xfrm>
+                  <a:off x="2023356" y="5624983"/>
+                  <a:ext cx="180000" cy="108273"/>
+                </a:xfrm>
+                <a:prstGeom prst="curvedUpArrow">
+                  <a:avLst/>
+                </a:prstGeom>
+              </p:spPr>
+              <p:style>
+                <a:lnRef idx="2">
+                  <a:schemeClr val="accent1">
+                    <a:shade val="50000"/>
+                  </a:schemeClr>
+                </a:lnRef>
+                <a:fillRef idx="1">
+                  <a:schemeClr val="accent1"/>
+                </a:fillRef>
+                <a:effectRef idx="0">
+                  <a:schemeClr val="accent1"/>
+                </a:effectRef>
+                <a:fontRef idx="minor">
+                  <a:schemeClr val="lt1"/>
+                </a:fontRef>
+              </p:style>
+              <p:txBody>
+                <a:bodyPr rtlCol="0" anchor="ctr"/>
+                <a:lstStyle/>
+                <a:p>
+                  <a:pPr algn="ctr"/>
+                  <a:endParaRPr lang="en-US">
+                    <a:solidFill>
+                      <a:schemeClr val="tx1"/>
+                    </a:solidFill>
+                  </a:endParaRPr>
+                </a:p>
+              </p:txBody>
+            </p:sp>
+          </p:grpSp>
+          <p:grpSp>
+            <p:nvGrpSpPr>
+              <p:cNvPr id="70" name="Group 69"/>
+              <p:cNvGrpSpPr/>
+              <p:nvPr/>
+            </p:nvGrpSpPr>
+            <p:grpSpPr>
+              <a:xfrm>
+                <a:off x="6459448" y="5487823"/>
+                <a:ext cx="180000" cy="260673"/>
+                <a:chOff x="6464992" y="4788768"/>
+                <a:chExt cx="180000" cy="260673"/>
+              </a:xfrm>
+            </p:grpSpPr>
+            <p:sp>
+              <p:nvSpPr>
+                <p:cNvPr id="71" name="Curved Up Arrow 70"/>
+                <p:cNvSpPr>
+                  <a:spLocks noChangeAspect="1"/>
+                </p:cNvSpPr>
+                <p:nvPr/>
+              </p:nvSpPr>
+              <p:spPr>
+                <a:xfrm flipH="1" flipV="1">
+                  <a:off x="6464992" y="4788768"/>
+                  <a:ext cx="180000" cy="108273"/>
+                </a:xfrm>
+                <a:prstGeom prst="curvedUpArrow">
+                  <a:avLst/>
+                </a:prstGeom>
+              </p:spPr>
+              <p:style>
+                <a:lnRef idx="2">
+                  <a:schemeClr val="accent1">
+                    <a:shade val="50000"/>
+                  </a:schemeClr>
+                </a:lnRef>
+                <a:fillRef idx="1">
+                  <a:schemeClr val="accent1"/>
+                </a:fillRef>
+                <a:effectRef idx="0">
+                  <a:schemeClr val="accent1"/>
+                </a:effectRef>
+                <a:fontRef idx="minor">
+                  <a:schemeClr val="lt1"/>
+                </a:fontRef>
+              </p:style>
+              <p:txBody>
+                <a:bodyPr rtlCol="0" anchor="ctr"/>
+                <a:lstStyle/>
+                <a:p>
+                  <a:pPr algn="ctr"/>
+                  <a:endParaRPr lang="en-US">
+                    <a:solidFill>
+                      <a:schemeClr val="tx1"/>
+                    </a:solidFill>
+                  </a:endParaRPr>
+                </a:p>
+              </p:txBody>
+            </p:sp>
+            <p:sp>
+              <p:nvSpPr>
+                <p:cNvPr id="72" name="Curved Up Arrow 71"/>
+                <p:cNvSpPr>
+                  <a:spLocks noChangeAspect="1"/>
+                </p:cNvSpPr>
+                <p:nvPr/>
+              </p:nvSpPr>
+              <p:spPr>
+                <a:xfrm>
+                  <a:off x="6464992" y="4941168"/>
+                  <a:ext cx="180000" cy="108273"/>
+                </a:xfrm>
+                <a:prstGeom prst="curvedUpArrow">
+                  <a:avLst/>
+                </a:prstGeom>
+              </p:spPr>
+              <p:style>
+                <a:lnRef idx="2">
+                  <a:schemeClr val="accent1">
+                    <a:shade val="50000"/>
+                  </a:schemeClr>
+                </a:lnRef>
+                <a:fillRef idx="1">
+                  <a:schemeClr val="accent1"/>
+                </a:fillRef>
+                <a:effectRef idx="0">
+                  <a:schemeClr val="accent1"/>
+                </a:effectRef>
+                <a:fontRef idx="minor">
+                  <a:schemeClr val="lt1"/>
+                </a:fontRef>
+              </p:style>
+              <p:txBody>
+                <a:bodyPr rtlCol="0" anchor="ctr"/>
+                <a:lstStyle/>
+                <a:p>
+                  <a:pPr algn="ctr"/>
+                  <a:endParaRPr lang="en-US">
+                    <a:solidFill>
+                      <a:schemeClr val="tx1"/>
+                    </a:solidFill>
+                  </a:endParaRPr>
+                </a:p>
+              </p:txBody>
+            </p:sp>
+          </p:grpSp>
+          <p:grpSp>
+            <p:nvGrpSpPr>
+              <p:cNvPr id="73" name="Group 72"/>
+              <p:cNvGrpSpPr/>
+              <p:nvPr/>
+            </p:nvGrpSpPr>
+            <p:grpSpPr>
+              <a:xfrm>
+                <a:off x="4536016" y="5688607"/>
+                <a:ext cx="180000" cy="260673"/>
+                <a:chOff x="3895564" y="4956408"/>
+                <a:chExt cx="180000" cy="260673"/>
+              </a:xfrm>
+            </p:grpSpPr>
+            <p:sp>
+              <p:nvSpPr>
+                <p:cNvPr id="74" name="Curved Up Arrow 73"/>
+                <p:cNvSpPr>
+                  <a:spLocks noChangeAspect="1"/>
+                </p:cNvSpPr>
+                <p:nvPr/>
+              </p:nvSpPr>
+              <p:spPr>
+                <a:xfrm flipH="1" flipV="1">
+                  <a:off x="3895564" y="4956408"/>
+                  <a:ext cx="180000" cy="108273"/>
+                </a:xfrm>
+                <a:prstGeom prst="curvedUpArrow">
+                  <a:avLst/>
+                </a:prstGeom>
+              </p:spPr>
+              <p:style>
+                <a:lnRef idx="2">
+                  <a:schemeClr val="accent1">
+                    <a:shade val="50000"/>
+                  </a:schemeClr>
+                </a:lnRef>
+                <a:fillRef idx="1">
+                  <a:schemeClr val="accent1"/>
+                </a:fillRef>
+                <a:effectRef idx="0">
+                  <a:schemeClr val="accent1"/>
+                </a:effectRef>
+                <a:fontRef idx="minor">
+                  <a:schemeClr val="lt1"/>
+                </a:fontRef>
+              </p:style>
+              <p:txBody>
+                <a:bodyPr rtlCol="0" anchor="ctr"/>
+                <a:lstStyle/>
+                <a:p>
+                  <a:pPr algn="ctr"/>
+                  <a:endParaRPr lang="en-US">
+                    <a:solidFill>
+                      <a:schemeClr val="tx1"/>
+                    </a:solidFill>
+                  </a:endParaRPr>
+                </a:p>
+              </p:txBody>
+            </p:sp>
+            <p:sp>
+              <p:nvSpPr>
+                <p:cNvPr id="75" name="Curved Up Arrow 74"/>
+                <p:cNvSpPr>
+                  <a:spLocks noChangeAspect="1"/>
+                </p:cNvSpPr>
+                <p:nvPr/>
+              </p:nvSpPr>
+              <p:spPr>
+                <a:xfrm>
+                  <a:off x="3895564" y="5108808"/>
+                  <a:ext cx="180000" cy="108273"/>
+                </a:xfrm>
+                <a:prstGeom prst="curvedUpArrow">
+                  <a:avLst/>
+                </a:prstGeom>
+              </p:spPr>
+              <p:style>
+                <a:lnRef idx="2">
+                  <a:schemeClr val="accent1">
+                    <a:shade val="50000"/>
+                  </a:schemeClr>
+                </a:lnRef>
+                <a:fillRef idx="1">
+                  <a:schemeClr val="accent1"/>
+                </a:fillRef>
+                <a:effectRef idx="0">
+                  <a:schemeClr val="accent1"/>
+                </a:effectRef>
+                <a:fontRef idx="minor">
+                  <a:schemeClr val="lt1"/>
+                </a:fontRef>
+              </p:style>
+              <p:txBody>
+                <a:bodyPr rtlCol="0" anchor="ctr"/>
+                <a:lstStyle/>
+                <a:p>
+                  <a:pPr algn="ctr"/>
+                  <a:endParaRPr lang="en-US">
+                    <a:solidFill>
+                      <a:schemeClr val="tx1"/>
+                    </a:solidFill>
+                  </a:endParaRPr>
+                </a:p>
+              </p:txBody>
+            </p:sp>
+          </p:grpSp>
+        </p:grpSp>
+      </p:grpSp>
+      <p:sp>
+        <p:nvSpPr>
+          <p:cNvPr id="76" name="TextBox 75"/>
+          <p:cNvSpPr txBox="1"/>
+          <p:nvPr/>
+        </p:nvSpPr>
+        <p:spPr>
+          <a:xfrm>
+            <a:off x="6178247" y="3345165"/>
+            <a:ext cx="842025" cy="276999"/>
+          </a:xfrm>
+          <a:prstGeom prst="rect">
+            <a:avLst/>
+          </a:prstGeom>
+          <a:noFill/>
+        </p:spPr>
+        <p:txBody>
+          <a:bodyPr wrap="none" rtlCol="0">
+            <a:spAutoFit/>
+          </a:bodyPr>
+          <a:lstStyle/>
+          <a:p>
+            <a:r>
+              <a:rPr lang="en-US" sz="1200" dirty="0" smtClean="0"/>
+              <a:t>GUI layout</a:t>
+            </a:r>
+            <a:endParaRPr lang="en-US" sz="1200" dirty="0"/>
+          </a:p>
+        </p:txBody>
+      </p:sp>
+      <p:grpSp>
+        <p:nvGrpSpPr>
+          <p:cNvPr id="80" name="Group 79"/>
+          <p:cNvGrpSpPr/>
+          <p:nvPr/>
+        </p:nvGrpSpPr>
+        <p:grpSpPr>
+          <a:xfrm>
+            <a:off x="1043608" y="3068960"/>
+            <a:ext cx="5688632" cy="504056"/>
+            <a:chOff x="1043608" y="3068960"/>
+            <a:chExt cx="5688632" cy="504056"/>
+          </a:xfrm>
+        </p:grpSpPr>
+        <p:grpSp>
+          <p:nvGrpSpPr>
+            <p:cNvPr id="37" name="Group 36"/>
+            <p:cNvGrpSpPr/>
+            <p:nvPr/>
+          </p:nvGrpSpPr>
+          <p:grpSpPr>
+            <a:xfrm>
+              <a:off x="1187624" y="3068960"/>
+              <a:ext cx="5544616" cy="288032"/>
+              <a:chOff x="1187624" y="3068960"/>
+              <a:chExt cx="5544616" cy="288032"/>
+            </a:xfrm>
+          </p:grpSpPr>
+          <p:sp>
+            <p:nvSpPr>
+              <p:cNvPr id="20" name="TextBox 19"/>
+              <p:cNvSpPr txBox="1"/>
+              <p:nvPr/>
+            </p:nvSpPr>
+            <p:spPr>
+              <a:xfrm>
+                <a:off x="1187624" y="3068960"/>
+                <a:ext cx="593432" cy="276999"/>
+              </a:xfrm>
+              <a:prstGeom prst="rect">
+                <a:avLst/>
+              </a:prstGeom>
+              <a:noFill/>
+            </p:spPr>
+            <p:txBody>
+              <a:bodyPr wrap="none" rtlCol="0">
+                <a:spAutoFit/>
+              </a:bodyPr>
+              <a:lstStyle/>
+              <a:p>
+                <a:r>
+                  <a:rPr lang="en-US" sz="1200" dirty="0" err="1" smtClean="0"/>
+                  <a:t>Dsp</a:t>
+                </a:r>
+                <a:r>
+                  <a:rPr lang="en-US" sz="1200" dirty="0" smtClean="0"/>
+                  <a:t> UI</a:t>
+                </a:r>
+                <a:endParaRPr lang="en-US" sz="1200" dirty="0"/>
+              </a:p>
+            </p:txBody>
+          </p:sp>
+          <p:sp>
+            <p:nvSpPr>
+              <p:cNvPr id="21" name="Flowchart: Magnetic Disk 20"/>
+              <p:cNvSpPr/>
+              <p:nvPr/>
+            </p:nvSpPr>
+            <p:spPr>
+              <a:xfrm>
+                <a:off x="4247992" y="3068960"/>
+                <a:ext cx="252000" cy="252000"/>
+              </a:xfrm>
+              <a:prstGeom prst="flowChartMagneticDisk">
+                <a:avLst/>
+              </a:prstGeom>
+            </p:spPr>
+            <p:style>
+              <a:lnRef idx="2">
+                <a:schemeClr val="accent1">
+                  <a:shade val="50000"/>
+                </a:schemeClr>
+              </a:lnRef>
+              <a:fillRef idx="1">
+                <a:schemeClr val="accent1"/>
+              </a:fillRef>
+              <a:effectRef idx="0">
+                <a:schemeClr val="accent1"/>
+              </a:effectRef>
+              <a:fontRef idx="minor">
+                <a:schemeClr val="lt1"/>
+              </a:fontRef>
+            </p:style>
+            <p:txBody>
+              <a:bodyPr rtlCol="0" anchor="ctr"/>
+              <a:lstStyle/>
+              <a:p>
+                <a:pPr algn="ctr"/>
+                <a:endParaRPr lang="en-US"/>
+              </a:p>
+            </p:txBody>
+          </p:sp>
+          <p:sp>
+            <p:nvSpPr>
+              <p:cNvPr id="23" name="Explosion 1 22"/>
+              <p:cNvSpPr/>
+              <p:nvPr/>
+            </p:nvSpPr>
+            <p:spPr>
+              <a:xfrm>
+                <a:off x="1763688" y="3068960"/>
+                <a:ext cx="252000" cy="252000"/>
+              </a:xfrm>
+              <a:prstGeom prst="irregularSeal1">
+                <a:avLst/>
+              </a:prstGeom>
+              <a:solidFill>
+                <a:srgbClr val="FF0000"/>
+              </a:solidFill>
+              <a:ln w="12700">
+                <a:solidFill>
+                  <a:schemeClr val="tx1"/>
+                </a:solidFill>
+              </a:ln>
+            </p:spPr>
+            <p:style>
+              <a:lnRef idx="2">
+                <a:schemeClr val="accent1">
+                  <a:shade val="50000"/>
+                </a:schemeClr>
+              </a:lnRef>
+              <a:fillRef idx="1">
+                <a:schemeClr val="accent1"/>
+              </a:fillRef>
+              <a:effectRef idx="0">
+                <a:schemeClr val="accent1"/>
+              </a:effectRef>
+              <a:fontRef idx="minor">
+                <a:schemeClr val="lt1"/>
+              </a:fontRef>
+            </p:style>
+            <p:txBody>
+              <a:bodyPr rtlCol="0" anchor="ctr"/>
+              <a:lstStyle/>
+              <a:p>
+                <a:pPr algn="ctr"/>
+                <a:endParaRPr lang="en-US"/>
+              </a:p>
+            </p:txBody>
+          </p:sp>
+          <p:sp>
+            <p:nvSpPr>
+              <p:cNvPr id="25" name="Right Arrow 24"/>
+              <p:cNvSpPr/>
+              <p:nvPr/>
+            </p:nvSpPr>
+            <p:spPr>
+              <a:xfrm>
+                <a:off x="2339752" y="3158956"/>
+                <a:ext cx="1584000" cy="72008"/>
+              </a:xfrm>
+              <a:prstGeom prst="rightArrow">
+                <a:avLst/>
+              </a:prstGeom>
+            </p:spPr>
+            <p:style>
+              <a:lnRef idx="2">
+                <a:schemeClr val="accent5">
+                  <a:shade val="50000"/>
+                </a:schemeClr>
+              </a:lnRef>
+              <a:fillRef idx="1">
+                <a:schemeClr val="accent5"/>
+              </a:fillRef>
+              <a:effectRef idx="0">
+                <a:schemeClr val="accent5"/>
+              </a:effectRef>
+              <a:fontRef idx="minor">
+                <a:schemeClr val="lt1"/>
+              </a:fontRef>
+            </p:style>
+            <p:txBody>
+              <a:bodyPr rtlCol="0" anchor="ctr"/>
+              <a:lstStyle/>
+              <a:p>
+                <a:pPr algn="ctr"/>
+                <a:endParaRPr lang="en-US"/>
+              </a:p>
+            </p:txBody>
+          </p:sp>
+          <p:sp>
+            <p:nvSpPr>
+              <p:cNvPr id="30" name="Horizontal Scroll 29"/>
+              <p:cNvSpPr/>
+              <p:nvPr/>
+            </p:nvSpPr>
+            <p:spPr>
+              <a:xfrm>
+                <a:off x="6372200" y="3068960"/>
+                <a:ext cx="360040" cy="288032"/>
+              </a:xfrm>
+              <a:prstGeom prst="horizontalScroll">
+                <a:avLst/>
+              </a:prstGeom>
+              <a:solidFill>
+                <a:srgbClr val="00B0F0"/>
+              </a:solidFill>
+              <a:ln>
+                <a:solidFill>
+                  <a:schemeClr val="tx1"/>
+                </a:solidFill>
+              </a:ln>
+            </p:spPr>
+            <p:style>
+              <a:lnRef idx="2">
+                <a:schemeClr val="accent5">
+                  <a:shade val="50000"/>
+                </a:schemeClr>
+              </a:lnRef>
+              <a:fillRef idx="1">
+                <a:schemeClr val="accent5"/>
+              </a:fillRef>
+              <a:effectRef idx="0">
+                <a:schemeClr val="accent5"/>
+              </a:effectRef>
+              <a:fontRef idx="minor">
+                <a:schemeClr val="lt1"/>
+              </a:fontRef>
+            </p:style>
+            <p:txBody>
+              <a:bodyPr rtlCol="0" anchor="ctr"/>
+              <a:lstStyle/>
+              <a:p>
+                <a:pPr algn="ctr"/>
+                <a:endParaRPr lang="en-US"/>
+              </a:p>
+            </p:txBody>
+          </p:sp>
+          <p:sp>
+            <p:nvSpPr>
+              <p:cNvPr id="34" name="Right Arrow 33"/>
+              <p:cNvSpPr/>
+              <p:nvPr/>
+            </p:nvSpPr>
+            <p:spPr>
+              <a:xfrm>
+                <a:off x="4644184" y="3182496"/>
+                <a:ext cx="1584000" cy="72008"/>
+              </a:xfrm>
+              <a:prstGeom prst="rightArrow">
+                <a:avLst/>
+              </a:prstGeom>
+            </p:spPr>
+            <p:style>
+              <a:lnRef idx="2">
+                <a:schemeClr val="accent6">
+                  <a:shade val="50000"/>
+                </a:schemeClr>
+              </a:lnRef>
+              <a:fillRef idx="1">
+                <a:schemeClr val="accent6"/>
+              </a:fillRef>
+              <a:effectRef idx="0">
+                <a:schemeClr val="accent6"/>
+              </a:effectRef>
+              <a:fontRef idx="minor">
+                <a:schemeClr val="lt1"/>
+              </a:fontRef>
+            </p:style>
+            <p:txBody>
+              <a:bodyPr rtlCol="0" anchor="ctr"/>
+              <a:lstStyle/>
+              <a:p>
+                <a:pPr algn="ctr"/>
+                <a:endParaRPr lang="en-US"/>
+              </a:p>
+            </p:txBody>
+          </p:sp>
+        </p:grpSp>
+        <p:sp>
+          <p:nvSpPr>
+            <p:cNvPr id="77" name="TextBox 76"/>
+            <p:cNvSpPr txBox="1"/>
+            <p:nvPr/>
+          </p:nvSpPr>
+          <p:spPr>
+            <a:xfrm>
+              <a:off x="1043608" y="3296017"/>
+              <a:ext cx="786049" cy="276999"/>
+            </a:xfrm>
+            <a:prstGeom prst="rect">
+              <a:avLst/>
+            </a:prstGeom>
+            <a:noFill/>
+          </p:spPr>
+          <p:txBody>
+            <a:bodyPr wrap="none" rtlCol="0">
+              <a:spAutoFit/>
+            </a:bodyPr>
+            <a:lstStyle/>
+            <a:p>
+              <a:r>
+                <a:rPr lang="en-US" sz="1200" dirty="0" smtClean="0"/>
+                <a:t>definition</a:t>
+              </a:r>
+              <a:endParaRPr lang="en-US" sz="1200" dirty="0"/>
+            </a:p>
+          </p:txBody>
+        </p:sp>
+      </p:grpSp>
+      <p:grpSp>
+        <p:nvGrpSpPr>
+          <p:cNvPr id="81" name="Group 80"/>
+          <p:cNvGrpSpPr/>
+          <p:nvPr/>
+        </p:nvGrpSpPr>
+        <p:grpSpPr>
+          <a:xfrm>
+            <a:off x="2802393" y="3573016"/>
+            <a:ext cx="3929847" cy="565031"/>
+            <a:chOff x="2802393" y="3573016"/>
+            <a:chExt cx="3929847" cy="565031"/>
+          </a:xfrm>
+        </p:grpSpPr>
+        <p:sp>
+          <p:nvSpPr>
+            <p:cNvPr id="26" name="Flowchart: Magnetic Disk 25"/>
+            <p:cNvSpPr/>
+            <p:nvPr/>
+          </p:nvSpPr>
+          <p:spPr>
+            <a:xfrm>
+              <a:off x="4247992" y="3609048"/>
+              <a:ext cx="252000" cy="252000"/>
+            </a:xfrm>
+            <a:prstGeom prst="flowChartMagneticDisk">
+              <a:avLst/>
+            </a:prstGeom>
+          </p:spPr>
+          <p:style>
+            <a:lnRef idx="2">
+              <a:schemeClr val="accent1">
+                <a:shade val="50000"/>
+              </a:schemeClr>
+            </a:lnRef>
+            <a:fillRef idx="1">
+              <a:schemeClr val="accent1"/>
+            </a:fillRef>
+            <a:effectRef idx="0">
+              <a:schemeClr val="accent1"/>
+            </a:effectRef>
+            <a:fontRef idx="minor">
+              <a:schemeClr val="lt1"/>
+            </a:fontRef>
+          </p:style>
+          <p:txBody>
+            <a:bodyPr rtlCol="0" anchor="ctr"/>
+            <a:lstStyle/>
+            <a:p>
+              <a:pPr algn="ctr"/>
+              <a:endParaRPr lang="en-US"/>
+            </a:p>
+          </p:txBody>
+        </p:sp>
+        <p:sp>
+          <p:nvSpPr>
+            <p:cNvPr id="27" name="Explosion 1 26"/>
+            <p:cNvSpPr/>
+            <p:nvPr/>
+          </p:nvSpPr>
+          <p:spPr>
+            <a:xfrm>
+              <a:off x="3915600" y="3609048"/>
+              <a:ext cx="252000" cy="252000"/>
+            </a:xfrm>
+            <a:prstGeom prst="irregularSeal1">
+              <a:avLst/>
+            </a:prstGeom>
+            <a:solidFill>
+              <a:srgbClr val="FF0000"/>
+            </a:solidFill>
+            <a:ln w="12700">
+              <a:solidFill>
+                <a:schemeClr val="tx1"/>
+              </a:solidFill>
+            </a:ln>
+          </p:spPr>
+          <p:style>
+            <a:lnRef idx="2">
+              <a:schemeClr val="accent1">
+                <a:shade val="50000"/>
+              </a:schemeClr>
+            </a:lnRef>
+            <a:fillRef idx="1">
+              <a:schemeClr val="accent1"/>
+            </a:fillRef>
+            <a:effectRef idx="0">
+              <a:schemeClr val="accent1"/>
+            </a:effectRef>
+            <a:fontRef idx="minor">
+              <a:schemeClr val="lt1"/>
+            </a:fontRef>
+          </p:style>
+          <p:txBody>
+            <a:bodyPr rtlCol="0" anchor="ctr"/>
+            <a:lstStyle/>
+            <a:p>
+              <a:pPr algn="ctr"/>
+              <a:endParaRPr lang="en-US"/>
+            </a:p>
+          </p:txBody>
+        </p:sp>
+        <p:sp>
+          <p:nvSpPr>
+            <p:cNvPr id="28" name="TextBox 27"/>
+            <p:cNvSpPr txBox="1"/>
+            <p:nvPr/>
+          </p:nvSpPr>
+          <p:spPr>
+            <a:xfrm>
+              <a:off x="3995936" y="3861048"/>
+              <a:ext cx="848309" cy="276999"/>
+            </a:xfrm>
+            <a:prstGeom prst="rect">
+              <a:avLst/>
+            </a:prstGeom>
+            <a:noFill/>
+          </p:spPr>
+          <p:txBody>
+            <a:bodyPr wrap="none" rtlCol="0">
+              <a:spAutoFit/>
+            </a:bodyPr>
+            <a:lstStyle/>
+            <a:p>
+              <a:r>
+                <a:rPr lang="en-US" sz="1200" dirty="0" smtClean="0"/>
+                <a:t>wm8978ui</a:t>
+              </a:r>
+              <a:endParaRPr lang="en-US" sz="1200" dirty="0"/>
+            </a:p>
+          </p:txBody>
+        </p:sp>
+        <p:sp>
+          <p:nvSpPr>
+            <p:cNvPr id="31" name="TextBox 30"/>
+            <p:cNvSpPr txBox="1"/>
+            <p:nvPr/>
+          </p:nvSpPr>
+          <p:spPr>
+            <a:xfrm>
+              <a:off x="2802393" y="3599304"/>
+              <a:ext cx="1129155" cy="276999"/>
+            </a:xfrm>
+            <a:prstGeom prst="rect">
+              <a:avLst/>
+            </a:prstGeom>
+            <a:noFill/>
+          </p:spPr>
+          <p:txBody>
+            <a:bodyPr wrap="none" rtlCol="0">
+              <a:spAutoFit/>
+            </a:bodyPr>
+            <a:lstStyle/>
+            <a:p>
+              <a:r>
+                <a:rPr lang="en-US" sz="1200" dirty="0" smtClean="0"/>
+                <a:t>Audio codec UI</a:t>
+              </a:r>
+              <a:endParaRPr lang="en-US" sz="1200" dirty="0"/>
+            </a:p>
+          </p:txBody>
+        </p:sp>
+        <p:sp>
+          <p:nvSpPr>
+            <p:cNvPr id="32" name="Horizontal Scroll 31"/>
+            <p:cNvSpPr/>
+            <p:nvPr/>
+          </p:nvSpPr>
+          <p:spPr>
+            <a:xfrm>
+              <a:off x="6372200" y="3573016"/>
+              <a:ext cx="360040" cy="288032"/>
+            </a:xfrm>
+            <a:prstGeom prst="horizontalScroll">
+              <a:avLst/>
+            </a:prstGeom>
+            <a:solidFill>
+              <a:srgbClr val="00B0F0"/>
+            </a:solidFill>
+            <a:ln>
+              <a:solidFill>
+                <a:schemeClr val="tx1"/>
+              </a:solidFill>
+            </a:ln>
+          </p:spPr>
+          <p:style>
+            <a:lnRef idx="2">
+              <a:schemeClr val="accent5">
+                <a:shade val="50000"/>
+              </a:schemeClr>
+            </a:lnRef>
+            <a:fillRef idx="1">
+              <a:schemeClr val="accent5"/>
+            </a:fillRef>
+            <a:effectRef idx="0">
+              <a:schemeClr val="accent5"/>
+            </a:effectRef>
+            <a:fontRef idx="minor">
+              <a:schemeClr val="lt1"/>
+            </a:fontRef>
+          </p:style>
+          <p:txBody>
+            <a:bodyPr rtlCol="0" anchor="ctr"/>
+            <a:lstStyle/>
+            <a:p>
+              <a:pPr algn="ctr"/>
+              <a:endParaRPr lang="en-US"/>
+            </a:p>
+          </p:txBody>
+        </p:sp>
+        <p:sp>
+          <p:nvSpPr>
+            <p:cNvPr id="35" name="Right Arrow 34"/>
+            <p:cNvSpPr/>
+            <p:nvPr/>
+          </p:nvSpPr>
+          <p:spPr>
+            <a:xfrm>
+              <a:off x="4636388" y="3686552"/>
+              <a:ext cx="1584000" cy="72008"/>
+            </a:xfrm>
+            <a:prstGeom prst="rightArrow">
+              <a:avLst/>
+            </a:prstGeom>
+          </p:spPr>
+          <p:style>
+            <a:lnRef idx="2">
+              <a:schemeClr val="accent6">
+                <a:shade val="50000"/>
+              </a:schemeClr>
+            </a:lnRef>
+            <a:fillRef idx="1">
+              <a:schemeClr val="accent6"/>
+            </a:fillRef>
+            <a:effectRef idx="0">
+              <a:schemeClr val="accent6"/>
+            </a:effectRef>
+            <a:fontRef idx="minor">
+              <a:schemeClr val="lt1"/>
+            </a:fontRef>
+          </p:style>
+          <p:txBody>
+            <a:bodyPr rtlCol="0" anchor="ctr"/>
+            <a:lstStyle/>
+            <a:p>
+              <a:pPr algn="ctr"/>
+              <a:endParaRPr lang="en-US"/>
+            </a:p>
+          </p:txBody>
+        </p:sp>
+        <p:sp>
+          <p:nvSpPr>
+            <p:cNvPr id="78" name="TextBox 77"/>
+            <p:cNvSpPr txBox="1"/>
+            <p:nvPr/>
+          </p:nvSpPr>
+          <p:spPr>
+            <a:xfrm>
+              <a:off x="2971003" y="3789040"/>
+              <a:ext cx="786049" cy="276999"/>
+            </a:xfrm>
+            <a:prstGeom prst="rect">
+              <a:avLst/>
+            </a:prstGeom>
+            <a:noFill/>
+          </p:spPr>
+          <p:txBody>
+            <a:bodyPr wrap="none" rtlCol="0">
+              <a:spAutoFit/>
+            </a:bodyPr>
+            <a:lstStyle/>
+            <a:p>
+              <a:r>
+                <a:rPr lang="en-US" sz="1200" dirty="0" smtClean="0"/>
+                <a:t>definition</a:t>
+              </a:r>
+              <a:endParaRPr lang="en-US" sz="1200" dirty="0"/>
+            </a:p>
+          </p:txBody>
+        </p:sp>
+      </p:grpSp>
+      <p:sp>
+        <p:nvSpPr>
+          <p:cNvPr id="85" name="TextBox 84"/>
+          <p:cNvSpPr txBox="1"/>
+          <p:nvPr/>
+        </p:nvSpPr>
+        <p:spPr>
+          <a:xfrm>
+            <a:off x="3740752" y="5949280"/>
+            <a:ext cx="1191288" cy="276999"/>
+          </a:xfrm>
+          <a:prstGeom prst="rect">
+            <a:avLst/>
+          </a:prstGeom>
+          <a:noFill/>
+        </p:spPr>
+        <p:txBody>
+          <a:bodyPr wrap="none" rtlCol="0">
+            <a:spAutoFit/>
+          </a:bodyPr>
+          <a:lstStyle/>
+          <a:p>
+            <a:r>
+              <a:rPr lang="en-US" sz="1200" dirty="0" smtClean="0"/>
+              <a:t>wm8978Params</a:t>
+            </a:r>
+            <a:endParaRPr lang="en-US" sz="1200" dirty="0"/>
+          </a:p>
+        </p:txBody>
+      </p:sp>
+      <p:sp>
+        <p:nvSpPr>
+          <p:cNvPr id="86" name="TextBox 85"/>
+          <p:cNvSpPr txBox="1"/>
+          <p:nvPr/>
+        </p:nvSpPr>
+        <p:spPr>
+          <a:xfrm>
+            <a:off x="3995756" y="4952201"/>
+            <a:ext cx="864276" cy="276999"/>
+          </a:xfrm>
+          <a:prstGeom prst="rect">
+            <a:avLst/>
+          </a:prstGeom>
+          <a:noFill/>
+        </p:spPr>
+        <p:txBody>
+          <a:bodyPr wrap="none" rtlCol="0">
+            <a:spAutoFit/>
+          </a:bodyPr>
+          <a:lstStyle/>
+          <a:p>
+            <a:r>
+              <a:rPr lang="en-US" sz="1200" dirty="0" err="1" smtClean="0"/>
+              <a:t>dspParams</a:t>
+            </a:r>
+            <a:endParaRPr lang="en-US" sz="1200" dirty="0"/>
+          </a:p>
+        </p:txBody>
+      </p:sp>
     </p:spTree>
   </p:cSld>
   <p:clrMapOvr>

</xml_diff>

<commit_message>
describe the concept a sequence
</commit_message>
<xml_diff>
--- a/images/graphics.pptx
+++ b/images/graphics.pptx
@@ -11,6 +11,8 @@
     <p:sldId id="263" r:id="rId5"/>
     <p:sldId id="265" r:id="rId6"/>
     <p:sldId id="264" r:id="rId7"/>
+    <p:sldId id="266" r:id="rId8"/>
+    <p:sldId id="267" r:id="rId9"/>
   </p:sldIdLst>
   <p:sldSz cx="9144000" cy="6858000" type="screen4x3"/>
   <p:notesSz cx="6858000" cy="9144000"/>
@@ -294,7 +296,7 @@
             <a:fld id="{FD841624-621E-4D67-82DB-36A0154A0A2F}" type="datetimeFigureOut">
               <a:rPr lang="en-US" smtClean="0"/>
               <a:pPr/>
-              <a:t>01-Nov-21</a:t>
+              <a:t>05-Nov-21</a:t>
             </a:fld>
             <a:endParaRPr lang="en-US"/>
           </a:p>
@@ -461,7 +463,7 @@
             <a:fld id="{FD841624-621E-4D67-82DB-36A0154A0A2F}" type="datetimeFigureOut">
               <a:rPr lang="en-US" smtClean="0"/>
               <a:pPr/>
-              <a:t>01-Nov-21</a:t>
+              <a:t>05-Nov-21</a:t>
             </a:fld>
             <a:endParaRPr lang="en-US"/>
           </a:p>
@@ -638,7 +640,7 @@
             <a:fld id="{FD841624-621E-4D67-82DB-36A0154A0A2F}" type="datetimeFigureOut">
               <a:rPr lang="en-US" smtClean="0"/>
               <a:pPr/>
-              <a:t>01-Nov-21</a:t>
+              <a:t>05-Nov-21</a:t>
             </a:fld>
             <a:endParaRPr lang="en-US"/>
           </a:p>
@@ -805,7 +807,7 @@
             <a:fld id="{FD841624-621E-4D67-82DB-36A0154A0A2F}" type="datetimeFigureOut">
               <a:rPr lang="en-US" smtClean="0"/>
               <a:pPr/>
-              <a:t>01-Nov-21</a:t>
+              <a:t>05-Nov-21</a:t>
             </a:fld>
             <a:endParaRPr lang="en-US"/>
           </a:p>
@@ -1048,7 +1050,7 @@
             <a:fld id="{FD841624-621E-4D67-82DB-36A0154A0A2F}" type="datetimeFigureOut">
               <a:rPr lang="en-US" smtClean="0"/>
               <a:pPr/>
-              <a:t>01-Nov-21</a:t>
+              <a:t>05-Nov-21</a:t>
             </a:fld>
             <a:endParaRPr lang="en-US"/>
           </a:p>
@@ -1333,7 +1335,7 @@
             <a:fld id="{FD841624-621E-4D67-82DB-36A0154A0A2F}" type="datetimeFigureOut">
               <a:rPr lang="en-US" smtClean="0"/>
               <a:pPr/>
-              <a:t>01-Nov-21</a:t>
+              <a:t>05-Nov-21</a:t>
             </a:fld>
             <a:endParaRPr lang="en-US"/>
           </a:p>
@@ -1752,7 +1754,7 @@
             <a:fld id="{FD841624-621E-4D67-82DB-36A0154A0A2F}" type="datetimeFigureOut">
               <a:rPr lang="en-US" smtClean="0"/>
               <a:pPr/>
-              <a:t>01-Nov-21</a:t>
+              <a:t>05-Nov-21</a:t>
             </a:fld>
             <a:endParaRPr lang="en-US"/>
           </a:p>
@@ -1867,7 +1869,7 @@
             <a:fld id="{FD841624-621E-4D67-82DB-36A0154A0A2F}" type="datetimeFigureOut">
               <a:rPr lang="en-US" smtClean="0"/>
               <a:pPr/>
-              <a:t>01-Nov-21</a:t>
+              <a:t>05-Nov-21</a:t>
             </a:fld>
             <a:endParaRPr lang="en-US"/>
           </a:p>
@@ -1959,7 +1961,7 @@
             <a:fld id="{FD841624-621E-4D67-82DB-36A0154A0A2F}" type="datetimeFigureOut">
               <a:rPr lang="en-US" smtClean="0"/>
               <a:pPr/>
-              <a:t>01-Nov-21</a:t>
+              <a:t>05-Nov-21</a:t>
             </a:fld>
             <a:endParaRPr lang="en-US"/>
           </a:p>
@@ -2233,7 +2235,7 @@
             <a:fld id="{FD841624-621E-4D67-82DB-36A0154A0A2F}" type="datetimeFigureOut">
               <a:rPr lang="en-US" smtClean="0"/>
               <a:pPr/>
-              <a:t>01-Nov-21</a:t>
+              <a:t>05-Nov-21</a:t>
             </a:fld>
             <a:endParaRPr lang="en-US"/>
           </a:p>
@@ -2483,7 +2485,7 @@
             <a:fld id="{FD841624-621E-4D67-82DB-36A0154A0A2F}" type="datetimeFigureOut">
               <a:rPr lang="en-US" smtClean="0"/>
               <a:pPr/>
-              <a:t>01-Nov-21</a:t>
+              <a:t>05-Nov-21</a:t>
             </a:fld>
             <a:endParaRPr lang="en-US"/>
           </a:p>
@@ -2693,7 +2695,7 @@
             <a:fld id="{FD841624-621E-4D67-82DB-36A0154A0A2F}" type="datetimeFigureOut">
               <a:rPr lang="en-US" smtClean="0"/>
               <a:pPr/>
-              <a:t>01-Nov-21</a:t>
+              <a:t>05-Nov-21</a:t>
             </a:fld>
             <a:endParaRPr lang="en-US"/>
           </a:p>
@@ -9642,11 +9644,6 @@
               </a:rPr>
               <a:t>(AS IT SHOULD)</a:t>
             </a:r>
-            <a:endParaRPr lang="en-US" dirty="0" smtClean="0">
-              <a:solidFill>
-                <a:srgbClr val="FF0000"/>
-              </a:solidFill>
-            </a:endParaRPr>
           </a:p>
           <a:p>
             <a:r>
@@ -11868,6 +11865,3890 @@
           </a:p>
         </p:txBody>
       </p:sp>
+    </p:spTree>
+  </p:cSld>
+  <p:clrMapOvr>
+    <a:masterClrMapping/>
+  </p:clrMapOvr>
+</p:sld>
+</file>
+
+<file path=ppt/slides/slide7.xml><?xml version="1.0" encoding="utf-8"?>
+<p:sld xmlns:a="http://schemas.openxmlformats.org/drawingml/2006/main" xmlns:r="http://schemas.openxmlformats.org/officeDocument/2006/relationships" xmlns:p="http://schemas.openxmlformats.org/presentationml/2006/main">
+  <p:cSld>
+    <p:spTree>
+      <p:nvGrpSpPr>
+        <p:cNvPr id="1" name=""/>
+        <p:cNvGrpSpPr/>
+        <p:nvPr/>
+      </p:nvGrpSpPr>
+      <p:grpSpPr>
+        <a:xfrm>
+          <a:off x="0" y="0"/>
+          <a:ext cx="0" cy="0"/>
+          <a:chOff x="0" y="0"/>
+          <a:chExt cx="0" cy="0"/>
+        </a:xfrm>
+      </p:grpSpPr>
+      <p:grpSp>
+        <p:nvGrpSpPr>
+          <p:cNvPr id="26" name="Group 25"/>
+          <p:cNvGrpSpPr/>
+          <p:nvPr/>
+        </p:nvGrpSpPr>
+        <p:grpSpPr>
+          <a:xfrm>
+            <a:off x="347010" y="1753071"/>
+            <a:ext cx="2884512" cy="144016"/>
+            <a:chOff x="541751" y="1412776"/>
+            <a:chExt cx="2884512" cy="144016"/>
+          </a:xfrm>
+        </p:grpSpPr>
+        <p:sp>
+          <p:nvSpPr>
+            <p:cNvPr id="2" name="Rectangle 1"/>
+            <p:cNvSpPr/>
+            <p:nvPr/>
+          </p:nvSpPr>
+          <p:spPr>
+            <a:xfrm>
+              <a:off x="541751" y="1412776"/>
+              <a:ext cx="720080" cy="144016"/>
+            </a:xfrm>
+            <a:prstGeom prst="rect">
+              <a:avLst/>
+            </a:prstGeom>
+            <a:solidFill>
+              <a:srgbClr val="FFFF00"/>
+            </a:solidFill>
+            <a:ln>
+              <a:solidFill>
+                <a:schemeClr val="tx1"/>
+              </a:solidFill>
+            </a:ln>
+          </p:spPr>
+          <p:style>
+            <a:lnRef idx="2">
+              <a:schemeClr val="accent3">
+                <a:shade val="50000"/>
+              </a:schemeClr>
+            </a:lnRef>
+            <a:fillRef idx="1">
+              <a:schemeClr val="accent3"/>
+            </a:fillRef>
+            <a:effectRef idx="0">
+              <a:schemeClr val="accent3"/>
+            </a:effectRef>
+            <a:fontRef idx="minor">
+              <a:schemeClr val="lt1"/>
+            </a:fontRef>
+          </p:style>
+          <p:txBody>
+            <a:bodyPr rtlCol="0" anchor="ctr"/>
+            <a:lstStyle/>
+            <a:p>
+              <a:pPr algn="ctr"/>
+              <a:endParaRPr lang="en-US"/>
+            </a:p>
+          </p:txBody>
+        </p:sp>
+        <p:sp>
+          <p:nvSpPr>
+            <p:cNvPr id="3" name="Rectangle 2"/>
+            <p:cNvSpPr/>
+            <p:nvPr/>
+          </p:nvSpPr>
+          <p:spPr>
+            <a:xfrm>
+              <a:off x="1263228" y="1412776"/>
+              <a:ext cx="720080" cy="144016"/>
+            </a:xfrm>
+            <a:prstGeom prst="rect">
+              <a:avLst/>
+            </a:prstGeom>
+            <a:solidFill>
+              <a:srgbClr val="FFFF00"/>
+            </a:solidFill>
+            <a:ln>
+              <a:solidFill>
+                <a:schemeClr val="tx1"/>
+              </a:solidFill>
+            </a:ln>
+          </p:spPr>
+          <p:style>
+            <a:lnRef idx="2">
+              <a:schemeClr val="accent3">
+                <a:shade val="50000"/>
+              </a:schemeClr>
+            </a:lnRef>
+            <a:fillRef idx="1">
+              <a:schemeClr val="accent3"/>
+            </a:fillRef>
+            <a:effectRef idx="0">
+              <a:schemeClr val="accent3"/>
+            </a:effectRef>
+            <a:fontRef idx="minor">
+              <a:schemeClr val="lt1"/>
+            </a:fontRef>
+          </p:style>
+          <p:txBody>
+            <a:bodyPr rtlCol="0" anchor="ctr"/>
+            <a:lstStyle/>
+            <a:p>
+              <a:pPr algn="ctr"/>
+              <a:endParaRPr lang="en-US"/>
+            </a:p>
+          </p:txBody>
+        </p:sp>
+        <p:sp>
+          <p:nvSpPr>
+            <p:cNvPr id="4" name="Rectangle 3"/>
+            <p:cNvSpPr/>
+            <p:nvPr/>
+          </p:nvSpPr>
+          <p:spPr>
+            <a:xfrm>
+              <a:off x="1984705" y="1412776"/>
+              <a:ext cx="720080" cy="144016"/>
+            </a:xfrm>
+            <a:prstGeom prst="rect">
+              <a:avLst/>
+            </a:prstGeom>
+            <a:solidFill>
+              <a:srgbClr val="FFFF00"/>
+            </a:solidFill>
+            <a:ln>
+              <a:solidFill>
+                <a:schemeClr val="tx1"/>
+              </a:solidFill>
+            </a:ln>
+          </p:spPr>
+          <p:style>
+            <a:lnRef idx="2">
+              <a:schemeClr val="accent3">
+                <a:shade val="50000"/>
+              </a:schemeClr>
+            </a:lnRef>
+            <a:fillRef idx="1">
+              <a:schemeClr val="accent3"/>
+            </a:fillRef>
+            <a:effectRef idx="0">
+              <a:schemeClr val="accent3"/>
+            </a:effectRef>
+            <a:fontRef idx="minor">
+              <a:schemeClr val="lt1"/>
+            </a:fontRef>
+          </p:style>
+          <p:txBody>
+            <a:bodyPr rtlCol="0" anchor="ctr"/>
+            <a:lstStyle/>
+            <a:p>
+              <a:pPr algn="ctr"/>
+              <a:endParaRPr lang="en-US"/>
+            </a:p>
+          </p:txBody>
+        </p:sp>
+        <p:sp>
+          <p:nvSpPr>
+            <p:cNvPr id="5" name="Rectangle 4"/>
+            <p:cNvSpPr/>
+            <p:nvPr/>
+          </p:nvSpPr>
+          <p:spPr>
+            <a:xfrm>
+              <a:off x="2706183" y="1412776"/>
+              <a:ext cx="720080" cy="144016"/>
+            </a:xfrm>
+            <a:prstGeom prst="rect">
+              <a:avLst/>
+            </a:prstGeom>
+            <a:solidFill>
+              <a:srgbClr val="FFFF00"/>
+            </a:solidFill>
+            <a:ln>
+              <a:solidFill>
+                <a:schemeClr val="tx1"/>
+              </a:solidFill>
+            </a:ln>
+          </p:spPr>
+          <p:style>
+            <a:lnRef idx="2">
+              <a:schemeClr val="accent3">
+                <a:shade val="50000"/>
+              </a:schemeClr>
+            </a:lnRef>
+            <a:fillRef idx="1">
+              <a:schemeClr val="accent3"/>
+            </a:fillRef>
+            <a:effectRef idx="0">
+              <a:schemeClr val="accent3"/>
+            </a:effectRef>
+            <a:fontRef idx="minor">
+              <a:schemeClr val="lt1"/>
+            </a:fontRef>
+          </p:style>
+          <p:txBody>
+            <a:bodyPr rtlCol="0" anchor="ctr"/>
+            <a:lstStyle/>
+            <a:p>
+              <a:pPr algn="ctr"/>
+              <a:endParaRPr lang="en-US"/>
+            </a:p>
+          </p:txBody>
+        </p:sp>
+        <p:sp>
+          <p:nvSpPr>
+            <p:cNvPr id="21" name="Rectangle 20"/>
+            <p:cNvSpPr/>
+            <p:nvPr/>
+          </p:nvSpPr>
+          <p:spPr>
+            <a:xfrm>
+              <a:off x="545414" y="1412776"/>
+              <a:ext cx="2880000" cy="144000"/>
+            </a:xfrm>
+            <a:prstGeom prst="rect">
+              <a:avLst/>
+            </a:prstGeom>
+            <a:noFill/>
+            <a:ln w="38100">
+              <a:solidFill>
+                <a:srgbClr val="FF0000"/>
+              </a:solidFill>
+            </a:ln>
+          </p:spPr>
+          <p:style>
+            <a:lnRef idx="2">
+              <a:schemeClr val="accent1">
+                <a:shade val="50000"/>
+              </a:schemeClr>
+            </a:lnRef>
+            <a:fillRef idx="1">
+              <a:schemeClr val="accent1"/>
+            </a:fillRef>
+            <a:effectRef idx="0">
+              <a:schemeClr val="accent1"/>
+            </a:effectRef>
+            <a:fontRef idx="minor">
+              <a:schemeClr val="lt1"/>
+            </a:fontRef>
+          </p:style>
+          <p:txBody>
+            <a:bodyPr rtlCol="0" anchor="ctr"/>
+            <a:lstStyle/>
+            <a:p>
+              <a:pPr algn="ctr"/>
+              <a:endParaRPr lang="en-US"/>
+            </a:p>
+          </p:txBody>
+        </p:sp>
+      </p:grpSp>
+      <p:sp>
+        <p:nvSpPr>
+          <p:cNvPr id="25" name="TextBox 24"/>
+          <p:cNvSpPr txBox="1"/>
+          <p:nvPr/>
+        </p:nvSpPr>
+        <p:spPr>
+          <a:xfrm>
+            <a:off x="3585171" y="1681063"/>
+            <a:ext cx="4478534" cy="307777"/>
+          </a:xfrm>
+          <a:prstGeom prst="rect">
+            <a:avLst/>
+          </a:prstGeom>
+          <a:noFill/>
+        </p:spPr>
+        <p:txBody>
+          <a:bodyPr wrap="none" rtlCol="0">
+            <a:spAutoFit/>
+          </a:bodyPr>
+          <a:lstStyle/>
+          <a:p>
+            <a:r>
+              <a:rPr lang="en-US" sz="1400" dirty="0" smtClean="0"/>
+              <a:t>a single measure, containing 4 beats (time signature “4/4”)</a:t>
+            </a:r>
+          </a:p>
+        </p:txBody>
+      </p:sp>
+      <p:sp>
+        <p:nvSpPr>
+          <p:cNvPr id="27" name="TextBox 26"/>
+          <p:cNvSpPr txBox="1"/>
+          <p:nvPr/>
+        </p:nvSpPr>
+        <p:spPr>
+          <a:xfrm>
+            <a:off x="272803" y="260648"/>
+            <a:ext cx="6820521" cy="1169551"/>
+          </a:xfrm>
+          <a:prstGeom prst="rect">
+            <a:avLst/>
+          </a:prstGeom>
+          <a:noFill/>
+        </p:spPr>
+        <p:txBody>
+          <a:bodyPr wrap="none" rtlCol="0">
+            <a:spAutoFit/>
+          </a:bodyPr>
+          <a:lstStyle/>
+          <a:p>
+            <a:r>
+              <a:rPr lang="en-US" sz="1400" dirty="0" smtClean="0"/>
+              <a:t>The basic unit is a beat. </a:t>
+            </a:r>
+          </a:p>
+          <a:p>
+            <a:r>
+              <a:rPr lang="en-US" sz="1400" dirty="0" smtClean="0"/>
+              <a:t>An important parameter is the tempo in beats per minute (</a:t>
+            </a:r>
+            <a:r>
+              <a:rPr lang="en-US" sz="1400" dirty="0" err="1" smtClean="0"/>
+              <a:t>bpm</a:t>
+            </a:r>
+            <a:r>
+              <a:rPr lang="en-US" sz="1400" dirty="0" smtClean="0"/>
+              <a:t>)</a:t>
+            </a:r>
+          </a:p>
+          <a:p>
+            <a:r>
+              <a:rPr lang="en-US" sz="1400" dirty="0" smtClean="0"/>
+              <a:t>The length of a beat also defines the length of a quarter note.</a:t>
+            </a:r>
+          </a:p>
+          <a:p>
+            <a:r>
+              <a:rPr lang="en-US" sz="1400" dirty="0" smtClean="0"/>
+              <a:t>A measure is a repeating unit of beats. The number of beats in a measure can vary.</a:t>
+            </a:r>
+          </a:p>
+          <a:p>
+            <a:r>
+              <a:rPr lang="en-US" sz="1400" dirty="0" smtClean="0"/>
+              <a:t>Common time signatures are:  “4/4” ,  “3/4” , “5/4”  for resp. 4 , 3 and 5 beats in a measure</a:t>
+            </a:r>
+            <a:endParaRPr lang="en-US" sz="1400" dirty="0"/>
+          </a:p>
+        </p:txBody>
+      </p:sp>
+      <p:sp>
+        <p:nvSpPr>
+          <p:cNvPr id="28" name="TextBox 27"/>
+          <p:cNvSpPr txBox="1"/>
+          <p:nvPr/>
+        </p:nvSpPr>
+        <p:spPr>
+          <a:xfrm>
+            <a:off x="272803" y="2259449"/>
+            <a:ext cx="5757602" cy="307777"/>
+          </a:xfrm>
+          <a:prstGeom prst="rect">
+            <a:avLst/>
+          </a:prstGeom>
+          <a:noFill/>
+        </p:spPr>
+        <p:txBody>
+          <a:bodyPr wrap="none" rtlCol="0">
+            <a:spAutoFit/>
+          </a:bodyPr>
+          <a:lstStyle/>
+          <a:p>
+            <a:r>
+              <a:rPr lang="en-US" sz="1400" dirty="0" smtClean="0"/>
+              <a:t>A sequence is a sequence of full measures: here is a sequence of 3 measures</a:t>
+            </a:r>
+            <a:endParaRPr lang="en-US" sz="1400" dirty="0"/>
+          </a:p>
+        </p:txBody>
+      </p:sp>
+      <p:grpSp>
+        <p:nvGrpSpPr>
+          <p:cNvPr id="47" name="Group 46"/>
+          <p:cNvGrpSpPr/>
+          <p:nvPr/>
+        </p:nvGrpSpPr>
+        <p:grpSpPr>
+          <a:xfrm>
+            <a:off x="344811" y="2780928"/>
+            <a:ext cx="2884512" cy="144016"/>
+            <a:chOff x="541751" y="1412776"/>
+            <a:chExt cx="2884512" cy="144016"/>
+          </a:xfrm>
+        </p:grpSpPr>
+        <p:sp>
+          <p:nvSpPr>
+            <p:cNvPr id="48" name="Rectangle 47"/>
+            <p:cNvSpPr/>
+            <p:nvPr/>
+          </p:nvSpPr>
+          <p:spPr>
+            <a:xfrm>
+              <a:off x="541751" y="1412776"/>
+              <a:ext cx="720080" cy="144016"/>
+            </a:xfrm>
+            <a:prstGeom prst="rect">
+              <a:avLst/>
+            </a:prstGeom>
+            <a:solidFill>
+              <a:srgbClr val="FFFF00"/>
+            </a:solidFill>
+            <a:ln>
+              <a:solidFill>
+                <a:schemeClr val="tx1"/>
+              </a:solidFill>
+            </a:ln>
+          </p:spPr>
+          <p:style>
+            <a:lnRef idx="2">
+              <a:schemeClr val="accent3">
+                <a:shade val="50000"/>
+              </a:schemeClr>
+            </a:lnRef>
+            <a:fillRef idx="1">
+              <a:schemeClr val="accent3"/>
+            </a:fillRef>
+            <a:effectRef idx="0">
+              <a:schemeClr val="accent3"/>
+            </a:effectRef>
+            <a:fontRef idx="minor">
+              <a:schemeClr val="lt1"/>
+            </a:fontRef>
+          </p:style>
+          <p:txBody>
+            <a:bodyPr rtlCol="0" anchor="ctr"/>
+            <a:lstStyle/>
+            <a:p>
+              <a:pPr algn="ctr"/>
+              <a:endParaRPr lang="en-US"/>
+            </a:p>
+          </p:txBody>
+        </p:sp>
+        <p:sp>
+          <p:nvSpPr>
+            <p:cNvPr id="49" name="Rectangle 48"/>
+            <p:cNvSpPr/>
+            <p:nvPr/>
+          </p:nvSpPr>
+          <p:spPr>
+            <a:xfrm>
+              <a:off x="1263228" y="1412776"/>
+              <a:ext cx="720080" cy="144016"/>
+            </a:xfrm>
+            <a:prstGeom prst="rect">
+              <a:avLst/>
+            </a:prstGeom>
+            <a:solidFill>
+              <a:srgbClr val="FFFF00"/>
+            </a:solidFill>
+            <a:ln>
+              <a:solidFill>
+                <a:schemeClr val="tx1"/>
+              </a:solidFill>
+            </a:ln>
+          </p:spPr>
+          <p:style>
+            <a:lnRef idx="2">
+              <a:schemeClr val="accent3">
+                <a:shade val="50000"/>
+              </a:schemeClr>
+            </a:lnRef>
+            <a:fillRef idx="1">
+              <a:schemeClr val="accent3"/>
+            </a:fillRef>
+            <a:effectRef idx="0">
+              <a:schemeClr val="accent3"/>
+            </a:effectRef>
+            <a:fontRef idx="minor">
+              <a:schemeClr val="lt1"/>
+            </a:fontRef>
+          </p:style>
+          <p:txBody>
+            <a:bodyPr rtlCol="0" anchor="ctr"/>
+            <a:lstStyle/>
+            <a:p>
+              <a:pPr algn="ctr"/>
+              <a:endParaRPr lang="en-US"/>
+            </a:p>
+          </p:txBody>
+        </p:sp>
+        <p:sp>
+          <p:nvSpPr>
+            <p:cNvPr id="50" name="Rectangle 49"/>
+            <p:cNvSpPr/>
+            <p:nvPr/>
+          </p:nvSpPr>
+          <p:spPr>
+            <a:xfrm>
+              <a:off x="1984705" y="1412776"/>
+              <a:ext cx="720080" cy="144016"/>
+            </a:xfrm>
+            <a:prstGeom prst="rect">
+              <a:avLst/>
+            </a:prstGeom>
+            <a:solidFill>
+              <a:srgbClr val="FFFF00"/>
+            </a:solidFill>
+            <a:ln>
+              <a:solidFill>
+                <a:schemeClr val="tx1"/>
+              </a:solidFill>
+            </a:ln>
+          </p:spPr>
+          <p:style>
+            <a:lnRef idx="2">
+              <a:schemeClr val="accent3">
+                <a:shade val="50000"/>
+              </a:schemeClr>
+            </a:lnRef>
+            <a:fillRef idx="1">
+              <a:schemeClr val="accent3"/>
+            </a:fillRef>
+            <a:effectRef idx="0">
+              <a:schemeClr val="accent3"/>
+            </a:effectRef>
+            <a:fontRef idx="minor">
+              <a:schemeClr val="lt1"/>
+            </a:fontRef>
+          </p:style>
+          <p:txBody>
+            <a:bodyPr rtlCol="0" anchor="ctr"/>
+            <a:lstStyle/>
+            <a:p>
+              <a:pPr algn="ctr"/>
+              <a:endParaRPr lang="en-US"/>
+            </a:p>
+          </p:txBody>
+        </p:sp>
+        <p:sp>
+          <p:nvSpPr>
+            <p:cNvPr id="51" name="Rectangle 50"/>
+            <p:cNvSpPr/>
+            <p:nvPr/>
+          </p:nvSpPr>
+          <p:spPr>
+            <a:xfrm>
+              <a:off x="2706183" y="1412776"/>
+              <a:ext cx="720080" cy="144016"/>
+            </a:xfrm>
+            <a:prstGeom prst="rect">
+              <a:avLst/>
+            </a:prstGeom>
+            <a:solidFill>
+              <a:srgbClr val="FFFF00"/>
+            </a:solidFill>
+            <a:ln>
+              <a:solidFill>
+                <a:schemeClr val="tx1"/>
+              </a:solidFill>
+            </a:ln>
+          </p:spPr>
+          <p:style>
+            <a:lnRef idx="2">
+              <a:schemeClr val="accent3">
+                <a:shade val="50000"/>
+              </a:schemeClr>
+            </a:lnRef>
+            <a:fillRef idx="1">
+              <a:schemeClr val="accent3"/>
+            </a:fillRef>
+            <a:effectRef idx="0">
+              <a:schemeClr val="accent3"/>
+            </a:effectRef>
+            <a:fontRef idx="minor">
+              <a:schemeClr val="lt1"/>
+            </a:fontRef>
+          </p:style>
+          <p:txBody>
+            <a:bodyPr rtlCol="0" anchor="ctr"/>
+            <a:lstStyle/>
+            <a:p>
+              <a:pPr algn="ctr"/>
+              <a:endParaRPr lang="en-US"/>
+            </a:p>
+          </p:txBody>
+        </p:sp>
+        <p:sp>
+          <p:nvSpPr>
+            <p:cNvPr id="52" name="Rectangle 51"/>
+            <p:cNvSpPr/>
+            <p:nvPr/>
+          </p:nvSpPr>
+          <p:spPr>
+            <a:xfrm>
+              <a:off x="545414" y="1412776"/>
+              <a:ext cx="2880000" cy="144000"/>
+            </a:xfrm>
+            <a:prstGeom prst="rect">
+              <a:avLst/>
+            </a:prstGeom>
+            <a:noFill/>
+            <a:ln w="38100">
+              <a:solidFill>
+                <a:srgbClr val="FF0000"/>
+              </a:solidFill>
+            </a:ln>
+          </p:spPr>
+          <p:style>
+            <a:lnRef idx="2">
+              <a:schemeClr val="accent1">
+                <a:shade val="50000"/>
+              </a:schemeClr>
+            </a:lnRef>
+            <a:fillRef idx="1">
+              <a:schemeClr val="accent1"/>
+            </a:fillRef>
+            <a:effectRef idx="0">
+              <a:schemeClr val="accent1"/>
+            </a:effectRef>
+            <a:fontRef idx="minor">
+              <a:schemeClr val="lt1"/>
+            </a:fontRef>
+          </p:style>
+          <p:txBody>
+            <a:bodyPr rtlCol="0" anchor="ctr"/>
+            <a:lstStyle/>
+            <a:p>
+              <a:pPr algn="ctr"/>
+              <a:endParaRPr lang="en-US"/>
+            </a:p>
+          </p:txBody>
+        </p:sp>
+      </p:grpSp>
+      <p:grpSp>
+        <p:nvGrpSpPr>
+          <p:cNvPr id="53" name="Group 52"/>
+          <p:cNvGrpSpPr/>
+          <p:nvPr/>
+        </p:nvGrpSpPr>
+        <p:grpSpPr>
+          <a:xfrm>
+            <a:off x="6109723" y="2780928"/>
+            <a:ext cx="2884512" cy="144016"/>
+            <a:chOff x="541751" y="1412776"/>
+            <a:chExt cx="2884512" cy="144016"/>
+          </a:xfrm>
+        </p:grpSpPr>
+        <p:sp>
+          <p:nvSpPr>
+            <p:cNvPr id="54" name="Rectangle 53"/>
+            <p:cNvSpPr/>
+            <p:nvPr/>
+          </p:nvSpPr>
+          <p:spPr>
+            <a:xfrm>
+              <a:off x="541751" y="1412776"/>
+              <a:ext cx="720080" cy="144016"/>
+            </a:xfrm>
+            <a:prstGeom prst="rect">
+              <a:avLst/>
+            </a:prstGeom>
+            <a:solidFill>
+              <a:srgbClr val="FFFF00"/>
+            </a:solidFill>
+            <a:ln>
+              <a:solidFill>
+                <a:schemeClr val="tx1"/>
+              </a:solidFill>
+            </a:ln>
+          </p:spPr>
+          <p:style>
+            <a:lnRef idx="2">
+              <a:schemeClr val="accent3">
+                <a:shade val="50000"/>
+              </a:schemeClr>
+            </a:lnRef>
+            <a:fillRef idx="1">
+              <a:schemeClr val="accent3"/>
+            </a:fillRef>
+            <a:effectRef idx="0">
+              <a:schemeClr val="accent3"/>
+            </a:effectRef>
+            <a:fontRef idx="minor">
+              <a:schemeClr val="lt1"/>
+            </a:fontRef>
+          </p:style>
+          <p:txBody>
+            <a:bodyPr rtlCol="0" anchor="ctr"/>
+            <a:lstStyle/>
+            <a:p>
+              <a:pPr algn="ctr"/>
+              <a:endParaRPr lang="en-US"/>
+            </a:p>
+          </p:txBody>
+        </p:sp>
+        <p:sp>
+          <p:nvSpPr>
+            <p:cNvPr id="55" name="Rectangle 54"/>
+            <p:cNvSpPr/>
+            <p:nvPr/>
+          </p:nvSpPr>
+          <p:spPr>
+            <a:xfrm>
+              <a:off x="1263228" y="1412776"/>
+              <a:ext cx="720080" cy="144016"/>
+            </a:xfrm>
+            <a:prstGeom prst="rect">
+              <a:avLst/>
+            </a:prstGeom>
+            <a:solidFill>
+              <a:srgbClr val="FFFF00"/>
+            </a:solidFill>
+            <a:ln>
+              <a:solidFill>
+                <a:schemeClr val="tx1"/>
+              </a:solidFill>
+            </a:ln>
+          </p:spPr>
+          <p:style>
+            <a:lnRef idx="2">
+              <a:schemeClr val="accent3">
+                <a:shade val="50000"/>
+              </a:schemeClr>
+            </a:lnRef>
+            <a:fillRef idx="1">
+              <a:schemeClr val="accent3"/>
+            </a:fillRef>
+            <a:effectRef idx="0">
+              <a:schemeClr val="accent3"/>
+            </a:effectRef>
+            <a:fontRef idx="minor">
+              <a:schemeClr val="lt1"/>
+            </a:fontRef>
+          </p:style>
+          <p:txBody>
+            <a:bodyPr rtlCol="0" anchor="ctr"/>
+            <a:lstStyle/>
+            <a:p>
+              <a:pPr algn="ctr"/>
+              <a:endParaRPr lang="en-US"/>
+            </a:p>
+          </p:txBody>
+        </p:sp>
+        <p:sp>
+          <p:nvSpPr>
+            <p:cNvPr id="56" name="Rectangle 55"/>
+            <p:cNvSpPr/>
+            <p:nvPr/>
+          </p:nvSpPr>
+          <p:spPr>
+            <a:xfrm>
+              <a:off x="1984705" y="1412776"/>
+              <a:ext cx="720080" cy="144016"/>
+            </a:xfrm>
+            <a:prstGeom prst="rect">
+              <a:avLst/>
+            </a:prstGeom>
+            <a:solidFill>
+              <a:srgbClr val="FFFF00"/>
+            </a:solidFill>
+            <a:ln>
+              <a:solidFill>
+                <a:schemeClr val="tx1"/>
+              </a:solidFill>
+            </a:ln>
+          </p:spPr>
+          <p:style>
+            <a:lnRef idx="2">
+              <a:schemeClr val="accent3">
+                <a:shade val="50000"/>
+              </a:schemeClr>
+            </a:lnRef>
+            <a:fillRef idx="1">
+              <a:schemeClr val="accent3"/>
+            </a:fillRef>
+            <a:effectRef idx="0">
+              <a:schemeClr val="accent3"/>
+            </a:effectRef>
+            <a:fontRef idx="minor">
+              <a:schemeClr val="lt1"/>
+            </a:fontRef>
+          </p:style>
+          <p:txBody>
+            <a:bodyPr rtlCol="0" anchor="ctr"/>
+            <a:lstStyle/>
+            <a:p>
+              <a:pPr algn="ctr"/>
+              <a:endParaRPr lang="en-US"/>
+            </a:p>
+          </p:txBody>
+        </p:sp>
+        <p:sp>
+          <p:nvSpPr>
+            <p:cNvPr id="57" name="Rectangle 56"/>
+            <p:cNvSpPr/>
+            <p:nvPr/>
+          </p:nvSpPr>
+          <p:spPr>
+            <a:xfrm>
+              <a:off x="2706183" y="1412776"/>
+              <a:ext cx="720080" cy="144016"/>
+            </a:xfrm>
+            <a:prstGeom prst="rect">
+              <a:avLst/>
+            </a:prstGeom>
+            <a:solidFill>
+              <a:srgbClr val="FFFF00"/>
+            </a:solidFill>
+            <a:ln>
+              <a:solidFill>
+                <a:schemeClr val="tx1"/>
+              </a:solidFill>
+            </a:ln>
+          </p:spPr>
+          <p:style>
+            <a:lnRef idx="2">
+              <a:schemeClr val="accent3">
+                <a:shade val="50000"/>
+              </a:schemeClr>
+            </a:lnRef>
+            <a:fillRef idx="1">
+              <a:schemeClr val="accent3"/>
+            </a:fillRef>
+            <a:effectRef idx="0">
+              <a:schemeClr val="accent3"/>
+            </a:effectRef>
+            <a:fontRef idx="minor">
+              <a:schemeClr val="lt1"/>
+            </a:fontRef>
+          </p:style>
+          <p:txBody>
+            <a:bodyPr rtlCol="0" anchor="ctr"/>
+            <a:lstStyle/>
+            <a:p>
+              <a:pPr algn="ctr"/>
+              <a:endParaRPr lang="en-US"/>
+            </a:p>
+          </p:txBody>
+        </p:sp>
+        <p:sp>
+          <p:nvSpPr>
+            <p:cNvPr id="58" name="Rectangle 57"/>
+            <p:cNvSpPr/>
+            <p:nvPr/>
+          </p:nvSpPr>
+          <p:spPr>
+            <a:xfrm>
+              <a:off x="545414" y="1412776"/>
+              <a:ext cx="2880000" cy="144000"/>
+            </a:xfrm>
+            <a:prstGeom prst="rect">
+              <a:avLst/>
+            </a:prstGeom>
+            <a:noFill/>
+            <a:ln w="38100">
+              <a:solidFill>
+                <a:srgbClr val="FF0000"/>
+              </a:solidFill>
+            </a:ln>
+          </p:spPr>
+          <p:style>
+            <a:lnRef idx="2">
+              <a:schemeClr val="accent1">
+                <a:shade val="50000"/>
+              </a:schemeClr>
+            </a:lnRef>
+            <a:fillRef idx="1">
+              <a:schemeClr val="accent1"/>
+            </a:fillRef>
+            <a:effectRef idx="0">
+              <a:schemeClr val="accent1"/>
+            </a:effectRef>
+            <a:fontRef idx="minor">
+              <a:schemeClr val="lt1"/>
+            </a:fontRef>
+          </p:style>
+          <p:txBody>
+            <a:bodyPr rtlCol="0" anchor="ctr"/>
+            <a:lstStyle/>
+            <a:p>
+              <a:pPr algn="ctr"/>
+              <a:endParaRPr lang="en-US"/>
+            </a:p>
+          </p:txBody>
+        </p:sp>
+      </p:grpSp>
+      <p:grpSp>
+        <p:nvGrpSpPr>
+          <p:cNvPr id="59" name="Group 58"/>
+          <p:cNvGrpSpPr/>
+          <p:nvPr/>
+        </p:nvGrpSpPr>
+        <p:grpSpPr>
+          <a:xfrm>
+            <a:off x="3225131" y="2780928"/>
+            <a:ext cx="2884512" cy="144016"/>
+            <a:chOff x="541751" y="1412776"/>
+            <a:chExt cx="2884512" cy="144016"/>
+          </a:xfrm>
+        </p:grpSpPr>
+        <p:sp>
+          <p:nvSpPr>
+            <p:cNvPr id="60" name="Rectangle 59"/>
+            <p:cNvSpPr/>
+            <p:nvPr/>
+          </p:nvSpPr>
+          <p:spPr>
+            <a:xfrm>
+              <a:off x="541751" y="1412776"/>
+              <a:ext cx="720080" cy="144016"/>
+            </a:xfrm>
+            <a:prstGeom prst="rect">
+              <a:avLst/>
+            </a:prstGeom>
+            <a:solidFill>
+              <a:srgbClr val="FFFF00"/>
+            </a:solidFill>
+            <a:ln>
+              <a:solidFill>
+                <a:schemeClr val="tx1"/>
+              </a:solidFill>
+            </a:ln>
+          </p:spPr>
+          <p:style>
+            <a:lnRef idx="2">
+              <a:schemeClr val="accent3">
+                <a:shade val="50000"/>
+              </a:schemeClr>
+            </a:lnRef>
+            <a:fillRef idx="1">
+              <a:schemeClr val="accent3"/>
+            </a:fillRef>
+            <a:effectRef idx="0">
+              <a:schemeClr val="accent3"/>
+            </a:effectRef>
+            <a:fontRef idx="minor">
+              <a:schemeClr val="lt1"/>
+            </a:fontRef>
+          </p:style>
+          <p:txBody>
+            <a:bodyPr rtlCol="0" anchor="ctr"/>
+            <a:lstStyle/>
+            <a:p>
+              <a:pPr algn="ctr"/>
+              <a:endParaRPr lang="en-US"/>
+            </a:p>
+          </p:txBody>
+        </p:sp>
+        <p:sp>
+          <p:nvSpPr>
+            <p:cNvPr id="61" name="Rectangle 60"/>
+            <p:cNvSpPr/>
+            <p:nvPr/>
+          </p:nvSpPr>
+          <p:spPr>
+            <a:xfrm>
+              <a:off x="1263228" y="1412776"/>
+              <a:ext cx="720080" cy="144016"/>
+            </a:xfrm>
+            <a:prstGeom prst="rect">
+              <a:avLst/>
+            </a:prstGeom>
+            <a:solidFill>
+              <a:srgbClr val="FFFF00"/>
+            </a:solidFill>
+            <a:ln>
+              <a:solidFill>
+                <a:schemeClr val="tx1"/>
+              </a:solidFill>
+            </a:ln>
+          </p:spPr>
+          <p:style>
+            <a:lnRef idx="2">
+              <a:schemeClr val="accent3">
+                <a:shade val="50000"/>
+              </a:schemeClr>
+            </a:lnRef>
+            <a:fillRef idx="1">
+              <a:schemeClr val="accent3"/>
+            </a:fillRef>
+            <a:effectRef idx="0">
+              <a:schemeClr val="accent3"/>
+            </a:effectRef>
+            <a:fontRef idx="minor">
+              <a:schemeClr val="lt1"/>
+            </a:fontRef>
+          </p:style>
+          <p:txBody>
+            <a:bodyPr rtlCol="0" anchor="ctr"/>
+            <a:lstStyle/>
+            <a:p>
+              <a:pPr algn="ctr"/>
+              <a:endParaRPr lang="en-US"/>
+            </a:p>
+          </p:txBody>
+        </p:sp>
+        <p:sp>
+          <p:nvSpPr>
+            <p:cNvPr id="62" name="Rectangle 61"/>
+            <p:cNvSpPr/>
+            <p:nvPr/>
+          </p:nvSpPr>
+          <p:spPr>
+            <a:xfrm>
+              <a:off x="1984705" y="1412776"/>
+              <a:ext cx="720080" cy="144016"/>
+            </a:xfrm>
+            <a:prstGeom prst="rect">
+              <a:avLst/>
+            </a:prstGeom>
+            <a:solidFill>
+              <a:srgbClr val="FFFF00"/>
+            </a:solidFill>
+            <a:ln>
+              <a:solidFill>
+                <a:schemeClr val="tx1"/>
+              </a:solidFill>
+            </a:ln>
+          </p:spPr>
+          <p:style>
+            <a:lnRef idx="2">
+              <a:schemeClr val="accent3">
+                <a:shade val="50000"/>
+              </a:schemeClr>
+            </a:lnRef>
+            <a:fillRef idx="1">
+              <a:schemeClr val="accent3"/>
+            </a:fillRef>
+            <a:effectRef idx="0">
+              <a:schemeClr val="accent3"/>
+            </a:effectRef>
+            <a:fontRef idx="minor">
+              <a:schemeClr val="lt1"/>
+            </a:fontRef>
+          </p:style>
+          <p:txBody>
+            <a:bodyPr rtlCol="0" anchor="ctr"/>
+            <a:lstStyle/>
+            <a:p>
+              <a:pPr algn="ctr"/>
+              <a:endParaRPr lang="en-US"/>
+            </a:p>
+          </p:txBody>
+        </p:sp>
+        <p:sp>
+          <p:nvSpPr>
+            <p:cNvPr id="63" name="Rectangle 62"/>
+            <p:cNvSpPr/>
+            <p:nvPr/>
+          </p:nvSpPr>
+          <p:spPr>
+            <a:xfrm>
+              <a:off x="2706183" y="1412776"/>
+              <a:ext cx="720080" cy="144016"/>
+            </a:xfrm>
+            <a:prstGeom prst="rect">
+              <a:avLst/>
+            </a:prstGeom>
+            <a:solidFill>
+              <a:srgbClr val="FFFF00"/>
+            </a:solidFill>
+            <a:ln>
+              <a:solidFill>
+                <a:schemeClr val="tx1"/>
+              </a:solidFill>
+            </a:ln>
+          </p:spPr>
+          <p:style>
+            <a:lnRef idx="2">
+              <a:schemeClr val="accent3">
+                <a:shade val="50000"/>
+              </a:schemeClr>
+            </a:lnRef>
+            <a:fillRef idx="1">
+              <a:schemeClr val="accent3"/>
+            </a:fillRef>
+            <a:effectRef idx="0">
+              <a:schemeClr val="accent3"/>
+            </a:effectRef>
+            <a:fontRef idx="minor">
+              <a:schemeClr val="lt1"/>
+            </a:fontRef>
+          </p:style>
+          <p:txBody>
+            <a:bodyPr rtlCol="0" anchor="ctr"/>
+            <a:lstStyle/>
+            <a:p>
+              <a:pPr algn="ctr"/>
+              <a:endParaRPr lang="en-US"/>
+            </a:p>
+          </p:txBody>
+        </p:sp>
+        <p:sp>
+          <p:nvSpPr>
+            <p:cNvPr id="64" name="Rectangle 63"/>
+            <p:cNvSpPr/>
+            <p:nvPr/>
+          </p:nvSpPr>
+          <p:spPr>
+            <a:xfrm>
+              <a:off x="545414" y="1412776"/>
+              <a:ext cx="2880000" cy="144000"/>
+            </a:xfrm>
+            <a:prstGeom prst="rect">
+              <a:avLst/>
+            </a:prstGeom>
+            <a:noFill/>
+            <a:ln w="38100">
+              <a:solidFill>
+                <a:srgbClr val="FF0000"/>
+              </a:solidFill>
+            </a:ln>
+          </p:spPr>
+          <p:style>
+            <a:lnRef idx="2">
+              <a:schemeClr val="accent1">
+                <a:shade val="50000"/>
+              </a:schemeClr>
+            </a:lnRef>
+            <a:fillRef idx="1">
+              <a:schemeClr val="accent1"/>
+            </a:fillRef>
+            <a:effectRef idx="0">
+              <a:schemeClr val="accent1"/>
+            </a:effectRef>
+            <a:fontRef idx="minor">
+              <a:schemeClr val="lt1"/>
+            </a:fontRef>
+          </p:style>
+          <p:txBody>
+            <a:bodyPr rtlCol="0" anchor="ctr"/>
+            <a:lstStyle/>
+            <a:p>
+              <a:pPr algn="ctr"/>
+              <a:endParaRPr lang="en-US"/>
+            </a:p>
+          </p:txBody>
+        </p:sp>
+      </p:grpSp>
+      <p:cxnSp>
+        <p:nvCxnSpPr>
+          <p:cNvPr id="67" name="Straight Arrow Connector 66"/>
+          <p:cNvCxnSpPr/>
+          <p:nvPr/>
+        </p:nvCxnSpPr>
+        <p:spPr>
+          <a:xfrm flipV="1">
+            <a:off x="344734" y="2980018"/>
+            <a:ext cx="0" cy="504056"/>
+          </a:xfrm>
+          <a:prstGeom prst="straightConnector1">
+            <a:avLst/>
+          </a:prstGeom>
+          <a:ln>
+            <a:headEnd type="none"/>
+            <a:tailEnd type="triangle"/>
+          </a:ln>
+        </p:spPr>
+        <p:style>
+          <a:lnRef idx="1">
+            <a:schemeClr val="accent1"/>
+          </a:lnRef>
+          <a:fillRef idx="0">
+            <a:schemeClr val="accent1"/>
+          </a:fillRef>
+          <a:effectRef idx="0">
+            <a:schemeClr val="accent1"/>
+          </a:effectRef>
+          <a:fontRef idx="minor">
+            <a:schemeClr val="tx1"/>
+          </a:fontRef>
+        </p:style>
+      </p:cxnSp>
+      <p:sp>
+        <p:nvSpPr>
+          <p:cNvPr id="68" name="TextBox 67"/>
+          <p:cNvSpPr txBox="1"/>
+          <p:nvPr/>
+        </p:nvSpPr>
+        <p:spPr>
+          <a:xfrm>
+            <a:off x="209185" y="3501008"/>
+            <a:ext cx="276038" cy="307777"/>
+          </a:xfrm>
+          <a:prstGeom prst="rect">
+            <a:avLst/>
+          </a:prstGeom>
+          <a:noFill/>
+        </p:spPr>
+        <p:txBody>
+          <a:bodyPr wrap="none" rtlCol="0">
+            <a:spAutoFit/>
+          </a:bodyPr>
+          <a:lstStyle/>
+          <a:p>
+            <a:r>
+              <a:rPr lang="en-US" sz="1400" dirty="0" smtClean="0"/>
+              <a:t>0</a:t>
+            </a:r>
+            <a:endParaRPr lang="en-US" sz="1400" dirty="0"/>
+          </a:p>
+        </p:txBody>
+      </p:sp>
+      <p:cxnSp>
+        <p:nvCxnSpPr>
+          <p:cNvPr id="72" name="Straight Arrow Connector 71"/>
+          <p:cNvCxnSpPr/>
+          <p:nvPr/>
+        </p:nvCxnSpPr>
+        <p:spPr>
+          <a:xfrm flipV="1">
+            <a:off x="3220782" y="2980018"/>
+            <a:ext cx="0" cy="504056"/>
+          </a:xfrm>
+          <a:prstGeom prst="straightConnector1">
+            <a:avLst/>
+          </a:prstGeom>
+          <a:ln>
+            <a:tailEnd type="triangle"/>
+          </a:ln>
+        </p:spPr>
+        <p:style>
+          <a:lnRef idx="1">
+            <a:schemeClr val="accent1"/>
+          </a:lnRef>
+          <a:fillRef idx="0">
+            <a:schemeClr val="accent1"/>
+          </a:fillRef>
+          <a:effectRef idx="0">
+            <a:schemeClr val="accent1"/>
+          </a:effectRef>
+          <a:fontRef idx="minor">
+            <a:schemeClr val="tx1"/>
+          </a:fontRef>
+        </p:style>
+      </p:cxnSp>
+      <p:cxnSp>
+        <p:nvCxnSpPr>
+          <p:cNvPr id="75" name="Straight Arrow Connector 74"/>
+          <p:cNvCxnSpPr/>
+          <p:nvPr/>
+        </p:nvCxnSpPr>
+        <p:spPr>
+          <a:xfrm>
+            <a:off x="340462" y="3212976"/>
+            <a:ext cx="2880320" cy="0"/>
+          </a:xfrm>
+          <a:prstGeom prst="straightConnector1">
+            <a:avLst/>
+          </a:prstGeom>
+          <a:ln>
+            <a:headEnd type="arrow"/>
+            <a:tailEnd type="arrow"/>
+          </a:ln>
+        </p:spPr>
+        <p:style>
+          <a:lnRef idx="1">
+            <a:schemeClr val="accent1"/>
+          </a:lnRef>
+          <a:fillRef idx="0">
+            <a:schemeClr val="accent1"/>
+          </a:fillRef>
+          <a:effectRef idx="0">
+            <a:schemeClr val="accent1"/>
+          </a:effectRef>
+          <a:fontRef idx="minor">
+            <a:schemeClr val="tx1"/>
+          </a:fontRef>
+        </p:style>
+      </p:cxnSp>
+      <p:cxnSp>
+        <p:nvCxnSpPr>
+          <p:cNvPr id="76" name="Straight Arrow Connector 75"/>
+          <p:cNvCxnSpPr/>
+          <p:nvPr/>
+        </p:nvCxnSpPr>
+        <p:spPr>
+          <a:xfrm flipV="1">
+            <a:off x="3945134" y="2980018"/>
+            <a:ext cx="0" cy="504056"/>
+          </a:xfrm>
+          <a:prstGeom prst="straightConnector1">
+            <a:avLst/>
+          </a:prstGeom>
+          <a:ln>
+            <a:headEnd type="none"/>
+            <a:tailEnd type="triangle"/>
+          </a:ln>
+        </p:spPr>
+        <p:style>
+          <a:lnRef idx="1">
+            <a:schemeClr val="accent1"/>
+          </a:lnRef>
+          <a:fillRef idx="0">
+            <a:schemeClr val="accent1"/>
+          </a:fillRef>
+          <a:effectRef idx="0">
+            <a:schemeClr val="accent1"/>
+          </a:effectRef>
+          <a:fontRef idx="minor">
+            <a:schemeClr val="tx1"/>
+          </a:fontRef>
+        </p:style>
+      </p:cxnSp>
+      <p:cxnSp>
+        <p:nvCxnSpPr>
+          <p:cNvPr id="77" name="Straight Arrow Connector 76"/>
+          <p:cNvCxnSpPr/>
+          <p:nvPr/>
+        </p:nvCxnSpPr>
+        <p:spPr>
+          <a:xfrm flipV="1">
+            <a:off x="4662097" y="2980018"/>
+            <a:ext cx="0" cy="504056"/>
+          </a:xfrm>
+          <a:prstGeom prst="straightConnector1">
+            <a:avLst/>
+          </a:prstGeom>
+          <a:ln>
+            <a:tailEnd type="triangle"/>
+          </a:ln>
+        </p:spPr>
+        <p:style>
+          <a:lnRef idx="1">
+            <a:schemeClr val="accent1"/>
+          </a:lnRef>
+          <a:fillRef idx="0">
+            <a:schemeClr val="accent1"/>
+          </a:fillRef>
+          <a:effectRef idx="0">
+            <a:schemeClr val="accent1"/>
+          </a:effectRef>
+          <a:fontRef idx="minor">
+            <a:schemeClr val="tx1"/>
+          </a:fontRef>
+        </p:style>
+      </p:cxnSp>
+      <p:cxnSp>
+        <p:nvCxnSpPr>
+          <p:cNvPr id="78" name="Straight Arrow Connector 77"/>
+          <p:cNvCxnSpPr/>
+          <p:nvPr/>
+        </p:nvCxnSpPr>
+        <p:spPr>
+          <a:xfrm>
+            <a:off x="3940862" y="3212976"/>
+            <a:ext cx="720000" cy="0"/>
+          </a:xfrm>
+          <a:prstGeom prst="straightConnector1">
+            <a:avLst/>
+          </a:prstGeom>
+          <a:ln>
+            <a:headEnd type="arrow"/>
+            <a:tailEnd type="arrow"/>
+          </a:ln>
+        </p:spPr>
+        <p:style>
+          <a:lnRef idx="1">
+            <a:schemeClr val="accent1"/>
+          </a:lnRef>
+          <a:fillRef idx="0">
+            <a:schemeClr val="accent1"/>
+          </a:fillRef>
+          <a:effectRef idx="0">
+            <a:schemeClr val="accent1"/>
+          </a:effectRef>
+          <a:fontRef idx="minor">
+            <a:schemeClr val="tx1"/>
+          </a:fontRef>
+        </p:style>
+      </p:cxnSp>
+      <p:sp>
+        <p:nvSpPr>
+          <p:cNvPr id="79" name="TextBox 78"/>
+          <p:cNvSpPr txBox="1"/>
+          <p:nvPr/>
+        </p:nvSpPr>
+        <p:spPr>
+          <a:xfrm>
+            <a:off x="21334" y="3671886"/>
+            <a:ext cx="590226" cy="307777"/>
+          </a:xfrm>
+          <a:prstGeom prst="rect">
+            <a:avLst/>
+          </a:prstGeom>
+          <a:noFill/>
+        </p:spPr>
+        <p:txBody>
+          <a:bodyPr wrap="none" rtlCol="0">
+            <a:spAutoFit/>
+          </a:bodyPr>
+          <a:lstStyle/>
+          <a:p>
+            <a:r>
+              <a:rPr lang="en-US" sz="1400" dirty="0" err="1" smtClean="0"/>
+              <a:t>s</a:t>
+            </a:r>
+            <a:r>
+              <a:rPr lang="en-US" sz="1400" dirty="0" err="1" smtClean="0"/>
+              <a:t>eq_t</a:t>
+            </a:r>
+            <a:endParaRPr lang="en-US" sz="1400" dirty="0"/>
+          </a:p>
+        </p:txBody>
+      </p:sp>
+      <p:sp>
+        <p:nvSpPr>
+          <p:cNvPr id="82" name="TextBox 81"/>
+          <p:cNvSpPr txBox="1"/>
+          <p:nvPr/>
+        </p:nvSpPr>
+        <p:spPr>
+          <a:xfrm>
+            <a:off x="1212511" y="3142429"/>
+            <a:ext cx="386644" cy="307777"/>
+          </a:xfrm>
+          <a:prstGeom prst="rect">
+            <a:avLst/>
+          </a:prstGeom>
+          <a:noFill/>
+        </p:spPr>
+        <p:txBody>
+          <a:bodyPr wrap="none" rtlCol="0">
+            <a:spAutoFit/>
+          </a:bodyPr>
+          <a:lstStyle/>
+          <a:p>
+            <a:r>
+              <a:rPr lang="en-US" sz="1400" dirty="0" smtClean="0"/>
+              <a:t>2 s</a:t>
+            </a:r>
+            <a:endParaRPr lang="en-US" sz="1400" dirty="0"/>
+          </a:p>
+        </p:txBody>
+      </p:sp>
+      <p:sp>
+        <p:nvSpPr>
+          <p:cNvPr id="83" name="TextBox 82"/>
+          <p:cNvSpPr txBox="1"/>
+          <p:nvPr/>
+        </p:nvSpPr>
+        <p:spPr>
+          <a:xfrm>
+            <a:off x="4049100" y="3159363"/>
+            <a:ext cx="522900" cy="307777"/>
+          </a:xfrm>
+          <a:prstGeom prst="rect">
+            <a:avLst/>
+          </a:prstGeom>
+          <a:noFill/>
+        </p:spPr>
+        <p:txBody>
+          <a:bodyPr wrap="none" rtlCol="0">
+            <a:spAutoFit/>
+          </a:bodyPr>
+          <a:lstStyle/>
+          <a:p>
+            <a:r>
+              <a:rPr lang="en-US" sz="1400" dirty="0" smtClean="0"/>
+              <a:t>0.5 s</a:t>
+            </a:r>
+            <a:endParaRPr lang="en-US" sz="1400" dirty="0"/>
+          </a:p>
+        </p:txBody>
+      </p:sp>
+      <p:sp>
+        <p:nvSpPr>
+          <p:cNvPr id="84" name="TextBox 83"/>
+          <p:cNvSpPr txBox="1"/>
+          <p:nvPr/>
+        </p:nvSpPr>
+        <p:spPr>
+          <a:xfrm>
+            <a:off x="361668" y="4133398"/>
+            <a:ext cx="7992888" cy="1815882"/>
+          </a:xfrm>
+          <a:prstGeom prst="rect">
+            <a:avLst/>
+          </a:prstGeom>
+          <a:noFill/>
+        </p:spPr>
+        <p:txBody>
+          <a:bodyPr wrap="square" rtlCol="0">
+            <a:spAutoFit/>
+          </a:bodyPr>
+          <a:lstStyle/>
+          <a:p>
+            <a:r>
+              <a:rPr lang="en-US" sz="1400" dirty="0" smtClean="0"/>
+              <a:t>When the tempo is 120 </a:t>
+            </a:r>
+            <a:r>
+              <a:rPr lang="en-US" sz="1400" dirty="0" err="1" smtClean="0"/>
+              <a:t>bpm</a:t>
+            </a:r>
+            <a:r>
+              <a:rPr lang="en-US" sz="1400" dirty="0" smtClean="0"/>
+              <a:t>, one single beat has a duration of 0.5 s. </a:t>
+            </a:r>
+          </a:p>
+          <a:p>
+            <a:r>
+              <a:rPr lang="en-US" sz="1400" dirty="0" smtClean="0"/>
+              <a:t>A full measure in a “4/4” signature has a duration of 2 s.</a:t>
+            </a:r>
+          </a:p>
+          <a:p>
+            <a:endParaRPr lang="en-US" sz="1400" dirty="0" smtClean="0"/>
+          </a:p>
+          <a:p>
+            <a:r>
+              <a:rPr lang="en-US" sz="1400" dirty="0" smtClean="0"/>
+              <a:t>Time in a sequence is called “sequence time” (</a:t>
+            </a:r>
+            <a:r>
+              <a:rPr lang="en-US" sz="1400" dirty="0" err="1" smtClean="0"/>
+              <a:t>seq_t</a:t>
+            </a:r>
+            <a:r>
+              <a:rPr lang="en-US" sz="1400" dirty="0" smtClean="0"/>
+              <a:t>).  At the start of the first measure </a:t>
+            </a:r>
+            <a:r>
+              <a:rPr lang="en-US" sz="1400" dirty="0" err="1" smtClean="0"/>
+              <a:t>seq_t</a:t>
+            </a:r>
+            <a:r>
+              <a:rPr lang="en-US" sz="1400" dirty="0" smtClean="0"/>
+              <a:t> equals 0.</a:t>
+            </a:r>
+          </a:p>
+          <a:p>
+            <a:endParaRPr lang="en-US" sz="1400" dirty="0" smtClean="0"/>
+          </a:p>
+          <a:p>
+            <a:r>
+              <a:rPr lang="en-US" sz="1400" dirty="0" smtClean="0"/>
+              <a:t>Every event in a sequence can be characterized by a timestamp, that is a measure of elapsed sequence time relative to the start of the first measure. Event A takes place approximately at </a:t>
+            </a:r>
+            <a:r>
+              <a:rPr lang="en-US" sz="1400" dirty="0" err="1" smtClean="0"/>
+              <a:t>seq_t</a:t>
+            </a:r>
+            <a:r>
+              <a:rPr lang="en-US" sz="1400" dirty="0" smtClean="0"/>
+              <a:t> = 4.25 s  (at 120 </a:t>
+            </a:r>
+            <a:r>
+              <a:rPr lang="en-US" sz="1400" dirty="0" err="1" smtClean="0"/>
+              <a:t>bpm</a:t>
+            </a:r>
+            <a:r>
+              <a:rPr lang="en-US" sz="1400" dirty="0" smtClean="0"/>
+              <a:t>)</a:t>
+            </a:r>
+          </a:p>
+          <a:p>
+            <a:r>
+              <a:rPr lang="en-US" sz="1400" dirty="0" smtClean="0"/>
+              <a:t>  </a:t>
+            </a:r>
+            <a:endParaRPr lang="en-US" sz="1400" dirty="0"/>
+          </a:p>
+        </p:txBody>
+      </p:sp>
+      <p:cxnSp>
+        <p:nvCxnSpPr>
+          <p:cNvPr id="85" name="Straight Arrow Connector 84"/>
+          <p:cNvCxnSpPr/>
+          <p:nvPr/>
+        </p:nvCxnSpPr>
+        <p:spPr>
+          <a:xfrm flipV="1">
+            <a:off x="6490815" y="2924944"/>
+            <a:ext cx="0" cy="504056"/>
+          </a:xfrm>
+          <a:prstGeom prst="straightConnector1">
+            <a:avLst/>
+          </a:prstGeom>
+          <a:ln>
+            <a:tailEnd type="triangle"/>
+          </a:ln>
+        </p:spPr>
+        <p:style>
+          <a:lnRef idx="1">
+            <a:schemeClr val="accent1"/>
+          </a:lnRef>
+          <a:fillRef idx="0">
+            <a:schemeClr val="accent1"/>
+          </a:fillRef>
+          <a:effectRef idx="0">
+            <a:schemeClr val="accent1"/>
+          </a:effectRef>
+          <a:fontRef idx="minor">
+            <a:schemeClr val="tx1"/>
+          </a:fontRef>
+        </p:style>
+      </p:cxnSp>
+      <p:sp>
+        <p:nvSpPr>
+          <p:cNvPr id="86" name="Explosion 1 85"/>
+          <p:cNvSpPr/>
+          <p:nvPr/>
+        </p:nvSpPr>
+        <p:spPr>
+          <a:xfrm>
+            <a:off x="6588224" y="3068960"/>
+            <a:ext cx="144016" cy="144016"/>
+          </a:xfrm>
+          <a:prstGeom prst="irregularSeal1">
+            <a:avLst/>
+          </a:prstGeom>
+          <a:solidFill>
+            <a:srgbClr val="FF0000"/>
+          </a:solidFill>
+          <a:ln w="6350">
+            <a:solidFill>
+              <a:schemeClr val="tx1"/>
+            </a:solidFill>
+          </a:ln>
+        </p:spPr>
+        <p:style>
+          <a:lnRef idx="2">
+            <a:schemeClr val="accent1">
+              <a:shade val="50000"/>
+            </a:schemeClr>
+          </a:lnRef>
+          <a:fillRef idx="1">
+            <a:schemeClr val="accent1"/>
+          </a:fillRef>
+          <a:effectRef idx="0">
+            <a:schemeClr val="accent1"/>
+          </a:effectRef>
+          <a:fontRef idx="minor">
+            <a:schemeClr val="lt1"/>
+          </a:fontRef>
+        </p:style>
+        <p:txBody>
+          <a:bodyPr rtlCol="0" anchor="ctr"/>
+          <a:lstStyle/>
+          <a:p>
+            <a:pPr algn="ctr"/>
+            <a:endParaRPr lang="en-US"/>
+          </a:p>
+        </p:txBody>
+      </p:sp>
+      <p:sp>
+        <p:nvSpPr>
+          <p:cNvPr id="87" name="TextBox 86"/>
+          <p:cNvSpPr txBox="1"/>
+          <p:nvPr/>
+        </p:nvSpPr>
+        <p:spPr>
+          <a:xfrm>
+            <a:off x="5957086" y="3429000"/>
+            <a:ext cx="1079142" cy="523220"/>
+          </a:xfrm>
+          <a:prstGeom prst="rect">
+            <a:avLst/>
+          </a:prstGeom>
+          <a:noFill/>
+        </p:spPr>
+        <p:txBody>
+          <a:bodyPr wrap="none" rtlCol="0">
+            <a:spAutoFit/>
+          </a:bodyPr>
+          <a:lstStyle/>
+          <a:p>
+            <a:r>
+              <a:rPr lang="en-US" sz="1400" dirty="0" smtClean="0"/>
+              <a:t>event A</a:t>
+            </a:r>
+          </a:p>
+          <a:p>
+            <a:r>
+              <a:rPr lang="en-US" sz="1400" dirty="0" err="1" smtClean="0"/>
+              <a:t>s</a:t>
+            </a:r>
+            <a:r>
+              <a:rPr lang="en-US" sz="1400" dirty="0" err="1" smtClean="0"/>
+              <a:t>eq_t</a:t>
+            </a:r>
+            <a:r>
+              <a:rPr lang="en-US" sz="1400" dirty="0" smtClean="0"/>
+              <a:t> = 4.25</a:t>
+            </a:r>
+            <a:endParaRPr lang="en-US" sz="1400" dirty="0"/>
+          </a:p>
+        </p:txBody>
+      </p:sp>
+    </p:spTree>
+  </p:cSld>
+  <p:clrMapOvr>
+    <a:masterClrMapping/>
+  </p:clrMapOvr>
+</p:sld>
+</file>
+
+<file path=ppt/slides/slide8.xml><?xml version="1.0" encoding="utf-8"?>
+<p:sld xmlns:a="http://schemas.openxmlformats.org/drawingml/2006/main" xmlns:r="http://schemas.openxmlformats.org/officeDocument/2006/relationships" xmlns:p="http://schemas.openxmlformats.org/presentationml/2006/main">
+  <p:cSld>
+    <p:spTree>
+      <p:nvGrpSpPr>
+        <p:cNvPr id="1" name=""/>
+        <p:cNvGrpSpPr/>
+        <p:nvPr/>
+      </p:nvGrpSpPr>
+      <p:grpSpPr>
+        <a:xfrm>
+          <a:off x="0" y="0"/>
+          <a:ext cx="0" cy="0"/>
+          <a:chOff x="0" y="0"/>
+          <a:chExt cx="0" cy="0"/>
+        </a:xfrm>
+      </p:grpSpPr>
+      <p:sp>
+        <p:nvSpPr>
+          <p:cNvPr id="27" name="TextBox 26"/>
+          <p:cNvSpPr txBox="1"/>
+          <p:nvPr/>
+        </p:nvSpPr>
+        <p:spPr>
+          <a:xfrm>
+            <a:off x="272803" y="260648"/>
+            <a:ext cx="8588890" cy="523220"/>
+          </a:xfrm>
+          <a:prstGeom prst="rect">
+            <a:avLst/>
+          </a:prstGeom>
+          <a:noFill/>
+        </p:spPr>
+        <p:txBody>
+          <a:bodyPr wrap="none" rtlCol="0">
+            <a:spAutoFit/>
+          </a:bodyPr>
+          <a:lstStyle/>
+          <a:p>
+            <a:r>
+              <a:rPr lang="en-US" sz="1400" dirty="0" smtClean="0"/>
+              <a:t>When playing a sequence or a part of a sequence it is useful to start and stop at the start and end of a full measure.</a:t>
+            </a:r>
+          </a:p>
+          <a:p>
+            <a:r>
+              <a:rPr lang="en-US" sz="1400" dirty="0" smtClean="0"/>
+              <a:t>This is particularly useful when repeating a part of a sequence (loop mode).</a:t>
+            </a:r>
+            <a:endParaRPr lang="en-US" sz="1400" dirty="0"/>
+          </a:p>
+        </p:txBody>
+      </p:sp>
+      <p:sp>
+        <p:nvSpPr>
+          <p:cNvPr id="28" name="TextBox 27"/>
+          <p:cNvSpPr txBox="1"/>
+          <p:nvPr/>
+        </p:nvSpPr>
+        <p:spPr>
+          <a:xfrm>
+            <a:off x="272803" y="2259449"/>
+            <a:ext cx="5757602" cy="307777"/>
+          </a:xfrm>
+          <a:prstGeom prst="rect">
+            <a:avLst/>
+          </a:prstGeom>
+          <a:noFill/>
+        </p:spPr>
+        <p:txBody>
+          <a:bodyPr wrap="none" rtlCol="0">
+            <a:spAutoFit/>
+          </a:bodyPr>
+          <a:lstStyle/>
+          <a:p>
+            <a:r>
+              <a:rPr lang="en-US" sz="1400" dirty="0" smtClean="0"/>
+              <a:t>A sequence is a sequence of full measures: here is a sequence of 3 measures</a:t>
+            </a:r>
+            <a:endParaRPr lang="en-US" sz="1400" dirty="0"/>
+          </a:p>
+        </p:txBody>
+      </p:sp>
+      <p:grpSp>
+        <p:nvGrpSpPr>
+          <p:cNvPr id="7" name="Group 46"/>
+          <p:cNvGrpSpPr/>
+          <p:nvPr/>
+        </p:nvGrpSpPr>
+        <p:grpSpPr>
+          <a:xfrm>
+            <a:off x="344811" y="2780928"/>
+            <a:ext cx="2884512" cy="144016"/>
+            <a:chOff x="541751" y="1412776"/>
+            <a:chExt cx="2884512" cy="144016"/>
+          </a:xfrm>
+        </p:grpSpPr>
+        <p:sp>
+          <p:nvSpPr>
+            <p:cNvPr id="48" name="Rectangle 47"/>
+            <p:cNvSpPr/>
+            <p:nvPr/>
+          </p:nvSpPr>
+          <p:spPr>
+            <a:xfrm>
+              <a:off x="541751" y="1412776"/>
+              <a:ext cx="720080" cy="144016"/>
+            </a:xfrm>
+            <a:prstGeom prst="rect">
+              <a:avLst/>
+            </a:prstGeom>
+            <a:solidFill>
+              <a:srgbClr val="FFFF00"/>
+            </a:solidFill>
+            <a:ln>
+              <a:solidFill>
+                <a:schemeClr val="tx1"/>
+              </a:solidFill>
+            </a:ln>
+          </p:spPr>
+          <p:style>
+            <a:lnRef idx="2">
+              <a:schemeClr val="accent3">
+                <a:shade val="50000"/>
+              </a:schemeClr>
+            </a:lnRef>
+            <a:fillRef idx="1">
+              <a:schemeClr val="accent3"/>
+            </a:fillRef>
+            <a:effectRef idx="0">
+              <a:schemeClr val="accent3"/>
+            </a:effectRef>
+            <a:fontRef idx="minor">
+              <a:schemeClr val="lt1"/>
+            </a:fontRef>
+          </p:style>
+          <p:txBody>
+            <a:bodyPr rtlCol="0" anchor="ctr"/>
+            <a:lstStyle/>
+            <a:p>
+              <a:pPr algn="ctr"/>
+              <a:endParaRPr lang="en-US"/>
+            </a:p>
+          </p:txBody>
+        </p:sp>
+        <p:sp>
+          <p:nvSpPr>
+            <p:cNvPr id="49" name="Rectangle 48"/>
+            <p:cNvSpPr/>
+            <p:nvPr/>
+          </p:nvSpPr>
+          <p:spPr>
+            <a:xfrm>
+              <a:off x="1263228" y="1412776"/>
+              <a:ext cx="720080" cy="144016"/>
+            </a:xfrm>
+            <a:prstGeom prst="rect">
+              <a:avLst/>
+            </a:prstGeom>
+            <a:solidFill>
+              <a:srgbClr val="FFFF00"/>
+            </a:solidFill>
+            <a:ln>
+              <a:solidFill>
+                <a:schemeClr val="tx1"/>
+              </a:solidFill>
+            </a:ln>
+          </p:spPr>
+          <p:style>
+            <a:lnRef idx="2">
+              <a:schemeClr val="accent3">
+                <a:shade val="50000"/>
+              </a:schemeClr>
+            </a:lnRef>
+            <a:fillRef idx="1">
+              <a:schemeClr val="accent3"/>
+            </a:fillRef>
+            <a:effectRef idx="0">
+              <a:schemeClr val="accent3"/>
+            </a:effectRef>
+            <a:fontRef idx="minor">
+              <a:schemeClr val="lt1"/>
+            </a:fontRef>
+          </p:style>
+          <p:txBody>
+            <a:bodyPr rtlCol="0" anchor="ctr"/>
+            <a:lstStyle/>
+            <a:p>
+              <a:pPr algn="ctr"/>
+              <a:endParaRPr lang="en-US"/>
+            </a:p>
+          </p:txBody>
+        </p:sp>
+        <p:sp>
+          <p:nvSpPr>
+            <p:cNvPr id="50" name="Rectangle 49"/>
+            <p:cNvSpPr/>
+            <p:nvPr/>
+          </p:nvSpPr>
+          <p:spPr>
+            <a:xfrm>
+              <a:off x="1984705" y="1412776"/>
+              <a:ext cx="720080" cy="144016"/>
+            </a:xfrm>
+            <a:prstGeom prst="rect">
+              <a:avLst/>
+            </a:prstGeom>
+            <a:solidFill>
+              <a:srgbClr val="FFFF00"/>
+            </a:solidFill>
+            <a:ln>
+              <a:solidFill>
+                <a:schemeClr val="tx1"/>
+              </a:solidFill>
+            </a:ln>
+          </p:spPr>
+          <p:style>
+            <a:lnRef idx="2">
+              <a:schemeClr val="accent3">
+                <a:shade val="50000"/>
+              </a:schemeClr>
+            </a:lnRef>
+            <a:fillRef idx="1">
+              <a:schemeClr val="accent3"/>
+            </a:fillRef>
+            <a:effectRef idx="0">
+              <a:schemeClr val="accent3"/>
+            </a:effectRef>
+            <a:fontRef idx="minor">
+              <a:schemeClr val="lt1"/>
+            </a:fontRef>
+          </p:style>
+          <p:txBody>
+            <a:bodyPr rtlCol="0" anchor="ctr"/>
+            <a:lstStyle/>
+            <a:p>
+              <a:pPr algn="ctr"/>
+              <a:endParaRPr lang="en-US"/>
+            </a:p>
+          </p:txBody>
+        </p:sp>
+        <p:sp>
+          <p:nvSpPr>
+            <p:cNvPr id="51" name="Rectangle 50"/>
+            <p:cNvSpPr/>
+            <p:nvPr/>
+          </p:nvSpPr>
+          <p:spPr>
+            <a:xfrm>
+              <a:off x="2706183" y="1412776"/>
+              <a:ext cx="720080" cy="144016"/>
+            </a:xfrm>
+            <a:prstGeom prst="rect">
+              <a:avLst/>
+            </a:prstGeom>
+            <a:solidFill>
+              <a:srgbClr val="FFFF00"/>
+            </a:solidFill>
+            <a:ln>
+              <a:solidFill>
+                <a:schemeClr val="tx1"/>
+              </a:solidFill>
+            </a:ln>
+          </p:spPr>
+          <p:style>
+            <a:lnRef idx="2">
+              <a:schemeClr val="accent3">
+                <a:shade val="50000"/>
+              </a:schemeClr>
+            </a:lnRef>
+            <a:fillRef idx="1">
+              <a:schemeClr val="accent3"/>
+            </a:fillRef>
+            <a:effectRef idx="0">
+              <a:schemeClr val="accent3"/>
+            </a:effectRef>
+            <a:fontRef idx="minor">
+              <a:schemeClr val="lt1"/>
+            </a:fontRef>
+          </p:style>
+          <p:txBody>
+            <a:bodyPr rtlCol="0" anchor="ctr"/>
+            <a:lstStyle/>
+            <a:p>
+              <a:pPr algn="ctr"/>
+              <a:endParaRPr lang="en-US"/>
+            </a:p>
+          </p:txBody>
+        </p:sp>
+        <p:sp>
+          <p:nvSpPr>
+            <p:cNvPr id="52" name="Rectangle 51"/>
+            <p:cNvSpPr/>
+            <p:nvPr/>
+          </p:nvSpPr>
+          <p:spPr>
+            <a:xfrm>
+              <a:off x="545414" y="1412776"/>
+              <a:ext cx="2880000" cy="144000"/>
+            </a:xfrm>
+            <a:prstGeom prst="rect">
+              <a:avLst/>
+            </a:prstGeom>
+            <a:noFill/>
+            <a:ln w="38100">
+              <a:solidFill>
+                <a:srgbClr val="FF0000"/>
+              </a:solidFill>
+            </a:ln>
+          </p:spPr>
+          <p:style>
+            <a:lnRef idx="2">
+              <a:schemeClr val="accent1">
+                <a:shade val="50000"/>
+              </a:schemeClr>
+            </a:lnRef>
+            <a:fillRef idx="1">
+              <a:schemeClr val="accent1"/>
+            </a:fillRef>
+            <a:effectRef idx="0">
+              <a:schemeClr val="accent1"/>
+            </a:effectRef>
+            <a:fontRef idx="minor">
+              <a:schemeClr val="lt1"/>
+            </a:fontRef>
+          </p:style>
+          <p:txBody>
+            <a:bodyPr rtlCol="0" anchor="ctr"/>
+            <a:lstStyle/>
+            <a:p>
+              <a:pPr algn="ctr"/>
+              <a:endParaRPr lang="en-US"/>
+            </a:p>
+          </p:txBody>
+        </p:sp>
+      </p:grpSp>
+      <p:grpSp>
+        <p:nvGrpSpPr>
+          <p:cNvPr id="8" name="Group 52"/>
+          <p:cNvGrpSpPr/>
+          <p:nvPr/>
+        </p:nvGrpSpPr>
+        <p:grpSpPr>
+          <a:xfrm>
+            <a:off x="6109723" y="2780928"/>
+            <a:ext cx="2884512" cy="144016"/>
+            <a:chOff x="541751" y="1412776"/>
+            <a:chExt cx="2884512" cy="144016"/>
+          </a:xfrm>
+        </p:grpSpPr>
+        <p:sp>
+          <p:nvSpPr>
+            <p:cNvPr id="54" name="Rectangle 53"/>
+            <p:cNvSpPr/>
+            <p:nvPr/>
+          </p:nvSpPr>
+          <p:spPr>
+            <a:xfrm>
+              <a:off x="541751" y="1412776"/>
+              <a:ext cx="720080" cy="144016"/>
+            </a:xfrm>
+            <a:prstGeom prst="rect">
+              <a:avLst/>
+            </a:prstGeom>
+            <a:solidFill>
+              <a:srgbClr val="FFFF00"/>
+            </a:solidFill>
+            <a:ln>
+              <a:solidFill>
+                <a:schemeClr val="tx1"/>
+              </a:solidFill>
+            </a:ln>
+          </p:spPr>
+          <p:style>
+            <a:lnRef idx="2">
+              <a:schemeClr val="accent3">
+                <a:shade val="50000"/>
+              </a:schemeClr>
+            </a:lnRef>
+            <a:fillRef idx="1">
+              <a:schemeClr val="accent3"/>
+            </a:fillRef>
+            <a:effectRef idx="0">
+              <a:schemeClr val="accent3"/>
+            </a:effectRef>
+            <a:fontRef idx="minor">
+              <a:schemeClr val="lt1"/>
+            </a:fontRef>
+          </p:style>
+          <p:txBody>
+            <a:bodyPr rtlCol="0" anchor="ctr"/>
+            <a:lstStyle/>
+            <a:p>
+              <a:pPr algn="ctr"/>
+              <a:endParaRPr lang="en-US"/>
+            </a:p>
+          </p:txBody>
+        </p:sp>
+        <p:sp>
+          <p:nvSpPr>
+            <p:cNvPr id="55" name="Rectangle 54"/>
+            <p:cNvSpPr/>
+            <p:nvPr/>
+          </p:nvSpPr>
+          <p:spPr>
+            <a:xfrm>
+              <a:off x="1263228" y="1412776"/>
+              <a:ext cx="720080" cy="144016"/>
+            </a:xfrm>
+            <a:prstGeom prst="rect">
+              <a:avLst/>
+            </a:prstGeom>
+            <a:solidFill>
+              <a:srgbClr val="FFFF00"/>
+            </a:solidFill>
+            <a:ln>
+              <a:solidFill>
+                <a:schemeClr val="tx1"/>
+              </a:solidFill>
+            </a:ln>
+          </p:spPr>
+          <p:style>
+            <a:lnRef idx="2">
+              <a:schemeClr val="accent3">
+                <a:shade val="50000"/>
+              </a:schemeClr>
+            </a:lnRef>
+            <a:fillRef idx="1">
+              <a:schemeClr val="accent3"/>
+            </a:fillRef>
+            <a:effectRef idx="0">
+              <a:schemeClr val="accent3"/>
+            </a:effectRef>
+            <a:fontRef idx="minor">
+              <a:schemeClr val="lt1"/>
+            </a:fontRef>
+          </p:style>
+          <p:txBody>
+            <a:bodyPr rtlCol="0" anchor="ctr"/>
+            <a:lstStyle/>
+            <a:p>
+              <a:pPr algn="ctr"/>
+              <a:endParaRPr lang="en-US"/>
+            </a:p>
+          </p:txBody>
+        </p:sp>
+        <p:sp>
+          <p:nvSpPr>
+            <p:cNvPr id="56" name="Rectangle 55"/>
+            <p:cNvSpPr/>
+            <p:nvPr/>
+          </p:nvSpPr>
+          <p:spPr>
+            <a:xfrm>
+              <a:off x="1984705" y="1412776"/>
+              <a:ext cx="720080" cy="144016"/>
+            </a:xfrm>
+            <a:prstGeom prst="rect">
+              <a:avLst/>
+            </a:prstGeom>
+            <a:solidFill>
+              <a:srgbClr val="FFFF00"/>
+            </a:solidFill>
+            <a:ln>
+              <a:solidFill>
+                <a:schemeClr val="tx1"/>
+              </a:solidFill>
+            </a:ln>
+          </p:spPr>
+          <p:style>
+            <a:lnRef idx="2">
+              <a:schemeClr val="accent3">
+                <a:shade val="50000"/>
+              </a:schemeClr>
+            </a:lnRef>
+            <a:fillRef idx="1">
+              <a:schemeClr val="accent3"/>
+            </a:fillRef>
+            <a:effectRef idx="0">
+              <a:schemeClr val="accent3"/>
+            </a:effectRef>
+            <a:fontRef idx="minor">
+              <a:schemeClr val="lt1"/>
+            </a:fontRef>
+          </p:style>
+          <p:txBody>
+            <a:bodyPr rtlCol="0" anchor="ctr"/>
+            <a:lstStyle/>
+            <a:p>
+              <a:pPr algn="ctr"/>
+              <a:endParaRPr lang="en-US"/>
+            </a:p>
+          </p:txBody>
+        </p:sp>
+        <p:sp>
+          <p:nvSpPr>
+            <p:cNvPr id="57" name="Rectangle 56"/>
+            <p:cNvSpPr/>
+            <p:nvPr/>
+          </p:nvSpPr>
+          <p:spPr>
+            <a:xfrm>
+              <a:off x="2706183" y="1412776"/>
+              <a:ext cx="720080" cy="144016"/>
+            </a:xfrm>
+            <a:prstGeom prst="rect">
+              <a:avLst/>
+            </a:prstGeom>
+            <a:solidFill>
+              <a:srgbClr val="FFFF00"/>
+            </a:solidFill>
+            <a:ln>
+              <a:solidFill>
+                <a:schemeClr val="tx1"/>
+              </a:solidFill>
+            </a:ln>
+          </p:spPr>
+          <p:style>
+            <a:lnRef idx="2">
+              <a:schemeClr val="accent3">
+                <a:shade val="50000"/>
+              </a:schemeClr>
+            </a:lnRef>
+            <a:fillRef idx="1">
+              <a:schemeClr val="accent3"/>
+            </a:fillRef>
+            <a:effectRef idx="0">
+              <a:schemeClr val="accent3"/>
+            </a:effectRef>
+            <a:fontRef idx="minor">
+              <a:schemeClr val="lt1"/>
+            </a:fontRef>
+          </p:style>
+          <p:txBody>
+            <a:bodyPr rtlCol="0" anchor="ctr"/>
+            <a:lstStyle/>
+            <a:p>
+              <a:pPr algn="ctr"/>
+              <a:endParaRPr lang="en-US"/>
+            </a:p>
+          </p:txBody>
+        </p:sp>
+        <p:sp>
+          <p:nvSpPr>
+            <p:cNvPr id="58" name="Rectangle 57"/>
+            <p:cNvSpPr/>
+            <p:nvPr/>
+          </p:nvSpPr>
+          <p:spPr>
+            <a:xfrm>
+              <a:off x="545414" y="1412776"/>
+              <a:ext cx="2880000" cy="144000"/>
+            </a:xfrm>
+            <a:prstGeom prst="rect">
+              <a:avLst/>
+            </a:prstGeom>
+            <a:noFill/>
+            <a:ln w="38100">
+              <a:solidFill>
+                <a:srgbClr val="FF0000"/>
+              </a:solidFill>
+            </a:ln>
+          </p:spPr>
+          <p:style>
+            <a:lnRef idx="2">
+              <a:schemeClr val="accent1">
+                <a:shade val="50000"/>
+              </a:schemeClr>
+            </a:lnRef>
+            <a:fillRef idx="1">
+              <a:schemeClr val="accent1"/>
+            </a:fillRef>
+            <a:effectRef idx="0">
+              <a:schemeClr val="accent1"/>
+            </a:effectRef>
+            <a:fontRef idx="minor">
+              <a:schemeClr val="lt1"/>
+            </a:fontRef>
+          </p:style>
+          <p:txBody>
+            <a:bodyPr rtlCol="0" anchor="ctr"/>
+            <a:lstStyle/>
+            <a:p>
+              <a:pPr algn="ctr"/>
+              <a:endParaRPr lang="en-US"/>
+            </a:p>
+          </p:txBody>
+        </p:sp>
+      </p:grpSp>
+      <p:grpSp>
+        <p:nvGrpSpPr>
+          <p:cNvPr id="9" name="Group 58"/>
+          <p:cNvGrpSpPr/>
+          <p:nvPr/>
+        </p:nvGrpSpPr>
+        <p:grpSpPr>
+          <a:xfrm>
+            <a:off x="3225131" y="2780928"/>
+            <a:ext cx="2884512" cy="144016"/>
+            <a:chOff x="541751" y="1412776"/>
+            <a:chExt cx="2884512" cy="144016"/>
+          </a:xfrm>
+        </p:grpSpPr>
+        <p:sp>
+          <p:nvSpPr>
+            <p:cNvPr id="60" name="Rectangle 59"/>
+            <p:cNvSpPr/>
+            <p:nvPr/>
+          </p:nvSpPr>
+          <p:spPr>
+            <a:xfrm>
+              <a:off x="541751" y="1412776"/>
+              <a:ext cx="720080" cy="144016"/>
+            </a:xfrm>
+            <a:prstGeom prst="rect">
+              <a:avLst/>
+            </a:prstGeom>
+            <a:solidFill>
+              <a:srgbClr val="FFFF00"/>
+            </a:solidFill>
+            <a:ln>
+              <a:solidFill>
+                <a:schemeClr val="tx1"/>
+              </a:solidFill>
+            </a:ln>
+          </p:spPr>
+          <p:style>
+            <a:lnRef idx="2">
+              <a:schemeClr val="accent3">
+                <a:shade val="50000"/>
+              </a:schemeClr>
+            </a:lnRef>
+            <a:fillRef idx="1">
+              <a:schemeClr val="accent3"/>
+            </a:fillRef>
+            <a:effectRef idx="0">
+              <a:schemeClr val="accent3"/>
+            </a:effectRef>
+            <a:fontRef idx="minor">
+              <a:schemeClr val="lt1"/>
+            </a:fontRef>
+          </p:style>
+          <p:txBody>
+            <a:bodyPr rtlCol="0" anchor="ctr"/>
+            <a:lstStyle/>
+            <a:p>
+              <a:pPr algn="ctr"/>
+              <a:endParaRPr lang="en-US"/>
+            </a:p>
+          </p:txBody>
+        </p:sp>
+        <p:sp>
+          <p:nvSpPr>
+            <p:cNvPr id="61" name="Rectangle 60"/>
+            <p:cNvSpPr/>
+            <p:nvPr/>
+          </p:nvSpPr>
+          <p:spPr>
+            <a:xfrm>
+              <a:off x="1263228" y="1412776"/>
+              <a:ext cx="720080" cy="144016"/>
+            </a:xfrm>
+            <a:prstGeom prst="rect">
+              <a:avLst/>
+            </a:prstGeom>
+            <a:solidFill>
+              <a:srgbClr val="FFFF00"/>
+            </a:solidFill>
+            <a:ln>
+              <a:solidFill>
+                <a:schemeClr val="tx1"/>
+              </a:solidFill>
+            </a:ln>
+          </p:spPr>
+          <p:style>
+            <a:lnRef idx="2">
+              <a:schemeClr val="accent3">
+                <a:shade val="50000"/>
+              </a:schemeClr>
+            </a:lnRef>
+            <a:fillRef idx="1">
+              <a:schemeClr val="accent3"/>
+            </a:fillRef>
+            <a:effectRef idx="0">
+              <a:schemeClr val="accent3"/>
+            </a:effectRef>
+            <a:fontRef idx="minor">
+              <a:schemeClr val="lt1"/>
+            </a:fontRef>
+          </p:style>
+          <p:txBody>
+            <a:bodyPr rtlCol="0" anchor="ctr"/>
+            <a:lstStyle/>
+            <a:p>
+              <a:pPr algn="ctr"/>
+              <a:endParaRPr lang="en-US"/>
+            </a:p>
+          </p:txBody>
+        </p:sp>
+        <p:sp>
+          <p:nvSpPr>
+            <p:cNvPr id="62" name="Rectangle 61"/>
+            <p:cNvSpPr/>
+            <p:nvPr/>
+          </p:nvSpPr>
+          <p:spPr>
+            <a:xfrm>
+              <a:off x="1984705" y="1412776"/>
+              <a:ext cx="720080" cy="144016"/>
+            </a:xfrm>
+            <a:prstGeom prst="rect">
+              <a:avLst/>
+            </a:prstGeom>
+            <a:solidFill>
+              <a:srgbClr val="FFFF00"/>
+            </a:solidFill>
+            <a:ln>
+              <a:solidFill>
+                <a:schemeClr val="tx1"/>
+              </a:solidFill>
+            </a:ln>
+          </p:spPr>
+          <p:style>
+            <a:lnRef idx="2">
+              <a:schemeClr val="accent3">
+                <a:shade val="50000"/>
+              </a:schemeClr>
+            </a:lnRef>
+            <a:fillRef idx="1">
+              <a:schemeClr val="accent3"/>
+            </a:fillRef>
+            <a:effectRef idx="0">
+              <a:schemeClr val="accent3"/>
+            </a:effectRef>
+            <a:fontRef idx="minor">
+              <a:schemeClr val="lt1"/>
+            </a:fontRef>
+          </p:style>
+          <p:txBody>
+            <a:bodyPr rtlCol="0" anchor="ctr"/>
+            <a:lstStyle/>
+            <a:p>
+              <a:pPr algn="ctr"/>
+              <a:endParaRPr lang="en-US"/>
+            </a:p>
+          </p:txBody>
+        </p:sp>
+        <p:sp>
+          <p:nvSpPr>
+            <p:cNvPr id="63" name="Rectangle 62"/>
+            <p:cNvSpPr/>
+            <p:nvPr/>
+          </p:nvSpPr>
+          <p:spPr>
+            <a:xfrm>
+              <a:off x="2706183" y="1412776"/>
+              <a:ext cx="720080" cy="144016"/>
+            </a:xfrm>
+            <a:prstGeom prst="rect">
+              <a:avLst/>
+            </a:prstGeom>
+            <a:solidFill>
+              <a:srgbClr val="FFFF00"/>
+            </a:solidFill>
+            <a:ln>
+              <a:solidFill>
+                <a:schemeClr val="tx1"/>
+              </a:solidFill>
+            </a:ln>
+          </p:spPr>
+          <p:style>
+            <a:lnRef idx="2">
+              <a:schemeClr val="accent3">
+                <a:shade val="50000"/>
+              </a:schemeClr>
+            </a:lnRef>
+            <a:fillRef idx="1">
+              <a:schemeClr val="accent3"/>
+            </a:fillRef>
+            <a:effectRef idx="0">
+              <a:schemeClr val="accent3"/>
+            </a:effectRef>
+            <a:fontRef idx="minor">
+              <a:schemeClr val="lt1"/>
+            </a:fontRef>
+          </p:style>
+          <p:txBody>
+            <a:bodyPr rtlCol="0" anchor="ctr"/>
+            <a:lstStyle/>
+            <a:p>
+              <a:pPr algn="ctr"/>
+              <a:endParaRPr lang="en-US"/>
+            </a:p>
+          </p:txBody>
+        </p:sp>
+        <p:sp>
+          <p:nvSpPr>
+            <p:cNvPr id="64" name="Rectangle 63"/>
+            <p:cNvSpPr/>
+            <p:nvPr/>
+          </p:nvSpPr>
+          <p:spPr>
+            <a:xfrm>
+              <a:off x="545414" y="1412776"/>
+              <a:ext cx="2880000" cy="144000"/>
+            </a:xfrm>
+            <a:prstGeom prst="rect">
+              <a:avLst/>
+            </a:prstGeom>
+            <a:noFill/>
+            <a:ln w="38100">
+              <a:solidFill>
+                <a:srgbClr val="FF0000"/>
+              </a:solidFill>
+            </a:ln>
+          </p:spPr>
+          <p:style>
+            <a:lnRef idx="2">
+              <a:schemeClr val="accent1">
+                <a:shade val="50000"/>
+              </a:schemeClr>
+            </a:lnRef>
+            <a:fillRef idx="1">
+              <a:schemeClr val="accent1"/>
+            </a:fillRef>
+            <a:effectRef idx="0">
+              <a:schemeClr val="accent1"/>
+            </a:effectRef>
+            <a:fontRef idx="minor">
+              <a:schemeClr val="lt1"/>
+            </a:fontRef>
+          </p:style>
+          <p:txBody>
+            <a:bodyPr rtlCol="0" anchor="ctr"/>
+            <a:lstStyle/>
+            <a:p>
+              <a:pPr algn="ctr"/>
+              <a:endParaRPr lang="en-US"/>
+            </a:p>
+          </p:txBody>
+        </p:sp>
+      </p:grpSp>
+      <p:cxnSp>
+        <p:nvCxnSpPr>
+          <p:cNvPr id="67" name="Straight Arrow Connector 66"/>
+          <p:cNvCxnSpPr/>
+          <p:nvPr/>
+        </p:nvCxnSpPr>
+        <p:spPr>
+          <a:xfrm flipV="1">
+            <a:off x="344734" y="2980018"/>
+            <a:ext cx="0" cy="504056"/>
+          </a:xfrm>
+          <a:prstGeom prst="straightConnector1">
+            <a:avLst/>
+          </a:prstGeom>
+          <a:ln>
+            <a:headEnd type="none"/>
+            <a:tailEnd type="triangle"/>
+          </a:ln>
+        </p:spPr>
+        <p:style>
+          <a:lnRef idx="1">
+            <a:schemeClr val="accent1"/>
+          </a:lnRef>
+          <a:fillRef idx="0">
+            <a:schemeClr val="accent1"/>
+          </a:fillRef>
+          <a:effectRef idx="0">
+            <a:schemeClr val="accent1"/>
+          </a:effectRef>
+          <a:fontRef idx="minor">
+            <a:schemeClr val="tx1"/>
+          </a:fontRef>
+        </p:style>
+      </p:cxnSp>
+      <p:sp>
+        <p:nvSpPr>
+          <p:cNvPr id="68" name="TextBox 67"/>
+          <p:cNvSpPr txBox="1"/>
+          <p:nvPr/>
+        </p:nvSpPr>
+        <p:spPr>
+          <a:xfrm>
+            <a:off x="209185" y="3501008"/>
+            <a:ext cx="276038" cy="307777"/>
+          </a:xfrm>
+          <a:prstGeom prst="rect">
+            <a:avLst/>
+          </a:prstGeom>
+          <a:noFill/>
+        </p:spPr>
+        <p:txBody>
+          <a:bodyPr wrap="none" rtlCol="0">
+            <a:spAutoFit/>
+          </a:bodyPr>
+          <a:lstStyle/>
+          <a:p>
+            <a:r>
+              <a:rPr lang="en-US" sz="1400" dirty="0" smtClean="0"/>
+              <a:t>0</a:t>
+            </a:r>
+            <a:endParaRPr lang="en-US" sz="1400" dirty="0"/>
+          </a:p>
+        </p:txBody>
+      </p:sp>
+      <p:cxnSp>
+        <p:nvCxnSpPr>
+          <p:cNvPr id="72" name="Straight Arrow Connector 71"/>
+          <p:cNvCxnSpPr/>
+          <p:nvPr/>
+        </p:nvCxnSpPr>
+        <p:spPr>
+          <a:xfrm flipV="1">
+            <a:off x="3220782" y="2980018"/>
+            <a:ext cx="0" cy="504056"/>
+          </a:xfrm>
+          <a:prstGeom prst="straightConnector1">
+            <a:avLst/>
+          </a:prstGeom>
+          <a:ln>
+            <a:tailEnd type="triangle"/>
+          </a:ln>
+        </p:spPr>
+        <p:style>
+          <a:lnRef idx="1">
+            <a:schemeClr val="accent1"/>
+          </a:lnRef>
+          <a:fillRef idx="0">
+            <a:schemeClr val="accent1"/>
+          </a:fillRef>
+          <a:effectRef idx="0">
+            <a:schemeClr val="accent1"/>
+          </a:effectRef>
+          <a:fontRef idx="minor">
+            <a:schemeClr val="tx1"/>
+          </a:fontRef>
+        </p:style>
+      </p:cxnSp>
+      <p:cxnSp>
+        <p:nvCxnSpPr>
+          <p:cNvPr id="75" name="Straight Arrow Connector 74"/>
+          <p:cNvCxnSpPr/>
+          <p:nvPr/>
+        </p:nvCxnSpPr>
+        <p:spPr>
+          <a:xfrm>
+            <a:off x="340462" y="3212976"/>
+            <a:ext cx="2880320" cy="0"/>
+          </a:xfrm>
+          <a:prstGeom prst="straightConnector1">
+            <a:avLst/>
+          </a:prstGeom>
+          <a:ln>
+            <a:headEnd type="arrow"/>
+            <a:tailEnd type="arrow"/>
+          </a:ln>
+        </p:spPr>
+        <p:style>
+          <a:lnRef idx="1">
+            <a:schemeClr val="accent1"/>
+          </a:lnRef>
+          <a:fillRef idx="0">
+            <a:schemeClr val="accent1"/>
+          </a:fillRef>
+          <a:effectRef idx="0">
+            <a:schemeClr val="accent1"/>
+          </a:effectRef>
+          <a:fontRef idx="minor">
+            <a:schemeClr val="tx1"/>
+          </a:fontRef>
+        </p:style>
+      </p:cxnSp>
+      <p:cxnSp>
+        <p:nvCxnSpPr>
+          <p:cNvPr id="76" name="Straight Arrow Connector 75"/>
+          <p:cNvCxnSpPr/>
+          <p:nvPr/>
+        </p:nvCxnSpPr>
+        <p:spPr>
+          <a:xfrm flipV="1">
+            <a:off x="3945134" y="2980018"/>
+            <a:ext cx="0" cy="504056"/>
+          </a:xfrm>
+          <a:prstGeom prst="straightConnector1">
+            <a:avLst/>
+          </a:prstGeom>
+          <a:ln>
+            <a:headEnd type="none"/>
+            <a:tailEnd type="triangle"/>
+          </a:ln>
+        </p:spPr>
+        <p:style>
+          <a:lnRef idx="1">
+            <a:schemeClr val="accent1"/>
+          </a:lnRef>
+          <a:fillRef idx="0">
+            <a:schemeClr val="accent1"/>
+          </a:fillRef>
+          <a:effectRef idx="0">
+            <a:schemeClr val="accent1"/>
+          </a:effectRef>
+          <a:fontRef idx="minor">
+            <a:schemeClr val="tx1"/>
+          </a:fontRef>
+        </p:style>
+      </p:cxnSp>
+      <p:cxnSp>
+        <p:nvCxnSpPr>
+          <p:cNvPr id="77" name="Straight Arrow Connector 76"/>
+          <p:cNvCxnSpPr/>
+          <p:nvPr/>
+        </p:nvCxnSpPr>
+        <p:spPr>
+          <a:xfrm flipV="1">
+            <a:off x="4662097" y="2980018"/>
+            <a:ext cx="0" cy="504056"/>
+          </a:xfrm>
+          <a:prstGeom prst="straightConnector1">
+            <a:avLst/>
+          </a:prstGeom>
+          <a:ln>
+            <a:tailEnd type="triangle"/>
+          </a:ln>
+        </p:spPr>
+        <p:style>
+          <a:lnRef idx="1">
+            <a:schemeClr val="accent1"/>
+          </a:lnRef>
+          <a:fillRef idx="0">
+            <a:schemeClr val="accent1"/>
+          </a:fillRef>
+          <a:effectRef idx="0">
+            <a:schemeClr val="accent1"/>
+          </a:effectRef>
+          <a:fontRef idx="minor">
+            <a:schemeClr val="tx1"/>
+          </a:fontRef>
+        </p:style>
+      </p:cxnSp>
+      <p:cxnSp>
+        <p:nvCxnSpPr>
+          <p:cNvPr id="78" name="Straight Arrow Connector 77"/>
+          <p:cNvCxnSpPr/>
+          <p:nvPr/>
+        </p:nvCxnSpPr>
+        <p:spPr>
+          <a:xfrm>
+            <a:off x="3940862" y="3212976"/>
+            <a:ext cx="720000" cy="0"/>
+          </a:xfrm>
+          <a:prstGeom prst="straightConnector1">
+            <a:avLst/>
+          </a:prstGeom>
+          <a:ln>
+            <a:headEnd type="arrow"/>
+            <a:tailEnd type="arrow"/>
+          </a:ln>
+        </p:spPr>
+        <p:style>
+          <a:lnRef idx="1">
+            <a:schemeClr val="accent1"/>
+          </a:lnRef>
+          <a:fillRef idx="0">
+            <a:schemeClr val="accent1"/>
+          </a:fillRef>
+          <a:effectRef idx="0">
+            <a:schemeClr val="accent1"/>
+          </a:effectRef>
+          <a:fontRef idx="minor">
+            <a:schemeClr val="tx1"/>
+          </a:fontRef>
+        </p:style>
+      </p:cxnSp>
+      <p:sp>
+        <p:nvSpPr>
+          <p:cNvPr id="79" name="TextBox 78"/>
+          <p:cNvSpPr txBox="1"/>
+          <p:nvPr/>
+        </p:nvSpPr>
+        <p:spPr>
+          <a:xfrm>
+            <a:off x="21334" y="3671886"/>
+            <a:ext cx="590226" cy="307777"/>
+          </a:xfrm>
+          <a:prstGeom prst="rect">
+            <a:avLst/>
+          </a:prstGeom>
+          <a:noFill/>
+        </p:spPr>
+        <p:txBody>
+          <a:bodyPr wrap="none" rtlCol="0">
+            <a:spAutoFit/>
+          </a:bodyPr>
+          <a:lstStyle/>
+          <a:p>
+            <a:r>
+              <a:rPr lang="en-US" sz="1400" dirty="0" err="1" smtClean="0"/>
+              <a:t>s</a:t>
+            </a:r>
+            <a:r>
+              <a:rPr lang="en-US" sz="1400" dirty="0" err="1" smtClean="0"/>
+              <a:t>eq_t</a:t>
+            </a:r>
+            <a:endParaRPr lang="en-US" sz="1400" dirty="0"/>
+          </a:p>
+        </p:txBody>
+      </p:sp>
+      <p:sp>
+        <p:nvSpPr>
+          <p:cNvPr id="82" name="TextBox 81"/>
+          <p:cNvSpPr txBox="1"/>
+          <p:nvPr/>
+        </p:nvSpPr>
+        <p:spPr>
+          <a:xfrm>
+            <a:off x="1212511" y="3142429"/>
+            <a:ext cx="386644" cy="307777"/>
+          </a:xfrm>
+          <a:prstGeom prst="rect">
+            <a:avLst/>
+          </a:prstGeom>
+          <a:noFill/>
+        </p:spPr>
+        <p:txBody>
+          <a:bodyPr wrap="none" rtlCol="0">
+            <a:spAutoFit/>
+          </a:bodyPr>
+          <a:lstStyle/>
+          <a:p>
+            <a:r>
+              <a:rPr lang="en-US" sz="1400" dirty="0" smtClean="0"/>
+              <a:t>2 s</a:t>
+            </a:r>
+            <a:endParaRPr lang="en-US" sz="1400" dirty="0"/>
+          </a:p>
+        </p:txBody>
+      </p:sp>
+      <p:sp>
+        <p:nvSpPr>
+          <p:cNvPr id="83" name="TextBox 82"/>
+          <p:cNvSpPr txBox="1"/>
+          <p:nvPr/>
+        </p:nvSpPr>
+        <p:spPr>
+          <a:xfrm>
+            <a:off x="4049100" y="3159363"/>
+            <a:ext cx="522900" cy="307777"/>
+          </a:xfrm>
+          <a:prstGeom prst="rect">
+            <a:avLst/>
+          </a:prstGeom>
+          <a:noFill/>
+        </p:spPr>
+        <p:txBody>
+          <a:bodyPr wrap="none" rtlCol="0">
+            <a:spAutoFit/>
+          </a:bodyPr>
+          <a:lstStyle/>
+          <a:p>
+            <a:r>
+              <a:rPr lang="en-US" sz="1400" dirty="0" smtClean="0"/>
+              <a:t>0.5 s</a:t>
+            </a:r>
+            <a:endParaRPr lang="en-US" sz="1400" dirty="0"/>
+          </a:p>
+        </p:txBody>
+      </p:sp>
+      <p:sp>
+        <p:nvSpPr>
+          <p:cNvPr id="84" name="TextBox 83"/>
+          <p:cNvSpPr txBox="1"/>
+          <p:nvPr/>
+        </p:nvSpPr>
+        <p:spPr>
+          <a:xfrm>
+            <a:off x="361668" y="4133398"/>
+            <a:ext cx="7992888" cy="1815882"/>
+          </a:xfrm>
+          <a:prstGeom prst="rect">
+            <a:avLst/>
+          </a:prstGeom>
+          <a:noFill/>
+        </p:spPr>
+        <p:txBody>
+          <a:bodyPr wrap="square" rtlCol="0">
+            <a:spAutoFit/>
+          </a:bodyPr>
+          <a:lstStyle/>
+          <a:p>
+            <a:r>
+              <a:rPr lang="en-US" sz="1400" dirty="0" smtClean="0"/>
+              <a:t>When the tempo is 120 </a:t>
+            </a:r>
+            <a:r>
+              <a:rPr lang="en-US" sz="1400" dirty="0" err="1" smtClean="0"/>
+              <a:t>bpm</a:t>
+            </a:r>
+            <a:r>
+              <a:rPr lang="en-US" sz="1400" dirty="0" smtClean="0"/>
+              <a:t>, one single beat has a duration of 0.5 s. </a:t>
+            </a:r>
+          </a:p>
+          <a:p>
+            <a:r>
+              <a:rPr lang="en-US" sz="1400" dirty="0" smtClean="0"/>
+              <a:t>A full measure in a “4/4” signature has a duration of 2 s.</a:t>
+            </a:r>
+          </a:p>
+          <a:p>
+            <a:endParaRPr lang="en-US" sz="1400" dirty="0" smtClean="0"/>
+          </a:p>
+          <a:p>
+            <a:r>
+              <a:rPr lang="en-US" sz="1400" dirty="0" smtClean="0"/>
+              <a:t>Time in a sequence is called “sequence time” (</a:t>
+            </a:r>
+            <a:r>
+              <a:rPr lang="en-US" sz="1400" dirty="0" err="1" smtClean="0"/>
+              <a:t>seq_t</a:t>
+            </a:r>
+            <a:r>
+              <a:rPr lang="en-US" sz="1400" dirty="0" smtClean="0"/>
+              <a:t>).  At the start of the first measure </a:t>
+            </a:r>
+            <a:r>
+              <a:rPr lang="en-US" sz="1400" dirty="0" err="1" smtClean="0"/>
+              <a:t>seq_t</a:t>
+            </a:r>
+            <a:r>
+              <a:rPr lang="en-US" sz="1400" dirty="0" smtClean="0"/>
+              <a:t> equals 0.</a:t>
+            </a:r>
+          </a:p>
+          <a:p>
+            <a:endParaRPr lang="en-US" sz="1400" dirty="0" smtClean="0"/>
+          </a:p>
+          <a:p>
+            <a:r>
+              <a:rPr lang="en-US" sz="1400" dirty="0" smtClean="0"/>
+              <a:t>Every event in a sequence can be characterized by a timestamp, that is a measure of elapsed sequence time relative to the start of the first measure. Event A takes place approximately at </a:t>
+            </a:r>
+            <a:r>
+              <a:rPr lang="en-US" sz="1400" dirty="0" err="1" smtClean="0"/>
+              <a:t>seq_t</a:t>
+            </a:r>
+            <a:r>
+              <a:rPr lang="en-US" sz="1400" dirty="0" smtClean="0"/>
+              <a:t> = 4.25 s  (at 120 </a:t>
+            </a:r>
+            <a:r>
+              <a:rPr lang="en-US" sz="1400" dirty="0" err="1" smtClean="0"/>
+              <a:t>bpm</a:t>
+            </a:r>
+            <a:r>
+              <a:rPr lang="en-US" sz="1400" dirty="0" smtClean="0"/>
+              <a:t>)</a:t>
+            </a:r>
+          </a:p>
+          <a:p>
+            <a:r>
+              <a:rPr lang="en-US" sz="1400" dirty="0" smtClean="0"/>
+              <a:t>  </a:t>
+            </a:r>
+            <a:endParaRPr lang="en-US" sz="1400" dirty="0"/>
+          </a:p>
+        </p:txBody>
+      </p:sp>
+      <p:cxnSp>
+        <p:nvCxnSpPr>
+          <p:cNvPr id="85" name="Straight Arrow Connector 84"/>
+          <p:cNvCxnSpPr/>
+          <p:nvPr/>
+        </p:nvCxnSpPr>
+        <p:spPr>
+          <a:xfrm flipV="1">
+            <a:off x="6490815" y="2924944"/>
+            <a:ext cx="0" cy="504056"/>
+          </a:xfrm>
+          <a:prstGeom prst="straightConnector1">
+            <a:avLst/>
+          </a:prstGeom>
+          <a:ln>
+            <a:tailEnd type="triangle"/>
+          </a:ln>
+        </p:spPr>
+        <p:style>
+          <a:lnRef idx="1">
+            <a:schemeClr val="accent1"/>
+          </a:lnRef>
+          <a:fillRef idx="0">
+            <a:schemeClr val="accent1"/>
+          </a:fillRef>
+          <a:effectRef idx="0">
+            <a:schemeClr val="accent1"/>
+          </a:effectRef>
+          <a:fontRef idx="minor">
+            <a:schemeClr val="tx1"/>
+          </a:fontRef>
+        </p:style>
+      </p:cxnSp>
+      <p:sp>
+        <p:nvSpPr>
+          <p:cNvPr id="86" name="Explosion 1 85"/>
+          <p:cNvSpPr/>
+          <p:nvPr/>
+        </p:nvSpPr>
+        <p:spPr>
+          <a:xfrm>
+            <a:off x="6588224" y="3068960"/>
+            <a:ext cx="144016" cy="144016"/>
+          </a:xfrm>
+          <a:prstGeom prst="irregularSeal1">
+            <a:avLst/>
+          </a:prstGeom>
+          <a:solidFill>
+            <a:srgbClr val="FF0000"/>
+          </a:solidFill>
+          <a:ln w="6350">
+            <a:solidFill>
+              <a:schemeClr val="tx1"/>
+            </a:solidFill>
+          </a:ln>
+        </p:spPr>
+        <p:style>
+          <a:lnRef idx="2">
+            <a:schemeClr val="accent1">
+              <a:shade val="50000"/>
+            </a:schemeClr>
+          </a:lnRef>
+          <a:fillRef idx="1">
+            <a:schemeClr val="accent1"/>
+          </a:fillRef>
+          <a:effectRef idx="0">
+            <a:schemeClr val="accent1"/>
+          </a:effectRef>
+          <a:fontRef idx="minor">
+            <a:schemeClr val="lt1"/>
+          </a:fontRef>
+        </p:style>
+        <p:txBody>
+          <a:bodyPr rtlCol="0" anchor="ctr"/>
+          <a:lstStyle/>
+          <a:p>
+            <a:pPr algn="ctr"/>
+            <a:endParaRPr lang="en-US"/>
+          </a:p>
+        </p:txBody>
+      </p:sp>
+      <p:sp>
+        <p:nvSpPr>
+          <p:cNvPr id="87" name="TextBox 86"/>
+          <p:cNvSpPr txBox="1"/>
+          <p:nvPr/>
+        </p:nvSpPr>
+        <p:spPr>
+          <a:xfrm>
+            <a:off x="5957086" y="3429000"/>
+            <a:ext cx="1079142" cy="523220"/>
+          </a:xfrm>
+          <a:prstGeom prst="rect">
+            <a:avLst/>
+          </a:prstGeom>
+          <a:noFill/>
+        </p:spPr>
+        <p:txBody>
+          <a:bodyPr wrap="none" rtlCol="0">
+            <a:spAutoFit/>
+          </a:bodyPr>
+          <a:lstStyle/>
+          <a:p>
+            <a:r>
+              <a:rPr lang="en-US" sz="1400" dirty="0" smtClean="0"/>
+              <a:t>event A</a:t>
+            </a:r>
+          </a:p>
+          <a:p>
+            <a:r>
+              <a:rPr lang="en-US" sz="1400" dirty="0" err="1" smtClean="0"/>
+              <a:t>s</a:t>
+            </a:r>
+            <a:r>
+              <a:rPr lang="en-US" sz="1400" dirty="0" err="1" smtClean="0"/>
+              <a:t>eq_t</a:t>
+            </a:r>
+            <a:r>
+              <a:rPr lang="en-US" sz="1400" dirty="0" smtClean="0"/>
+              <a:t> = 4.25</a:t>
+            </a:r>
+            <a:endParaRPr lang="en-US" sz="1400" dirty="0"/>
+          </a:p>
+        </p:txBody>
+      </p:sp>
+      <p:grpSp>
+        <p:nvGrpSpPr>
+          <p:cNvPr id="90" name="Group 89"/>
+          <p:cNvGrpSpPr/>
+          <p:nvPr/>
+        </p:nvGrpSpPr>
+        <p:grpSpPr>
+          <a:xfrm>
+            <a:off x="340462" y="1124744"/>
+            <a:ext cx="8649424" cy="144016"/>
+            <a:chOff x="340462" y="1124744"/>
+            <a:chExt cx="8649424" cy="144016"/>
+          </a:xfrm>
+        </p:grpSpPr>
+        <p:grpSp>
+          <p:nvGrpSpPr>
+            <p:cNvPr id="43" name="Group 46"/>
+            <p:cNvGrpSpPr/>
+            <p:nvPr/>
+          </p:nvGrpSpPr>
+          <p:grpSpPr>
+            <a:xfrm>
+              <a:off x="340462" y="1124744"/>
+              <a:ext cx="2884512" cy="144016"/>
+              <a:chOff x="541751" y="1412776"/>
+              <a:chExt cx="2884512" cy="144016"/>
+            </a:xfrm>
+          </p:grpSpPr>
+          <p:sp>
+            <p:nvSpPr>
+              <p:cNvPr id="44" name="Rectangle 43"/>
+              <p:cNvSpPr/>
+              <p:nvPr/>
+            </p:nvSpPr>
+            <p:spPr>
+              <a:xfrm>
+                <a:off x="541751" y="1412776"/>
+                <a:ext cx="720080" cy="144016"/>
+              </a:xfrm>
+              <a:prstGeom prst="rect">
+                <a:avLst/>
+              </a:prstGeom>
+              <a:solidFill>
+                <a:srgbClr val="FFFF00"/>
+              </a:solidFill>
+              <a:ln>
+                <a:solidFill>
+                  <a:schemeClr val="tx1"/>
+                </a:solidFill>
+              </a:ln>
+            </p:spPr>
+            <p:style>
+              <a:lnRef idx="2">
+                <a:schemeClr val="accent3">
+                  <a:shade val="50000"/>
+                </a:schemeClr>
+              </a:lnRef>
+              <a:fillRef idx="1">
+                <a:schemeClr val="accent3"/>
+              </a:fillRef>
+              <a:effectRef idx="0">
+                <a:schemeClr val="accent3"/>
+              </a:effectRef>
+              <a:fontRef idx="minor">
+                <a:schemeClr val="lt1"/>
+              </a:fontRef>
+            </p:style>
+            <p:txBody>
+              <a:bodyPr rtlCol="0" anchor="ctr"/>
+              <a:lstStyle/>
+              <a:p>
+                <a:pPr algn="ctr"/>
+                <a:endParaRPr lang="en-US"/>
+              </a:p>
+            </p:txBody>
+          </p:sp>
+          <p:sp>
+            <p:nvSpPr>
+              <p:cNvPr id="45" name="Rectangle 44"/>
+              <p:cNvSpPr/>
+              <p:nvPr/>
+            </p:nvSpPr>
+            <p:spPr>
+              <a:xfrm>
+                <a:off x="1263228" y="1412776"/>
+                <a:ext cx="720080" cy="144016"/>
+              </a:xfrm>
+              <a:prstGeom prst="rect">
+                <a:avLst/>
+              </a:prstGeom>
+              <a:solidFill>
+                <a:srgbClr val="FFFF00"/>
+              </a:solidFill>
+              <a:ln>
+                <a:solidFill>
+                  <a:schemeClr val="tx1"/>
+                </a:solidFill>
+              </a:ln>
+            </p:spPr>
+            <p:style>
+              <a:lnRef idx="2">
+                <a:schemeClr val="accent3">
+                  <a:shade val="50000"/>
+                </a:schemeClr>
+              </a:lnRef>
+              <a:fillRef idx="1">
+                <a:schemeClr val="accent3"/>
+              </a:fillRef>
+              <a:effectRef idx="0">
+                <a:schemeClr val="accent3"/>
+              </a:effectRef>
+              <a:fontRef idx="minor">
+                <a:schemeClr val="lt1"/>
+              </a:fontRef>
+            </p:style>
+            <p:txBody>
+              <a:bodyPr rtlCol="0" anchor="ctr"/>
+              <a:lstStyle/>
+              <a:p>
+                <a:pPr algn="ctr"/>
+                <a:endParaRPr lang="en-US"/>
+              </a:p>
+            </p:txBody>
+          </p:sp>
+          <p:sp>
+            <p:nvSpPr>
+              <p:cNvPr id="46" name="Rectangle 45"/>
+              <p:cNvSpPr/>
+              <p:nvPr/>
+            </p:nvSpPr>
+            <p:spPr>
+              <a:xfrm>
+                <a:off x="1984705" y="1412776"/>
+                <a:ext cx="720080" cy="144016"/>
+              </a:xfrm>
+              <a:prstGeom prst="rect">
+                <a:avLst/>
+              </a:prstGeom>
+              <a:solidFill>
+                <a:srgbClr val="FFFF00"/>
+              </a:solidFill>
+              <a:ln>
+                <a:solidFill>
+                  <a:schemeClr val="tx1"/>
+                </a:solidFill>
+              </a:ln>
+            </p:spPr>
+            <p:style>
+              <a:lnRef idx="2">
+                <a:schemeClr val="accent3">
+                  <a:shade val="50000"/>
+                </a:schemeClr>
+              </a:lnRef>
+              <a:fillRef idx="1">
+                <a:schemeClr val="accent3"/>
+              </a:fillRef>
+              <a:effectRef idx="0">
+                <a:schemeClr val="accent3"/>
+              </a:effectRef>
+              <a:fontRef idx="minor">
+                <a:schemeClr val="lt1"/>
+              </a:fontRef>
+            </p:style>
+            <p:txBody>
+              <a:bodyPr rtlCol="0" anchor="ctr"/>
+              <a:lstStyle/>
+              <a:p>
+                <a:pPr algn="ctr"/>
+                <a:endParaRPr lang="en-US"/>
+              </a:p>
+            </p:txBody>
+          </p:sp>
+          <p:sp>
+            <p:nvSpPr>
+              <p:cNvPr id="47" name="Rectangle 46"/>
+              <p:cNvSpPr/>
+              <p:nvPr/>
+            </p:nvSpPr>
+            <p:spPr>
+              <a:xfrm>
+                <a:off x="2706183" y="1412776"/>
+                <a:ext cx="720080" cy="144016"/>
+              </a:xfrm>
+              <a:prstGeom prst="rect">
+                <a:avLst/>
+              </a:prstGeom>
+              <a:solidFill>
+                <a:srgbClr val="FFFF00"/>
+              </a:solidFill>
+              <a:ln>
+                <a:solidFill>
+                  <a:schemeClr val="tx1"/>
+                </a:solidFill>
+              </a:ln>
+            </p:spPr>
+            <p:style>
+              <a:lnRef idx="2">
+                <a:schemeClr val="accent3">
+                  <a:shade val="50000"/>
+                </a:schemeClr>
+              </a:lnRef>
+              <a:fillRef idx="1">
+                <a:schemeClr val="accent3"/>
+              </a:fillRef>
+              <a:effectRef idx="0">
+                <a:schemeClr val="accent3"/>
+              </a:effectRef>
+              <a:fontRef idx="minor">
+                <a:schemeClr val="lt1"/>
+              </a:fontRef>
+            </p:style>
+            <p:txBody>
+              <a:bodyPr rtlCol="0" anchor="ctr"/>
+              <a:lstStyle/>
+              <a:p>
+                <a:pPr algn="ctr"/>
+                <a:endParaRPr lang="en-US"/>
+              </a:p>
+            </p:txBody>
+          </p:sp>
+          <p:sp>
+            <p:nvSpPr>
+              <p:cNvPr id="53" name="Rectangle 52"/>
+              <p:cNvSpPr/>
+              <p:nvPr/>
+            </p:nvSpPr>
+            <p:spPr>
+              <a:xfrm>
+                <a:off x="545414" y="1412776"/>
+                <a:ext cx="2880000" cy="144000"/>
+              </a:xfrm>
+              <a:prstGeom prst="rect">
+                <a:avLst/>
+              </a:prstGeom>
+              <a:noFill/>
+              <a:ln w="38100">
+                <a:solidFill>
+                  <a:srgbClr val="FF0000"/>
+                </a:solidFill>
+              </a:ln>
+            </p:spPr>
+            <p:style>
+              <a:lnRef idx="2">
+                <a:schemeClr val="accent1">
+                  <a:shade val="50000"/>
+                </a:schemeClr>
+              </a:lnRef>
+              <a:fillRef idx="1">
+                <a:schemeClr val="accent1"/>
+              </a:fillRef>
+              <a:effectRef idx="0">
+                <a:schemeClr val="accent1"/>
+              </a:effectRef>
+              <a:fontRef idx="minor">
+                <a:schemeClr val="lt1"/>
+              </a:fontRef>
+            </p:style>
+            <p:txBody>
+              <a:bodyPr rtlCol="0" anchor="ctr"/>
+              <a:lstStyle/>
+              <a:p>
+                <a:pPr algn="ctr"/>
+                <a:endParaRPr lang="en-US"/>
+              </a:p>
+            </p:txBody>
+          </p:sp>
+        </p:grpSp>
+        <p:grpSp>
+          <p:nvGrpSpPr>
+            <p:cNvPr id="59" name="Group 52"/>
+            <p:cNvGrpSpPr/>
+            <p:nvPr/>
+          </p:nvGrpSpPr>
+          <p:grpSpPr>
+            <a:xfrm>
+              <a:off x="6105374" y="1124744"/>
+              <a:ext cx="2884512" cy="144016"/>
+              <a:chOff x="541751" y="1412776"/>
+              <a:chExt cx="2884512" cy="144016"/>
+            </a:xfrm>
+          </p:grpSpPr>
+          <p:sp>
+            <p:nvSpPr>
+              <p:cNvPr id="65" name="Rectangle 64"/>
+              <p:cNvSpPr/>
+              <p:nvPr/>
+            </p:nvSpPr>
+            <p:spPr>
+              <a:xfrm>
+                <a:off x="541751" y="1412776"/>
+                <a:ext cx="720080" cy="144016"/>
+              </a:xfrm>
+              <a:prstGeom prst="rect">
+                <a:avLst/>
+              </a:prstGeom>
+              <a:solidFill>
+                <a:srgbClr val="FFFF00"/>
+              </a:solidFill>
+              <a:ln>
+                <a:solidFill>
+                  <a:schemeClr val="tx1"/>
+                </a:solidFill>
+              </a:ln>
+            </p:spPr>
+            <p:style>
+              <a:lnRef idx="2">
+                <a:schemeClr val="accent3">
+                  <a:shade val="50000"/>
+                </a:schemeClr>
+              </a:lnRef>
+              <a:fillRef idx="1">
+                <a:schemeClr val="accent3"/>
+              </a:fillRef>
+              <a:effectRef idx="0">
+                <a:schemeClr val="accent3"/>
+              </a:effectRef>
+              <a:fontRef idx="minor">
+                <a:schemeClr val="lt1"/>
+              </a:fontRef>
+            </p:style>
+            <p:txBody>
+              <a:bodyPr rtlCol="0" anchor="ctr"/>
+              <a:lstStyle/>
+              <a:p>
+                <a:pPr algn="ctr"/>
+                <a:endParaRPr lang="en-US"/>
+              </a:p>
+            </p:txBody>
+          </p:sp>
+          <p:sp>
+            <p:nvSpPr>
+              <p:cNvPr id="66" name="Rectangle 65"/>
+              <p:cNvSpPr/>
+              <p:nvPr/>
+            </p:nvSpPr>
+            <p:spPr>
+              <a:xfrm>
+                <a:off x="1263228" y="1412776"/>
+                <a:ext cx="720080" cy="144016"/>
+              </a:xfrm>
+              <a:prstGeom prst="rect">
+                <a:avLst/>
+              </a:prstGeom>
+              <a:solidFill>
+                <a:srgbClr val="FFFF00"/>
+              </a:solidFill>
+              <a:ln>
+                <a:solidFill>
+                  <a:schemeClr val="tx1"/>
+                </a:solidFill>
+              </a:ln>
+            </p:spPr>
+            <p:style>
+              <a:lnRef idx="2">
+                <a:schemeClr val="accent3">
+                  <a:shade val="50000"/>
+                </a:schemeClr>
+              </a:lnRef>
+              <a:fillRef idx="1">
+                <a:schemeClr val="accent3"/>
+              </a:fillRef>
+              <a:effectRef idx="0">
+                <a:schemeClr val="accent3"/>
+              </a:effectRef>
+              <a:fontRef idx="minor">
+                <a:schemeClr val="lt1"/>
+              </a:fontRef>
+            </p:style>
+            <p:txBody>
+              <a:bodyPr rtlCol="0" anchor="ctr"/>
+              <a:lstStyle/>
+              <a:p>
+                <a:pPr algn="ctr"/>
+                <a:endParaRPr lang="en-US"/>
+              </a:p>
+            </p:txBody>
+          </p:sp>
+          <p:sp>
+            <p:nvSpPr>
+              <p:cNvPr id="69" name="Rectangle 68"/>
+              <p:cNvSpPr/>
+              <p:nvPr/>
+            </p:nvSpPr>
+            <p:spPr>
+              <a:xfrm>
+                <a:off x="1984705" y="1412776"/>
+                <a:ext cx="720080" cy="144016"/>
+              </a:xfrm>
+              <a:prstGeom prst="rect">
+                <a:avLst/>
+              </a:prstGeom>
+              <a:solidFill>
+                <a:srgbClr val="FFFF00"/>
+              </a:solidFill>
+              <a:ln>
+                <a:solidFill>
+                  <a:schemeClr val="tx1"/>
+                </a:solidFill>
+              </a:ln>
+            </p:spPr>
+            <p:style>
+              <a:lnRef idx="2">
+                <a:schemeClr val="accent3">
+                  <a:shade val="50000"/>
+                </a:schemeClr>
+              </a:lnRef>
+              <a:fillRef idx="1">
+                <a:schemeClr val="accent3"/>
+              </a:fillRef>
+              <a:effectRef idx="0">
+                <a:schemeClr val="accent3"/>
+              </a:effectRef>
+              <a:fontRef idx="minor">
+                <a:schemeClr val="lt1"/>
+              </a:fontRef>
+            </p:style>
+            <p:txBody>
+              <a:bodyPr rtlCol="0" anchor="ctr"/>
+              <a:lstStyle/>
+              <a:p>
+                <a:pPr algn="ctr"/>
+                <a:endParaRPr lang="en-US"/>
+              </a:p>
+            </p:txBody>
+          </p:sp>
+          <p:sp>
+            <p:nvSpPr>
+              <p:cNvPr id="70" name="Rectangle 69"/>
+              <p:cNvSpPr/>
+              <p:nvPr/>
+            </p:nvSpPr>
+            <p:spPr>
+              <a:xfrm>
+                <a:off x="2706183" y="1412776"/>
+                <a:ext cx="720080" cy="144016"/>
+              </a:xfrm>
+              <a:prstGeom prst="rect">
+                <a:avLst/>
+              </a:prstGeom>
+              <a:solidFill>
+                <a:srgbClr val="FFFF00"/>
+              </a:solidFill>
+              <a:ln>
+                <a:solidFill>
+                  <a:schemeClr val="tx1"/>
+                </a:solidFill>
+              </a:ln>
+            </p:spPr>
+            <p:style>
+              <a:lnRef idx="2">
+                <a:schemeClr val="accent3">
+                  <a:shade val="50000"/>
+                </a:schemeClr>
+              </a:lnRef>
+              <a:fillRef idx="1">
+                <a:schemeClr val="accent3"/>
+              </a:fillRef>
+              <a:effectRef idx="0">
+                <a:schemeClr val="accent3"/>
+              </a:effectRef>
+              <a:fontRef idx="minor">
+                <a:schemeClr val="lt1"/>
+              </a:fontRef>
+            </p:style>
+            <p:txBody>
+              <a:bodyPr rtlCol="0" anchor="ctr"/>
+              <a:lstStyle/>
+              <a:p>
+                <a:pPr algn="ctr"/>
+                <a:endParaRPr lang="en-US"/>
+              </a:p>
+            </p:txBody>
+          </p:sp>
+          <p:sp>
+            <p:nvSpPr>
+              <p:cNvPr id="71" name="Rectangle 70"/>
+              <p:cNvSpPr/>
+              <p:nvPr/>
+            </p:nvSpPr>
+            <p:spPr>
+              <a:xfrm>
+                <a:off x="545414" y="1412776"/>
+                <a:ext cx="2880000" cy="144000"/>
+              </a:xfrm>
+              <a:prstGeom prst="rect">
+                <a:avLst/>
+              </a:prstGeom>
+              <a:noFill/>
+              <a:ln w="38100">
+                <a:solidFill>
+                  <a:srgbClr val="FF0000"/>
+                </a:solidFill>
+              </a:ln>
+            </p:spPr>
+            <p:style>
+              <a:lnRef idx="2">
+                <a:schemeClr val="accent1">
+                  <a:shade val="50000"/>
+                </a:schemeClr>
+              </a:lnRef>
+              <a:fillRef idx="1">
+                <a:schemeClr val="accent1"/>
+              </a:fillRef>
+              <a:effectRef idx="0">
+                <a:schemeClr val="accent1"/>
+              </a:effectRef>
+              <a:fontRef idx="minor">
+                <a:schemeClr val="lt1"/>
+              </a:fontRef>
+            </p:style>
+            <p:txBody>
+              <a:bodyPr rtlCol="0" anchor="ctr"/>
+              <a:lstStyle/>
+              <a:p>
+                <a:pPr algn="ctr"/>
+                <a:endParaRPr lang="en-US"/>
+              </a:p>
+            </p:txBody>
+          </p:sp>
+        </p:grpSp>
+        <p:grpSp>
+          <p:nvGrpSpPr>
+            <p:cNvPr id="73" name="Group 58"/>
+            <p:cNvGrpSpPr/>
+            <p:nvPr/>
+          </p:nvGrpSpPr>
+          <p:grpSpPr>
+            <a:xfrm>
+              <a:off x="3220782" y="1124744"/>
+              <a:ext cx="2884512" cy="144016"/>
+              <a:chOff x="541751" y="1412776"/>
+              <a:chExt cx="2884512" cy="144016"/>
+            </a:xfrm>
+          </p:grpSpPr>
+          <p:sp>
+            <p:nvSpPr>
+              <p:cNvPr id="74" name="Rectangle 73"/>
+              <p:cNvSpPr/>
+              <p:nvPr/>
+            </p:nvSpPr>
+            <p:spPr>
+              <a:xfrm>
+                <a:off x="541751" y="1412776"/>
+                <a:ext cx="720080" cy="144016"/>
+              </a:xfrm>
+              <a:prstGeom prst="rect">
+                <a:avLst/>
+              </a:prstGeom>
+              <a:solidFill>
+                <a:srgbClr val="FFFF00"/>
+              </a:solidFill>
+              <a:ln>
+                <a:solidFill>
+                  <a:schemeClr val="tx1"/>
+                </a:solidFill>
+              </a:ln>
+            </p:spPr>
+            <p:style>
+              <a:lnRef idx="2">
+                <a:schemeClr val="accent3">
+                  <a:shade val="50000"/>
+                </a:schemeClr>
+              </a:lnRef>
+              <a:fillRef idx="1">
+                <a:schemeClr val="accent3"/>
+              </a:fillRef>
+              <a:effectRef idx="0">
+                <a:schemeClr val="accent3"/>
+              </a:effectRef>
+              <a:fontRef idx="minor">
+                <a:schemeClr val="lt1"/>
+              </a:fontRef>
+            </p:style>
+            <p:txBody>
+              <a:bodyPr rtlCol="0" anchor="ctr"/>
+              <a:lstStyle/>
+              <a:p>
+                <a:pPr algn="ctr"/>
+                <a:endParaRPr lang="en-US"/>
+              </a:p>
+            </p:txBody>
+          </p:sp>
+          <p:sp>
+            <p:nvSpPr>
+              <p:cNvPr id="80" name="Rectangle 79"/>
+              <p:cNvSpPr/>
+              <p:nvPr/>
+            </p:nvSpPr>
+            <p:spPr>
+              <a:xfrm>
+                <a:off x="1263228" y="1412776"/>
+                <a:ext cx="720080" cy="144016"/>
+              </a:xfrm>
+              <a:prstGeom prst="rect">
+                <a:avLst/>
+              </a:prstGeom>
+              <a:solidFill>
+                <a:srgbClr val="FFFF00"/>
+              </a:solidFill>
+              <a:ln>
+                <a:solidFill>
+                  <a:schemeClr val="tx1"/>
+                </a:solidFill>
+              </a:ln>
+            </p:spPr>
+            <p:style>
+              <a:lnRef idx="2">
+                <a:schemeClr val="accent3">
+                  <a:shade val="50000"/>
+                </a:schemeClr>
+              </a:lnRef>
+              <a:fillRef idx="1">
+                <a:schemeClr val="accent3"/>
+              </a:fillRef>
+              <a:effectRef idx="0">
+                <a:schemeClr val="accent3"/>
+              </a:effectRef>
+              <a:fontRef idx="minor">
+                <a:schemeClr val="lt1"/>
+              </a:fontRef>
+            </p:style>
+            <p:txBody>
+              <a:bodyPr rtlCol="0" anchor="ctr"/>
+              <a:lstStyle/>
+              <a:p>
+                <a:pPr algn="ctr"/>
+                <a:endParaRPr lang="en-US"/>
+              </a:p>
+            </p:txBody>
+          </p:sp>
+          <p:sp>
+            <p:nvSpPr>
+              <p:cNvPr id="81" name="Rectangle 80"/>
+              <p:cNvSpPr/>
+              <p:nvPr/>
+            </p:nvSpPr>
+            <p:spPr>
+              <a:xfrm>
+                <a:off x="1984705" y="1412776"/>
+                <a:ext cx="720080" cy="144016"/>
+              </a:xfrm>
+              <a:prstGeom prst="rect">
+                <a:avLst/>
+              </a:prstGeom>
+              <a:solidFill>
+                <a:srgbClr val="FFFF00"/>
+              </a:solidFill>
+              <a:ln>
+                <a:solidFill>
+                  <a:schemeClr val="tx1"/>
+                </a:solidFill>
+              </a:ln>
+            </p:spPr>
+            <p:style>
+              <a:lnRef idx="2">
+                <a:schemeClr val="accent3">
+                  <a:shade val="50000"/>
+                </a:schemeClr>
+              </a:lnRef>
+              <a:fillRef idx="1">
+                <a:schemeClr val="accent3"/>
+              </a:fillRef>
+              <a:effectRef idx="0">
+                <a:schemeClr val="accent3"/>
+              </a:effectRef>
+              <a:fontRef idx="minor">
+                <a:schemeClr val="lt1"/>
+              </a:fontRef>
+            </p:style>
+            <p:txBody>
+              <a:bodyPr rtlCol="0" anchor="ctr"/>
+              <a:lstStyle/>
+              <a:p>
+                <a:pPr algn="ctr"/>
+                <a:endParaRPr lang="en-US"/>
+              </a:p>
+            </p:txBody>
+          </p:sp>
+          <p:sp>
+            <p:nvSpPr>
+              <p:cNvPr id="88" name="Rectangle 87"/>
+              <p:cNvSpPr/>
+              <p:nvPr/>
+            </p:nvSpPr>
+            <p:spPr>
+              <a:xfrm>
+                <a:off x="2706183" y="1412776"/>
+                <a:ext cx="720080" cy="144016"/>
+              </a:xfrm>
+              <a:prstGeom prst="rect">
+                <a:avLst/>
+              </a:prstGeom>
+              <a:solidFill>
+                <a:srgbClr val="FFFF00"/>
+              </a:solidFill>
+              <a:ln>
+                <a:solidFill>
+                  <a:schemeClr val="tx1"/>
+                </a:solidFill>
+              </a:ln>
+            </p:spPr>
+            <p:style>
+              <a:lnRef idx="2">
+                <a:schemeClr val="accent3">
+                  <a:shade val="50000"/>
+                </a:schemeClr>
+              </a:lnRef>
+              <a:fillRef idx="1">
+                <a:schemeClr val="accent3"/>
+              </a:fillRef>
+              <a:effectRef idx="0">
+                <a:schemeClr val="accent3"/>
+              </a:effectRef>
+              <a:fontRef idx="minor">
+                <a:schemeClr val="lt1"/>
+              </a:fontRef>
+            </p:style>
+            <p:txBody>
+              <a:bodyPr rtlCol="0" anchor="ctr"/>
+              <a:lstStyle/>
+              <a:p>
+                <a:pPr algn="ctr"/>
+                <a:endParaRPr lang="en-US"/>
+              </a:p>
+            </p:txBody>
+          </p:sp>
+          <p:sp>
+            <p:nvSpPr>
+              <p:cNvPr id="89" name="Rectangle 88"/>
+              <p:cNvSpPr/>
+              <p:nvPr/>
+            </p:nvSpPr>
+            <p:spPr>
+              <a:xfrm>
+                <a:off x="545414" y="1412776"/>
+                <a:ext cx="2880000" cy="144000"/>
+              </a:xfrm>
+              <a:prstGeom prst="rect">
+                <a:avLst/>
+              </a:prstGeom>
+              <a:noFill/>
+              <a:ln w="38100">
+                <a:solidFill>
+                  <a:srgbClr val="FF0000"/>
+                </a:solidFill>
+              </a:ln>
+            </p:spPr>
+            <p:style>
+              <a:lnRef idx="2">
+                <a:schemeClr val="accent1">
+                  <a:shade val="50000"/>
+                </a:schemeClr>
+              </a:lnRef>
+              <a:fillRef idx="1">
+                <a:schemeClr val="accent1"/>
+              </a:fillRef>
+              <a:effectRef idx="0">
+                <a:schemeClr val="accent1"/>
+              </a:effectRef>
+              <a:fontRef idx="minor">
+                <a:schemeClr val="lt1"/>
+              </a:fontRef>
+            </p:style>
+            <p:txBody>
+              <a:bodyPr rtlCol="0" anchor="ctr"/>
+              <a:lstStyle/>
+              <a:p>
+                <a:pPr algn="ctr"/>
+                <a:endParaRPr lang="en-US"/>
+              </a:p>
+            </p:txBody>
+          </p:sp>
+        </p:grpSp>
+      </p:grpSp>
     </p:spTree>
   </p:cSld>
   <p:clrMapOvr>

</xml_diff>

<commit_message>
added MIDI headers to pptx
</commit_message>
<xml_diff>
--- a/images/graphics.pptx
+++ b/images/graphics.pptx
@@ -13,6 +13,7 @@
     <p:sldId id="264" r:id="rId7"/>
     <p:sldId id="266" r:id="rId8"/>
     <p:sldId id="267" r:id="rId9"/>
+    <p:sldId id="268" r:id="rId10"/>
   </p:sldIdLst>
   <p:sldSz cx="9144000" cy="6858000" type="screen4x3"/>
   <p:notesSz cx="6858000" cy="9144000"/>
@@ -296,7 +297,7 @@
             <a:fld id="{FD841624-621E-4D67-82DB-36A0154A0A2F}" type="datetimeFigureOut">
               <a:rPr lang="en-US" smtClean="0"/>
               <a:pPr/>
-              <a:t>05-Nov-21</a:t>
+              <a:t>06-Nov-21</a:t>
             </a:fld>
             <a:endParaRPr lang="en-US"/>
           </a:p>
@@ -463,7 +464,7 @@
             <a:fld id="{FD841624-621E-4D67-82DB-36A0154A0A2F}" type="datetimeFigureOut">
               <a:rPr lang="en-US" smtClean="0"/>
               <a:pPr/>
-              <a:t>05-Nov-21</a:t>
+              <a:t>06-Nov-21</a:t>
             </a:fld>
             <a:endParaRPr lang="en-US"/>
           </a:p>
@@ -640,7 +641,7 @@
             <a:fld id="{FD841624-621E-4D67-82DB-36A0154A0A2F}" type="datetimeFigureOut">
               <a:rPr lang="en-US" smtClean="0"/>
               <a:pPr/>
-              <a:t>05-Nov-21</a:t>
+              <a:t>06-Nov-21</a:t>
             </a:fld>
             <a:endParaRPr lang="en-US"/>
           </a:p>
@@ -807,7 +808,7 @@
             <a:fld id="{FD841624-621E-4D67-82DB-36A0154A0A2F}" type="datetimeFigureOut">
               <a:rPr lang="en-US" smtClean="0"/>
               <a:pPr/>
-              <a:t>05-Nov-21</a:t>
+              <a:t>06-Nov-21</a:t>
             </a:fld>
             <a:endParaRPr lang="en-US"/>
           </a:p>
@@ -1050,7 +1051,7 @@
             <a:fld id="{FD841624-621E-4D67-82DB-36A0154A0A2F}" type="datetimeFigureOut">
               <a:rPr lang="en-US" smtClean="0"/>
               <a:pPr/>
-              <a:t>05-Nov-21</a:t>
+              <a:t>06-Nov-21</a:t>
             </a:fld>
             <a:endParaRPr lang="en-US"/>
           </a:p>
@@ -1335,7 +1336,7 @@
             <a:fld id="{FD841624-621E-4D67-82DB-36A0154A0A2F}" type="datetimeFigureOut">
               <a:rPr lang="en-US" smtClean="0"/>
               <a:pPr/>
-              <a:t>05-Nov-21</a:t>
+              <a:t>06-Nov-21</a:t>
             </a:fld>
             <a:endParaRPr lang="en-US"/>
           </a:p>
@@ -1754,7 +1755,7 @@
             <a:fld id="{FD841624-621E-4D67-82DB-36A0154A0A2F}" type="datetimeFigureOut">
               <a:rPr lang="en-US" smtClean="0"/>
               <a:pPr/>
-              <a:t>05-Nov-21</a:t>
+              <a:t>06-Nov-21</a:t>
             </a:fld>
             <a:endParaRPr lang="en-US"/>
           </a:p>
@@ -1869,7 +1870,7 @@
             <a:fld id="{FD841624-621E-4D67-82DB-36A0154A0A2F}" type="datetimeFigureOut">
               <a:rPr lang="en-US" smtClean="0"/>
               <a:pPr/>
-              <a:t>05-Nov-21</a:t>
+              <a:t>06-Nov-21</a:t>
             </a:fld>
             <a:endParaRPr lang="en-US"/>
           </a:p>
@@ -1961,7 +1962,7 @@
             <a:fld id="{FD841624-621E-4D67-82DB-36A0154A0A2F}" type="datetimeFigureOut">
               <a:rPr lang="en-US" smtClean="0"/>
               <a:pPr/>
-              <a:t>05-Nov-21</a:t>
+              <a:t>06-Nov-21</a:t>
             </a:fld>
             <a:endParaRPr lang="en-US"/>
           </a:p>
@@ -2235,7 +2236,7 @@
             <a:fld id="{FD841624-621E-4D67-82DB-36A0154A0A2F}" type="datetimeFigureOut">
               <a:rPr lang="en-US" smtClean="0"/>
               <a:pPr/>
-              <a:t>05-Nov-21</a:t>
+              <a:t>06-Nov-21</a:t>
             </a:fld>
             <a:endParaRPr lang="en-US"/>
           </a:p>
@@ -2485,7 +2486,7 @@
             <a:fld id="{FD841624-621E-4D67-82DB-36A0154A0A2F}" type="datetimeFigureOut">
               <a:rPr lang="en-US" smtClean="0"/>
               <a:pPr/>
-              <a:t>05-Nov-21</a:t>
+              <a:t>06-Nov-21</a:t>
             </a:fld>
             <a:endParaRPr lang="en-US"/>
           </a:p>
@@ -2695,7 +2696,7 @@
             <a:fld id="{FD841624-621E-4D67-82DB-36A0154A0A2F}" type="datetimeFigureOut">
               <a:rPr lang="en-US" smtClean="0"/>
               <a:pPr/>
-              <a:t>05-Nov-21</a:t>
+              <a:t>06-Nov-21</a:t>
             </a:fld>
             <a:endParaRPr lang="en-US"/>
           </a:p>
@@ -13279,11 +13280,7 @@
           <a:p>
             <a:r>
               <a:rPr lang="en-US" sz="1400" dirty="0" err="1" smtClean="0"/>
-              <a:t>s</a:t>
-            </a:r>
-            <a:r>
-              <a:rPr lang="en-US" sz="1400" dirty="0" err="1" smtClean="0"/>
-              <a:t>eq_t</a:t>
+              <a:t>seq_t</a:t>
             </a:r>
             <a:endParaRPr lang="en-US" sz="1400" dirty="0"/>
           </a:p>
@@ -13560,11 +13557,7 @@
           <a:p>
             <a:r>
               <a:rPr lang="en-US" sz="1400" dirty="0" err="1" smtClean="0"/>
-              <a:t>s</a:t>
-            </a:r>
-            <a:r>
-              <a:rPr lang="en-US" sz="1400" dirty="0" err="1" smtClean="0"/>
-              <a:t>eq_t</a:t>
+              <a:t>seq_t</a:t>
             </a:r>
             <a:r>
               <a:rPr lang="en-US" sz="1400" dirty="0" smtClean="0"/>
@@ -14680,11 +14673,7 @@
           <a:p>
             <a:r>
               <a:rPr lang="en-US" sz="1400" dirty="0" err="1" smtClean="0"/>
-              <a:t>s</a:t>
-            </a:r>
-            <a:r>
-              <a:rPr lang="en-US" sz="1400" dirty="0" err="1" smtClean="0"/>
-              <a:t>eq_t</a:t>
+              <a:t>seq_t</a:t>
             </a:r>
             <a:endParaRPr lang="en-US" sz="1400" dirty="0"/>
           </a:p>
@@ -14961,11 +14950,7 @@
           <a:p>
             <a:r>
               <a:rPr lang="en-US" sz="1400" dirty="0" err="1" smtClean="0"/>
-              <a:t>s</a:t>
-            </a:r>
-            <a:r>
-              <a:rPr lang="en-US" sz="1400" dirty="0" err="1" smtClean="0"/>
-              <a:t>eq_t</a:t>
+              <a:t>seq_t</a:t>
             </a:r>
             <a:r>
               <a:rPr lang="en-US" sz="1400" dirty="0" smtClean="0"/>
@@ -15757,6 +15742,502 @@
 </p:sld>
 </file>
 
+<file path=ppt/slides/slide9.xml><?xml version="1.0" encoding="utf-8"?>
+<p:sld xmlns:a="http://schemas.openxmlformats.org/drawingml/2006/main" xmlns:r="http://schemas.openxmlformats.org/officeDocument/2006/relationships" xmlns:p="http://schemas.openxmlformats.org/presentationml/2006/main">
+  <p:cSld>
+    <p:spTree>
+      <p:nvGrpSpPr>
+        <p:cNvPr id="1" name=""/>
+        <p:cNvGrpSpPr/>
+        <p:nvPr/>
+      </p:nvGrpSpPr>
+      <p:grpSpPr>
+        <a:xfrm>
+          <a:off x="0" y="0"/>
+          <a:ext cx="0" cy="0"/>
+          <a:chOff x="0" y="0"/>
+          <a:chExt cx="0" cy="0"/>
+        </a:xfrm>
+      </p:grpSpPr>
+      <p:sp>
+        <p:nvSpPr>
+          <p:cNvPr id="2" name="TextBox 1"/>
+          <p:cNvSpPr txBox="1"/>
+          <p:nvPr/>
+        </p:nvSpPr>
+        <p:spPr>
+          <a:xfrm>
+            <a:off x="683568" y="404664"/>
+            <a:ext cx="1527469" cy="369332"/>
+          </a:xfrm>
+          <a:prstGeom prst="rect">
+            <a:avLst/>
+          </a:prstGeom>
+          <a:noFill/>
+        </p:spPr>
+        <p:txBody>
+          <a:bodyPr wrap="none" rtlCol="0">
+            <a:spAutoFit/>
+          </a:bodyPr>
+          <a:lstStyle/>
+          <a:p>
+            <a:r>
+              <a:rPr lang="en-US" dirty="0" err="1" smtClean="0"/>
+              <a:t>Jdksmidi</a:t>
+            </a:r>
+            <a:r>
+              <a:rPr lang="en-US" dirty="0" smtClean="0"/>
+              <a:t> ideas</a:t>
+            </a:r>
+            <a:endParaRPr lang="en-US" dirty="0"/>
+          </a:p>
+        </p:txBody>
+      </p:sp>
+      <p:pic>
+        <p:nvPicPr>
+          <p:cNvPr id="1026" name="Picture 2"/>
+          <p:cNvPicPr>
+            <a:picLocks noChangeAspect="1" noChangeArrowheads="1"/>
+          </p:cNvPicPr>
+          <p:nvPr/>
+        </p:nvPicPr>
+        <p:blipFill>
+          <a:blip r:embed="rId2" cstate="print"/>
+          <a:srcRect/>
+          <a:stretch>
+            <a:fillRect/>
+          </a:stretch>
+        </p:blipFill>
+        <p:spPr bwMode="auto">
+          <a:xfrm>
+            <a:off x="0" y="836712"/>
+            <a:ext cx="3657600" cy="4257675"/>
+          </a:xfrm>
+          <a:prstGeom prst="rect">
+            <a:avLst/>
+          </a:prstGeom>
+          <a:noFill/>
+          <a:ln w="9525">
+            <a:noFill/>
+            <a:miter lim="800000"/>
+            <a:headEnd/>
+            <a:tailEnd/>
+          </a:ln>
+          <a:effectLst/>
+        </p:spPr>
+      </p:pic>
+      <p:sp>
+        <p:nvSpPr>
+          <p:cNvPr id="5" name="TextBox 4"/>
+          <p:cNvSpPr txBox="1"/>
+          <p:nvPr/>
+        </p:nvSpPr>
+        <p:spPr>
+          <a:xfrm>
+            <a:off x="3449890" y="476672"/>
+            <a:ext cx="4794518" cy="6771084"/>
+          </a:xfrm>
+          <a:prstGeom prst="rect">
+            <a:avLst/>
+          </a:prstGeom>
+          <a:noFill/>
+        </p:spPr>
+        <p:txBody>
+          <a:bodyPr wrap="none" rtlCol="0">
+            <a:spAutoFit/>
+          </a:bodyPr>
+          <a:lstStyle/>
+          <a:p>
+            <a:r>
+              <a:rPr lang="en-US" sz="1400" dirty="0" err="1" smtClean="0"/>
+              <a:t>msg</a:t>
+            </a:r>
+            <a:r>
+              <a:rPr lang="en-US" sz="1400" dirty="0" smtClean="0"/>
+              <a:t>:</a:t>
+            </a:r>
+          </a:p>
+          <a:p>
+            <a:r>
+              <a:rPr lang="en-US" sz="1400" dirty="0" err="1" smtClean="0"/>
+              <a:t>MIDIMessage</a:t>
+            </a:r>
+            <a:endParaRPr lang="en-US" sz="1400" dirty="0" smtClean="0"/>
+          </a:p>
+          <a:p>
+            <a:r>
+              <a:rPr lang="en-US" sz="1400" dirty="0" err="1" smtClean="0"/>
+              <a:t>MIDIBigMessage</a:t>
+            </a:r>
+            <a:endParaRPr lang="en-US" sz="1400" dirty="0" smtClean="0"/>
+          </a:p>
+          <a:p>
+            <a:r>
+              <a:rPr lang="en-US" sz="1400" dirty="0" err="1" smtClean="0"/>
+              <a:t>MIDITimedMessage</a:t>
+            </a:r>
+            <a:endParaRPr lang="en-US" sz="1400" dirty="0" smtClean="0"/>
+          </a:p>
+          <a:p>
+            <a:r>
+              <a:rPr lang="en-US" sz="1400" dirty="0" err="1" smtClean="0"/>
+              <a:t>MIDIDeltaTimedMessage</a:t>
+            </a:r>
+            <a:endParaRPr lang="en-US" sz="1400" dirty="0" smtClean="0"/>
+          </a:p>
+          <a:p>
+            <a:r>
+              <a:rPr lang="en-US" sz="1400" dirty="0" err="1" smtClean="0"/>
+              <a:t>MIDITimedBigMessage</a:t>
+            </a:r>
+            <a:endParaRPr lang="en-US" sz="1400" dirty="0" smtClean="0"/>
+          </a:p>
+          <a:p>
+            <a:r>
+              <a:rPr lang="en-US" sz="1400" dirty="0" err="1" smtClean="0"/>
+              <a:t>MIDIDeltaTimedBigMessage</a:t>
+            </a:r>
+            <a:endParaRPr lang="en-US" sz="1400" dirty="0" smtClean="0"/>
+          </a:p>
+          <a:p>
+            <a:endParaRPr lang="en-US" sz="1400" dirty="0" smtClean="0"/>
+          </a:p>
+          <a:p>
+            <a:r>
+              <a:rPr lang="en-US" sz="1400" dirty="0" smtClean="0"/>
+              <a:t>queue:</a:t>
+            </a:r>
+          </a:p>
+          <a:p>
+            <a:r>
+              <a:rPr lang="en-US" sz="1400" dirty="0" smtClean="0"/>
+              <a:t>&lt;create&gt; (</a:t>
+            </a:r>
+            <a:r>
+              <a:rPr lang="en-US" sz="1400" dirty="0" err="1" smtClean="0"/>
+              <a:t>MIDITimedBigMessage</a:t>
+            </a:r>
+            <a:r>
+              <a:rPr lang="en-US" sz="1400" dirty="0" smtClean="0"/>
+              <a:t>)</a:t>
+            </a:r>
+          </a:p>
+          <a:p>
+            <a:r>
+              <a:rPr lang="en-US" sz="1400" dirty="0" smtClean="0"/>
+              <a:t>Clear</a:t>
+            </a:r>
+          </a:p>
+          <a:p>
+            <a:r>
+              <a:rPr lang="en-US" sz="1400" dirty="0" err="1" smtClean="0"/>
+              <a:t>CanPut</a:t>
+            </a:r>
+            <a:endParaRPr lang="en-US" sz="1400" dirty="0" smtClean="0"/>
+          </a:p>
+          <a:p>
+            <a:r>
+              <a:rPr lang="en-US" sz="1400" dirty="0" err="1" smtClean="0"/>
+              <a:t>CanGet</a:t>
+            </a:r>
+            <a:endParaRPr lang="en-US" sz="1400" dirty="0" smtClean="0"/>
+          </a:p>
+          <a:p>
+            <a:r>
+              <a:rPr lang="en-US" sz="1400" dirty="0" err="1" smtClean="0"/>
+              <a:t>IsFull</a:t>
+            </a:r>
+            <a:endParaRPr lang="en-US" sz="1400" dirty="0" smtClean="0"/>
+          </a:p>
+          <a:p>
+            <a:r>
+              <a:rPr lang="en-US" sz="1400" dirty="0" smtClean="0"/>
+              <a:t>Put</a:t>
+            </a:r>
+          </a:p>
+          <a:p>
+            <a:r>
+              <a:rPr lang="en-US" sz="1400" dirty="0" smtClean="0"/>
+              <a:t>Get</a:t>
+            </a:r>
+          </a:p>
+          <a:p>
+            <a:r>
+              <a:rPr lang="en-US" sz="1400" dirty="0" smtClean="0"/>
+              <a:t>Next</a:t>
+            </a:r>
+          </a:p>
+          <a:p>
+            <a:r>
+              <a:rPr lang="en-US" sz="1400" dirty="0" smtClean="0"/>
+              <a:t>Peek</a:t>
+            </a:r>
+            <a:endParaRPr lang="en-US" sz="1400" dirty="0" smtClean="0"/>
+          </a:p>
+          <a:p>
+            <a:endParaRPr lang="en-US" sz="1400" dirty="0" smtClean="0"/>
+          </a:p>
+          <a:p>
+            <a:r>
+              <a:rPr lang="en-US" sz="1400" dirty="0" smtClean="0"/>
+              <a:t>track:</a:t>
+            </a:r>
+          </a:p>
+          <a:p>
+            <a:r>
+              <a:rPr lang="en-US" sz="1400" dirty="0" err="1" smtClean="0"/>
+              <a:t>putEvent</a:t>
+            </a:r>
+            <a:endParaRPr lang="en-US" sz="1400" dirty="0" smtClean="0"/>
+          </a:p>
+          <a:p>
+            <a:r>
+              <a:rPr lang="en-US" sz="1400" dirty="0" err="1" smtClean="0"/>
+              <a:t>getEvent</a:t>
+            </a:r>
+            <a:endParaRPr lang="en-US" sz="1400" dirty="0" smtClean="0"/>
+          </a:p>
+          <a:p>
+            <a:r>
+              <a:rPr lang="en-US" sz="1400" dirty="0" err="1" smtClean="0"/>
+              <a:t>setEvent</a:t>
+            </a:r>
+            <a:endParaRPr lang="en-US" sz="1400" dirty="0" smtClean="0"/>
+          </a:p>
+          <a:p>
+            <a:r>
+              <a:rPr lang="en-US" sz="1400" dirty="0" err="1" smtClean="0"/>
+              <a:t>makeEventNoOp</a:t>
+            </a:r>
+            <a:endParaRPr lang="en-US" sz="1400" dirty="0" smtClean="0"/>
+          </a:p>
+          <a:p>
+            <a:r>
+              <a:rPr lang="en-US" sz="1400" dirty="0" err="1" smtClean="0"/>
+              <a:t>MIDITimedBigMessage</a:t>
+            </a:r>
+            <a:r>
+              <a:rPr lang="en-US" sz="1400" dirty="0" smtClean="0"/>
+              <a:t> </a:t>
+            </a:r>
+            <a:r>
+              <a:rPr lang="en-US" sz="1400" dirty="0" smtClean="0"/>
+              <a:t>*</a:t>
+            </a:r>
+            <a:r>
+              <a:rPr lang="en-US" sz="1400" dirty="0" err="1" smtClean="0"/>
+              <a:t>MIDITrack</a:t>
+            </a:r>
+            <a:r>
+              <a:rPr lang="en-US" sz="1400" dirty="0" smtClean="0"/>
+              <a:t>::</a:t>
+            </a:r>
+            <a:r>
+              <a:rPr lang="en-US" sz="1400" dirty="0" err="1" smtClean="0"/>
+              <a:t>GetEvent</a:t>
+            </a:r>
+            <a:r>
+              <a:rPr lang="en-US" sz="1400" dirty="0" smtClean="0"/>
+              <a:t> ( </a:t>
+            </a:r>
+            <a:r>
+              <a:rPr lang="en-US" sz="1400" dirty="0" err="1" smtClean="0"/>
+              <a:t>int</a:t>
+            </a:r>
+            <a:r>
+              <a:rPr lang="en-US" sz="1400" dirty="0" smtClean="0"/>
+              <a:t> </a:t>
+            </a:r>
+            <a:r>
+              <a:rPr lang="en-US" sz="1400" dirty="0" err="1" smtClean="0"/>
+              <a:t>event_num</a:t>
+            </a:r>
+            <a:r>
+              <a:rPr lang="en-US" sz="1400" dirty="0" smtClean="0"/>
+              <a:t> </a:t>
+            </a:r>
+            <a:r>
+              <a:rPr lang="en-US" sz="1400" dirty="0" smtClean="0"/>
+              <a:t>)</a:t>
+            </a:r>
+          </a:p>
+          <a:p>
+            <a:endParaRPr lang="en-US" sz="1400" dirty="0" smtClean="0"/>
+          </a:p>
+          <a:p>
+            <a:endParaRPr lang="en-US" sz="1400" dirty="0" smtClean="0"/>
+          </a:p>
+          <a:p>
+            <a:endParaRPr lang="en-US" sz="1400" dirty="0" smtClean="0"/>
+          </a:p>
+          <a:p>
+            <a:endParaRPr lang="en-US" sz="1400" dirty="0" smtClean="0"/>
+          </a:p>
+          <a:p>
+            <a:endParaRPr lang="en-US" sz="1400" dirty="0" smtClean="0"/>
+          </a:p>
+          <a:p>
+            <a:r>
+              <a:rPr lang="en-US" sz="1400" dirty="0" smtClean="0"/>
+              <a:t>  </a:t>
+            </a:r>
+            <a:endParaRPr lang="en-US" sz="1400" dirty="0"/>
+          </a:p>
+        </p:txBody>
+      </p:sp>
+      <p:sp>
+        <p:nvSpPr>
+          <p:cNvPr id="6" name="TextBox 5"/>
+          <p:cNvSpPr txBox="1"/>
+          <p:nvPr/>
+        </p:nvSpPr>
+        <p:spPr>
+          <a:xfrm>
+            <a:off x="5868144" y="476672"/>
+            <a:ext cx="3341171" cy="3539430"/>
+          </a:xfrm>
+          <a:prstGeom prst="rect">
+            <a:avLst/>
+          </a:prstGeom>
+          <a:noFill/>
+        </p:spPr>
+        <p:txBody>
+          <a:bodyPr wrap="none" rtlCol="0">
+            <a:spAutoFit/>
+          </a:bodyPr>
+          <a:lstStyle/>
+          <a:p>
+            <a:endParaRPr lang="en-US" sz="1400" dirty="0" smtClean="0"/>
+          </a:p>
+          <a:p>
+            <a:r>
+              <a:rPr lang="en-US" sz="1400" dirty="0" smtClean="0"/>
+              <a:t>Sequencer:</a:t>
+            </a:r>
+          </a:p>
+          <a:p>
+            <a:r>
+              <a:rPr lang="en-US" sz="1400" dirty="0" err="1" smtClean="0"/>
+              <a:t>MIDISequencerTrackNotifier</a:t>
+            </a:r>
+            <a:endParaRPr lang="en-US" sz="1400" dirty="0" smtClean="0"/>
+          </a:p>
+          <a:p>
+            <a:r>
+              <a:rPr lang="en-US" sz="1400" dirty="0" err="1" smtClean="0"/>
+              <a:t>MIDISequencerTrackProcessor</a:t>
+            </a:r>
+            <a:endParaRPr lang="en-US" sz="1400" dirty="0" smtClean="0"/>
+          </a:p>
+          <a:p>
+            <a:r>
+              <a:rPr lang="en-US" sz="1400" dirty="0" err="1" smtClean="0"/>
+              <a:t>MIDISequencerTrackState</a:t>
+            </a:r>
+            <a:endParaRPr lang="en-US" sz="1400" dirty="0" smtClean="0"/>
+          </a:p>
+          <a:p>
+            <a:r>
+              <a:rPr lang="en-US" sz="1400" dirty="0" err="1" smtClean="0"/>
+              <a:t>MIDISequencerState</a:t>
+            </a:r>
+            <a:endParaRPr lang="en-US" sz="1400" dirty="0" smtClean="0"/>
+          </a:p>
+          <a:p>
+            <a:r>
+              <a:rPr lang="en-US" sz="1400" dirty="0" err="1" smtClean="0"/>
+              <a:t>MIDISequencer</a:t>
+            </a:r>
+            <a:endParaRPr lang="en-US" sz="1400" dirty="0" smtClean="0"/>
+          </a:p>
+          <a:p>
+            <a:endParaRPr lang="en-US" sz="1400" dirty="0" smtClean="0"/>
+          </a:p>
+          <a:p>
+            <a:endParaRPr lang="en-US" sz="1400" dirty="0" smtClean="0"/>
+          </a:p>
+          <a:p>
+            <a:r>
+              <a:rPr lang="en-US" sz="1400" dirty="0" err="1" smtClean="0"/>
+              <a:t>s</a:t>
+            </a:r>
+            <a:r>
+              <a:rPr lang="en-US" sz="1400" dirty="0" err="1" smtClean="0"/>
+              <a:t>ysex</a:t>
+            </a:r>
+            <a:r>
+              <a:rPr lang="en-US" sz="1400" dirty="0" smtClean="0"/>
+              <a:t>:</a:t>
+            </a:r>
+          </a:p>
+          <a:p>
+            <a:r>
+              <a:rPr lang="en-US" sz="1400" dirty="0" err="1" smtClean="0"/>
+              <a:t>MIDISystemExclusive</a:t>
+            </a:r>
+            <a:r>
+              <a:rPr lang="en-US" sz="1400" dirty="0" smtClean="0"/>
+              <a:t>::</a:t>
+            </a:r>
+            <a:r>
+              <a:rPr lang="en-US" sz="1400" dirty="0" err="1" smtClean="0"/>
+              <a:t>MIDISystemExclusive</a:t>
+            </a:r>
+            <a:endParaRPr lang="en-US" sz="1400" dirty="0" smtClean="0"/>
+          </a:p>
+          <a:p>
+            <a:r>
+              <a:rPr lang="en-US" sz="1400" dirty="0" smtClean="0"/>
+              <a:t>    </a:t>
+            </a:r>
+            <a:r>
+              <a:rPr lang="en-US" sz="1400" dirty="0" err="1" smtClean="0"/>
+              <a:t>buf</a:t>
+            </a:r>
+            <a:r>
+              <a:rPr lang="en-US" sz="1400" dirty="0" smtClean="0"/>
+              <a:t> </a:t>
+            </a:r>
+            <a:r>
+              <a:rPr lang="en-US" sz="1400" dirty="0" smtClean="0"/>
+              <a:t>= new </a:t>
+            </a:r>
+            <a:r>
+              <a:rPr lang="en-US" sz="1400" dirty="0" err="1" smtClean="0"/>
+              <a:t>uchar</a:t>
+            </a:r>
+            <a:r>
+              <a:rPr lang="en-US" sz="1400" dirty="0" smtClean="0"/>
+              <a:t>[size_];</a:t>
+            </a:r>
+            <a:endParaRPr lang="en-US" sz="1400" dirty="0" smtClean="0"/>
+          </a:p>
+          <a:p>
+            <a:endParaRPr lang="en-US" sz="1400" dirty="0" smtClean="0"/>
+          </a:p>
+          <a:p>
+            <a:endParaRPr lang="en-US" sz="1400" dirty="0" smtClean="0"/>
+          </a:p>
+          <a:p>
+            <a:endParaRPr lang="en-US" sz="1400" dirty="0" smtClean="0"/>
+          </a:p>
+          <a:p>
+            <a:r>
+              <a:rPr lang="en-US" sz="1400" dirty="0" smtClean="0"/>
+              <a:t>  </a:t>
+            </a:r>
+            <a:endParaRPr lang="en-US" sz="1400" dirty="0"/>
+          </a:p>
+        </p:txBody>
+      </p:sp>
+    </p:spTree>
+  </p:cSld>
+  <p:clrMapOvr>
+    <a:masterClrMapping/>
+  </p:clrMapOvr>
+</p:sld>
+</file>
+
 <file path=ppt/theme/theme1.xml><?xml version="1.0" encoding="utf-8"?>
 <a:theme xmlns:a="http://schemas.openxmlformats.org/drawingml/2006/main" name="Office Theme">
   <a:themeElements>

</xml_diff>